<commit_message>
minor edits to slides and report
</commit_message>
<xml_diff>
--- a/seminar/StrategyPattern.pptx
+++ b/seminar/StrategyPattern.pptx
@@ -8,25 +8,26 @@
     <p:sldId id="256" r:id="rId2"/>
     <p:sldId id="278" r:id="rId3"/>
     <p:sldId id="271" r:id="rId4"/>
-    <p:sldId id="263" r:id="rId5"/>
-    <p:sldId id="259" r:id="rId6"/>
-    <p:sldId id="265" r:id="rId7"/>
-    <p:sldId id="266" r:id="rId8"/>
-    <p:sldId id="268" r:id="rId9"/>
-    <p:sldId id="267" r:id="rId10"/>
-    <p:sldId id="269" r:id="rId11"/>
-    <p:sldId id="262" r:id="rId12"/>
+    <p:sldId id="262" r:id="rId5"/>
+    <p:sldId id="263" r:id="rId6"/>
+    <p:sldId id="259" r:id="rId7"/>
+    <p:sldId id="265" r:id="rId8"/>
+    <p:sldId id="266" r:id="rId9"/>
+    <p:sldId id="268" r:id="rId10"/>
+    <p:sldId id="267" r:id="rId11"/>
+    <p:sldId id="269" r:id="rId12"/>
     <p:sldId id="264" r:id="rId13"/>
     <p:sldId id="280" r:id="rId14"/>
     <p:sldId id="282" r:id="rId15"/>
     <p:sldId id="270" r:id="rId16"/>
-    <p:sldId id="272" r:id="rId17"/>
-    <p:sldId id="273" r:id="rId18"/>
-    <p:sldId id="274" r:id="rId19"/>
-    <p:sldId id="284" r:id="rId20"/>
-    <p:sldId id="279" r:id="rId21"/>
-    <p:sldId id="283" r:id="rId22"/>
-    <p:sldId id="275" r:id="rId23"/>
+    <p:sldId id="285" r:id="rId17"/>
+    <p:sldId id="272" r:id="rId18"/>
+    <p:sldId id="273" r:id="rId19"/>
+    <p:sldId id="274" r:id="rId20"/>
+    <p:sldId id="284" r:id="rId21"/>
+    <p:sldId id="279" r:id="rId22"/>
+    <p:sldId id="283" r:id="rId23"/>
+    <p:sldId id="275" r:id="rId24"/>
   </p:sldIdLst>
   <p:sldSz cx="12192000" cy="6858000"/>
   <p:notesSz cx="6858000" cy="9144000"/>
@@ -408,7 +409,7 @@
             <a:fld id="{96DFF08F-DC6B-4601-B491-B0F83F6DD2DA}" type="datetimeFigureOut">
               <a:rPr lang="en-US" smtClean="0"/>
               <a:pPr/>
-              <a:t>12/1/2019</a:t>
+              <a:t>12/6/2019</a:t>
             </a:fld>
             <a:endParaRPr lang="en-US" dirty="0"/>
           </a:p>
@@ -613,7 +614,7 @@
           <a:p>
             <a:fld id="{96DFF08F-DC6B-4601-B491-B0F83F6DD2DA}" type="datetimeFigureOut">
               <a:rPr lang="en-US" smtClean="0"/>
-              <a:t>12/1/2019</a:t>
+              <a:t>12/6/2019</a:t>
             </a:fld>
             <a:endParaRPr lang="en-US" dirty="0"/>
           </a:p>
@@ -793,7 +794,7 @@
           <a:p>
             <a:fld id="{96DFF08F-DC6B-4601-B491-B0F83F6DD2DA}" type="datetimeFigureOut">
               <a:rPr lang="en-US" smtClean="0"/>
-              <a:t>12/1/2019</a:t>
+              <a:t>12/6/2019</a:t>
             </a:fld>
             <a:endParaRPr lang="en-US" dirty="0"/>
           </a:p>
@@ -998,7 +999,7 @@
           <a:p>
             <a:fld id="{96DFF08F-DC6B-4601-B491-B0F83F6DD2DA}" type="datetimeFigureOut">
               <a:rPr lang="en-US" smtClean="0"/>
-              <a:t>12/1/2019</a:t>
+              <a:t>12/6/2019</a:t>
             </a:fld>
             <a:endParaRPr lang="en-US" dirty="0"/>
           </a:p>
@@ -1293,7 +1294,7 @@
           <a:p>
             <a:fld id="{96DFF08F-DC6B-4601-B491-B0F83F6DD2DA}" type="datetimeFigureOut">
               <a:rPr lang="en-US" smtClean="0"/>
-              <a:t>12/1/2019</a:t>
+              <a:t>12/6/2019</a:t>
             </a:fld>
             <a:endParaRPr lang="en-US" dirty="0"/>
           </a:p>
@@ -1565,7 +1566,7 @@
           <a:p>
             <a:fld id="{96DFF08F-DC6B-4601-B491-B0F83F6DD2DA}" type="datetimeFigureOut">
               <a:rPr lang="en-US" smtClean="0"/>
-              <a:t>12/1/2019</a:t>
+              <a:t>12/6/2019</a:t>
             </a:fld>
             <a:endParaRPr lang="en-US" dirty="0"/>
           </a:p>
@@ -1972,7 +1973,7 @@
           <a:p>
             <a:fld id="{96DFF08F-DC6B-4601-B491-B0F83F6DD2DA}" type="datetimeFigureOut">
               <a:rPr lang="en-US" smtClean="0"/>
-              <a:t>12/1/2019</a:t>
+              <a:t>12/6/2019</a:t>
             </a:fld>
             <a:endParaRPr lang="en-US" dirty="0"/>
           </a:p>
@@ -2090,7 +2091,7 @@
           <a:p>
             <a:fld id="{96DFF08F-DC6B-4601-B491-B0F83F6DD2DA}" type="datetimeFigureOut">
               <a:rPr lang="en-US" smtClean="0"/>
-              <a:t>12/1/2019</a:t>
+              <a:t>12/6/2019</a:t>
             </a:fld>
             <a:endParaRPr lang="en-US" dirty="0"/>
           </a:p>
@@ -2185,7 +2186,7 @@
           <a:p>
             <a:fld id="{96DFF08F-DC6B-4601-B491-B0F83F6DD2DA}" type="datetimeFigureOut">
               <a:rPr lang="en-US" smtClean="0"/>
-              <a:t>12/1/2019</a:t>
+              <a:t>12/6/2019</a:t>
             </a:fld>
             <a:endParaRPr lang="en-US" dirty="0"/>
           </a:p>
@@ -2475,7 +2476,7 @@
           <a:p>
             <a:fld id="{96DFF08F-DC6B-4601-B491-B0F83F6DD2DA}" type="datetimeFigureOut">
               <a:rPr lang="en-US" smtClean="0"/>
-              <a:t>12/1/2019</a:t>
+              <a:t>12/6/2019</a:t>
             </a:fld>
             <a:endParaRPr lang="en-US" dirty="0"/>
           </a:p>
@@ -2755,7 +2756,7 @@
           <a:p>
             <a:fld id="{C7616CA0-919D-4A49-9C8A-62FDFB3A5183}" type="datetimeFigureOut">
               <a:rPr lang="en-US" smtClean="0"/>
-              <a:t>12/1/2019</a:t>
+              <a:t>12/6/2019</a:t>
             </a:fld>
             <a:endParaRPr lang="en-US" dirty="0"/>
           </a:p>
@@ -3006,7 +3007,7 @@
             <a:fld id="{96DFF08F-DC6B-4601-B491-B0F83F6DD2DA}" type="datetimeFigureOut">
               <a:rPr lang="en-US" smtClean="0"/>
               <a:pPr/>
-              <a:t>12/1/2019</a:t>
+              <a:t>12/6/2019</a:t>
             </a:fld>
             <a:endParaRPr lang="en-US" dirty="0"/>
           </a:p>
@@ -3682,6 +3683,123 @@
         </p:blipFill>
         <p:spPr>
           <a:xfrm>
+            <a:off x="2408075" y="1391585"/>
+            <a:ext cx="7375849" cy="4477078"/>
+          </a:xfrm>
+          <a:prstGeom prst="rect">
+            <a:avLst/>
+          </a:prstGeom>
+        </p:spPr>
+      </p:pic>
+    </p:spTree>
+    <p:extLst>
+      <p:ext uri="{BB962C8B-B14F-4D97-AF65-F5344CB8AC3E}">
+        <p14:creationId xmlns:p14="http://schemas.microsoft.com/office/powerpoint/2010/main" val="3156013238"/>
+      </p:ext>
+    </p:extLst>
+  </p:cSld>
+  <p:clrMapOvr>
+    <a:masterClrMapping/>
+  </p:clrMapOvr>
+</p:sld>
+</file>
+
+<file path=ppt/slides/slide11.xml><?xml version="1.0" encoding="utf-8"?>
+<p:sld xmlns:a="http://schemas.openxmlformats.org/drawingml/2006/main" xmlns:r="http://schemas.openxmlformats.org/officeDocument/2006/relationships" xmlns:p="http://schemas.openxmlformats.org/presentationml/2006/main" showMasterSp="0">
+  <p:cSld>
+    <p:bg>
+      <p:bgPr>
+        <a:solidFill>
+          <a:schemeClr val="bg1"/>
+        </a:solidFill>
+        <a:effectLst/>
+      </p:bgPr>
+    </p:bg>
+    <p:spTree>
+      <p:nvGrpSpPr>
+        <p:cNvPr id="1" name=""/>
+        <p:cNvGrpSpPr/>
+        <p:nvPr/>
+      </p:nvGrpSpPr>
+      <p:grpSpPr>
+        <a:xfrm>
+          <a:off x="0" y="0"/>
+          <a:ext cx="0" cy="0"/>
+          <a:chOff x="0" y="0"/>
+          <a:chExt cx="0" cy="0"/>
+        </a:xfrm>
+      </p:grpSpPr>
+      <p:sp>
+        <p:nvSpPr>
+          <p:cNvPr id="8" name="TextBox 7">
+            <a:extLst>
+              <a:ext uri="{FF2B5EF4-FFF2-40B4-BE49-F238E27FC236}">
+                <a16:creationId xmlns:a16="http://schemas.microsoft.com/office/drawing/2014/main" id="{27D439ED-754F-41BB-B4DE-AB32597D52D0}"/>
+              </a:ext>
+            </a:extLst>
+          </p:cNvPr>
+          <p:cNvSpPr txBox="1"/>
+          <p:nvPr/>
+        </p:nvSpPr>
+        <p:spPr>
+          <a:xfrm>
+            <a:off x="913001" y="383563"/>
+            <a:ext cx="9883585" cy="784830"/>
+          </a:xfrm>
+          <a:prstGeom prst="rect">
+            <a:avLst/>
+          </a:prstGeom>
+          <a:noFill/>
+        </p:spPr>
+        <p:txBody>
+          <a:bodyPr wrap="square" rtlCol="0">
+            <a:spAutoFit/>
+          </a:bodyPr>
+          <a:lstStyle/>
+          <a:p>
+            <a:pPr algn="ctr">
+              <a:spcBef>
+                <a:spcPts val="300"/>
+              </a:spcBef>
+            </a:pPr>
+            <a:r>
+              <a:rPr lang="en-US" sz="4500">
+                <a:solidFill>
+                  <a:schemeClr val="accent4">
+                    <a:lumMod val="50000"/>
+                  </a:schemeClr>
+                </a:solidFill>
+                <a:latin typeface="Aharoni" panose="02010803020104030203" pitchFamily="2" charset="-79"/>
+                <a:ea typeface="Verdana" panose="020B0604030504040204" pitchFamily="34" charset="0"/>
+                <a:cs typeface="Aharoni" panose="02010803020104030203" pitchFamily="2" charset="-79"/>
+              </a:rPr>
+              <a:t>what about an interface?</a:t>
+            </a:r>
+          </a:p>
+        </p:txBody>
+      </p:sp>
+      <p:pic>
+        <p:nvPicPr>
+          <p:cNvPr id="7" name="Picture 6">
+            <a:extLst>
+              <a:ext uri="{FF2B5EF4-FFF2-40B4-BE49-F238E27FC236}">
+                <a16:creationId xmlns:a16="http://schemas.microsoft.com/office/drawing/2014/main" id="{6F580011-23E0-4AB8-B47A-D91E58A0418F}"/>
+              </a:ext>
+            </a:extLst>
+          </p:cNvPr>
+          <p:cNvPicPr>
+            <a:picLocks noChangeAspect="1"/>
+          </p:cNvPicPr>
+          <p:nvPr/>
+        </p:nvPicPr>
+        <p:blipFill>
+          <a:blip r:embed="rId2"/>
+          <a:stretch>
+            <a:fillRect/>
+          </a:stretch>
+        </p:blipFill>
+        <p:spPr>
+          <a:xfrm>
             <a:off x="2324185" y="1168393"/>
             <a:ext cx="7375849" cy="4477078"/>
           </a:xfrm>
@@ -3886,323 +4004,6 @@
     <p:extLst>
       <p:ext uri="{BB962C8B-B14F-4D97-AF65-F5344CB8AC3E}">
         <p14:creationId xmlns:p14="http://schemas.microsoft.com/office/powerpoint/2010/main" val="485140480"/>
-      </p:ext>
-    </p:extLst>
-  </p:cSld>
-  <p:clrMapOvr>
-    <a:masterClrMapping/>
-  </p:clrMapOvr>
-</p:sld>
-</file>
-
-<file path=ppt/slides/slide11.xml><?xml version="1.0" encoding="utf-8"?>
-<p:sld xmlns:a="http://schemas.openxmlformats.org/drawingml/2006/main" xmlns:r="http://schemas.openxmlformats.org/officeDocument/2006/relationships" xmlns:p="http://schemas.openxmlformats.org/presentationml/2006/main" showMasterSp="0">
-  <p:cSld>
-    <p:spTree>
-      <p:nvGrpSpPr>
-        <p:cNvPr id="1" name=""/>
-        <p:cNvGrpSpPr/>
-        <p:nvPr/>
-      </p:nvGrpSpPr>
-      <p:grpSpPr>
-        <a:xfrm>
-          <a:off x="0" y="0"/>
-          <a:ext cx="0" cy="0"/>
-          <a:chOff x="0" y="0"/>
-          <a:chExt cx="0" cy="0"/>
-        </a:xfrm>
-      </p:grpSpPr>
-      <p:sp>
-        <p:nvSpPr>
-          <p:cNvPr id="6" name="Title 5">
-            <a:extLst>
-              <a:ext uri="{FF2B5EF4-FFF2-40B4-BE49-F238E27FC236}">
-                <a16:creationId xmlns:a16="http://schemas.microsoft.com/office/drawing/2014/main" id="{5DB504B7-A9DA-42C6-8EFE-9C90D39C86B7}"/>
-              </a:ext>
-            </a:extLst>
-          </p:cNvPr>
-          <p:cNvSpPr>
-            <a:spLocks noGrp="1"/>
-          </p:cNvSpPr>
-          <p:nvPr>
-            <p:ph type="title"/>
-          </p:nvPr>
-        </p:nvSpPr>
-        <p:spPr>
-          <a:xfrm>
-            <a:off x="1024128" y="342621"/>
-            <a:ext cx="9720072" cy="1499616"/>
-          </a:xfrm>
-        </p:spPr>
-        <p:txBody>
-          <a:bodyPr>
-            <a:normAutofit/>
-          </a:bodyPr>
-          <a:lstStyle/>
-          <a:p>
-            <a:pPr algn="ctr"/>
-            <a:r>
-              <a:rPr lang="en-US" sz="6000" dirty="0">
-                <a:latin typeface="Aharoni" panose="02010803020104030203" pitchFamily="2" charset="-79"/>
-                <a:cs typeface="Aharoni" panose="02010803020104030203" pitchFamily="2" charset="-79"/>
-              </a:rPr>
-              <a:t>Strategy pattern</a:t>
-            </a:r>
-          </a:p>
-        </p:txBody>
-      </p:sp>
-      <p:sp>
-        <p:nvSpPr>
-          <p:cNvPr id="4" name="TextBox 3">
-            <a:extLst>
-              <a:ext uri="{FF2B5EF4-FFF2-40B4-BE49-F238E27FC236}">
-                <a16:creationId xmlns:a16="http://schemas.microsoft.com/office/drawing/2014/main" id="{4F618712-6F1B-4CFC-A1DE-B3C1736A1042}"/>
-              </a:ext>
-            </a:extLst>
-          </p:cNvPr>
-          <p:cNvSpPr txBox="1"/>
-          <p:nvPr/>
-        </p:nvSpPr>
-        <p:spPr>
-          <a:xfrm>
-            <a:off x="1788603" y="2243474"/>
-            <a:ext cx="8841996" cy="3093154"/>
-          </a:xfrm>
-          <a:prstGeom prst="rect">
-            <a:avLst/>
-          </a:prstGeom>
-          <a:noFill/>
-        </p:spPr>
-        <p:txBody>
-          <a:bodyPr wrap="square" rtlCol="0">
-            <a:spAutoFit/>
-          </a:bodyPr>
-          <a:lstStyle/>
-          <a:p>
-            <a:pPr algn="just">
-              <a:spcBef>
-                <a:spcPts val="300"/>
-              </a:spcBef>
-            </a:pPr>
-            <a:r>
-              <a:rPr lang="en-US" sz="3500" dirty="0">
-                <a:solidFill>
-                  <a:schemeClr val="accent2"/>
-                </a:solidFill>
-                <a:latin typeface="Aharoni" panose="02010803020104030203" pitchFamily="2" charset="-79"/>
-                <a:ea typeface="Verdana" panose="020B0604030504040204" pitchFamily="34" charset="0"/>
-                <a:cs typeface="Aharoni" panose="02010803020104030203" pitchFamily="2" charset="-79"/>
-              </a:rPr>
-              <a:t>Origin:</a:t>
-            </a:r>
-            <a:r>
-              <a:rPr lang="en-US" sz="3500" dirty="0">
-                <a:solidFill>
-                  <a:schemeClr val="accent2"/>
-                </a:solidFill>
-                <a:latin typeface="Bahnschrift SemiLight" panose="020B0502040204020203" pitchFamily="34" charset="0"/>
-                <a:ea typeface="Verdana" panose="020B0604030504040204" pitchFamily="34" charset="0"/>
-                <a:cs typeface="Helvetica" panose="020B0604020202020204" pitchFamily="34" charset="0"/>
-              </a:rPr>
-              <a:t>  </a:t>
-            </a:r>
-            <a:r>
-              <a:rPr lang="en-US" sz="4000" dirty="0">
-                <a:solidFill>
-                  <a:schemeClr val="accent2"/>
-                </a:solidFill>
-                <a:latin typeface="Bahnschrift SemiLight" panose="020B0502040204020203" pitchFamily="34" charset="0"/>
-                <a:ea typeface="Verdana" panose="020B0604030504040204" pitchFamily="34" charset="0"/>
-                <a:cs typeface="Helvetica" panose="020B0604020202020204" pitchFamily="34" charset="0"/>
-              </a:rPr>
-              <a:t>	</a:t>
-            </a:r>
-            <a:r>
-              <a:rPr lang="en-US" sz="2200" dirty="0">
-                <a:latin typeface="Bahnschrift SemiLight" panose="020B0502040204020203" pitchFamily="34" charset="0"/>
-                <a:ea typeface="Verdana" panose="020B0604030504040204" pitchFamily="34" charset="0"/>
-                <a:cs typeface="Helvetica" panose="020B0604020202020204" pitchFamily="34" charset="0"/>
-              </a:rPr>
-              <a:t>the Strategy Pattern is known as a </a:t>
-            </a:r>
-            <a:r>
-              <a:rPr lang="en-US" sz="2200" b="1" dirty="0">
-                <a:solidFill>
-                  <a:schemeClr val="accent2">
-                    <a:lumMod val="75000"/>
-                  </a:schemeClr>
-                </a:solidFill>
-                <a:latin typeface="Bahnschrift SemiLight" panose="020B0502040204020203" pitchFamily="34" charset="0"/>
-                <a:ea typeface="Verdana" panose="020B0604030504040204" pitchFamily="34" charset="0"/>
-                <a:cs typeface="Helvetica" panose="020B0604020202020204" pitchFamily="34" charset="0"/>
-              </a:rPr>
-              <a:t>behavioral</a:t>
-            </a:r>
-            <a:r>
-              <a:rPr lang="en-US" sz="2200" dirty="0">
-                <a:latin typeface="Bahnschrift SemiLight" panose="020B0502040204020203" pitchFamily="34" charset="0"/>
-                <a:ea typeface="Verdana" panose="020B0604030504040204" pitchFamily="34" charset="0"/>
-                <a:cs typeface="Helvetica" panose="020B0604020202020204" pitchFamily="34" charset="0"/>
-              </a:rPr>
-              <a:t> 						pattern and is used to manage algorithms, 							relationships and 	responsibilities between objects</a:t>
-            </a:r>
-            <a:endParaRPr lang="en-US" sz="2200" dirty="0">
-              <a:solidFill>
-                <a:schemeClr val="accent2"/>
-              </a:solidFill>
-              <a:latin typeface="Aharoni" panose="02010803020104030203" pitchFamily="2" charset="-79"/>
-              <a:ea typeface="Verdana" panose="020B0604030504040204" pitchFamily="34" charset="0"/>
-              <a:cs typeface="Aharoni" panose="02010803020104030203" pitchFamily="2" charset="-79"/>
-            </a:endParaRPr>
-          </a:p>
-          <a:p>
-            <a:pPr algn="just">
-              <a:spcBef>
-                <a:spcPts val="300"/>
-              </a:spcBef>
-            </a:pPr>
-            <a:endParaRPr lang="en-US" sz="500" dirty="0">
-              <a:solidFill>
-                <a:schemeClr val="accent2"/>
-              </a:solidFill>
-              <a:latin typeface="Aharoni" panose="02010803020104030203" pitchFamily="2" charset="-79"/>
-              <a:ea typeface="Verdana" panose="020B0604030504040204" pitchFamily="34" charset="0"/>
-              <a:cs typeface="Aharoni" panose="02010803020104030203" pitchFamily="2" charset="-79"/>
-            </a:endParaRPr>
-          </a:p>
-          <a:p>
-            <a:pPr algn="just">
-              <a:spcBef>
-                <a:spcPts val="300"/>
-              </a:spcBef>
-            </a:pPr>
-            <a:r>
-              <a:rPr lang="en-US" sz="3500" dirty="0">
-                <a:solidFill>
-                  <a:schemeClr val="accent2"/>
-                </a:solidFill>
-                <a:latin typeface="Aharoni" panose="02010803020104030203" pitchFamily="2" charset="-79"/>
-                <a:ea typeface="Verdana" panose="020B0604030504040204" pitchFamily="34" charset="0"/>
-                <a:cs typeface="Aharoni" panose="02010803020104030203" pitchFamily="2" charset="-79"/>
-              </a:rPr>
-              <a:t>Intent:</a:t>
-            </a:r>
-            <a:r>
-              <a:rPr lang="en-US" sz="3500" dirty="0">
-                <a:solidFill>
-                  <a:schemeClr val="accent2"/>
-                </a:solidFill>
-                <a:latin typeface="Bahnschrift SemiLight" panose="020B0502040204020203" pitchFamily="34" charset="0"/>
-                <a:ea typeface="Verdana" panose="020B0604030504040204" pitchFamily="34" charset="0"/>
-                <a:cs typeface="Helvetica" panose="020B0604020202020204" pitchFamily="34" charset="0"/>
-              </a:rPr>
-              <a:t>  </a:t>
-            </a:r>
-            <a:r>
-              <a:rPr lang="en-US" sz="2800" dirty="0">
-                <a:solidFill>
-                  <a:schemeClr val="accent2"/>
-                </a:solidFill>
-                <a:latin typeface="Bahnschrift SemiLight" panose="020B0502040204020203" pitchFamily="34" charset="0"/>
-                <a:ea typeface="Verdana" panose="020B0604030504040204" pitchFamily="34" charset="0"/>
-                <a:cs typeface="Helvetica" panose="020B0604020202020204" pitchFamily="34" charset="0"/>
-              </a:rPr>
-              <a:t>	</a:t>
-            </a:r>
-            <a:r>
-              <a:rPr lang="en-US" sz="2200" dirty="0">
-                <a:latin typeface="Bahnschrift SemiLight" panose="020B0502040204020203" pitchFamily="34" charset="0"/>
-                <a:ea typeface="Verdana" panose="020B0604030504040204" pitchFamily="34" charset="0"/>
-                <a:cs typeface="Helvetica" panose="020B0604020202020204" pitchFamily="34" charset="0"/>
-              </a:rPr>
-              <a:t>defines a family of algorithms, encapsulates each 					algorithm, and makes them interchangeable within 				that family</a:t>
-            </a:r>
-            <a:r>
-              <a:rPr lang="en-US" sz="1500" dirty="0">
-                <a:latin typeface="Bahnschrift SemiLight" panose="020B0502040204020203" pitchFamily="34" charset="0"/>
-                <a:ea typeface="Verdana" panose="020B0604030504040204" pitchFamily="34" charset="0"/>
-                <a:cs typeface="Helvetica" panose="020B0604020202020204" pitchFamily="34" charset="0"/>
-              </a:rPr>
-              <a:t> </a:t>
-            </a:r>
-            <a:r>
-              <a:rPr lang="en-US" sz="2200" dirty="0">
-                <a:latin typeface="Bahnschrift SemiLight" panose="020B0502040204020203" pitchFamily="34" charset="0"/>
-                <a:ea typeface="Verdana" panose="020B0604030504040204" pitchFamily="34" charset="0"/>
-                <a:cs typeface="Helvetica" panose="020B0604020202020204" pitchFamily="34" charset="0"/>
-              </a:rPr>
-              <a:t>strategy lets the algorithm vary 							independently from clients who use it</a:t>
-            </a:r>
-          </a:p>
-        </p:txBody>
-      </p:sp>
-      <p:sp>
-        <p:nvSpPr>
-          <p:cNvPr id="5" name="TextBox 4">
-            <a:extLst>
-              <a:ext uri="{FF2B5EF4-FFF2-40B4-BE49-F238E27FC236}">
-                <a16:creationId xmlns:a16="http://schemas.microsoft.com/office/drawing/2014/main" id="{1EBF2545-6B9D-4EF2-B0FE-99E0D6D3A927}"/>
-              </a:ext>
-            </a:extLst>
-          </p:cNvPr>
-          <p:cNvSpPr txBox="1"/>
-          <p:nvPr/>
-        </p:nvSpPr>
-        <p:spPr>
-          <a:xfrm>
-            <a:off x="1675002" y="1381700"/>
-            <a:ext cx="8841996" cy="861774"/>
-          </a:xfrm>
-          <a:prstGeom prst="rect">
-            <a:avLst/>
-          </a:prstGeom>
-          <a:noFill/>
-        </p:spPr>
-        <p:txBody>
-          <a:bodyPr wrap="square" rtlCol="0">
-            <a:spAutoFit/>
-          </a:bodyPr>
-          <a:lstStyle/>
-          <a:p>
-            <a:pPr algn="ctr">
-              <a:spcBef>
-                <a:spcPts val="300"/>
-              </a:spcBef>
-            </a:pPr>
-            <a:r>
-              <a:rPr lang="en-US" sz="5000">
-                <a:solidFill>
-                  <a:schemeClr val="accent2"/>
-                </a:solidFill>
-                <a:latin typeface="Aharoni" panose="02010803020104030203" pitchFamily="2" charset="-79"/>
-                <a:ea typeface="Verdana" panose="020B0604030504040204" pitchFamily="34" charset="0"/>
-                <a:cs typeface="Aharoni" panose="02010803020104030203" pitchFamily="2" charset="-79"/>
-              </a:rPr>
-              <a:t>•</a:t>
-            </a:r>
-            <a:r>
-              <a:rPr lang="en-US" sz="4000">
-                <a:solidFill>
-                  <a:schemeClr val="accent2"/>
-                </a:solidFill>
-                <a:latin typeface="Bahnschrift SemiLight" panose="020B0502040204020203" pitchFamily="34" charset="0"/>
-                <a:ea typeface="Verdana" panose="020B0604030504040204" pitchFamily="34" charset="0"/>
-                <a:cs typeface="Helvetica" panose="020B0604020202020204" pitchFamily="34" charset="0"/>
-              </a:rPr>
-              <a:t>	</a:t>
-            </a:r>
-            <a:endParaRPr lang="en-US" sz="2200">
-              <a:latin typeface="Bahnschrift SemiLight" panose="020B0502040204020203" pitchFamily="34" charset="0"/>
-              <a:ea typeface="Verdana" panose="020B0604030504040204" pitchFamily="34" charset="0"/>
-              <a:cs typeface="Helvetica" panose="020B0604020202020204" pitchFamily="34" charset="0"/>
-            </a:endParaRPr>
-          </a:p>
-        </p:txBody>
-      </p:sp>
-    </p:spTree>
-    <p:extLst>
-      <p:ext uri="{BB962C8B-B14F-4D97-AF65-F5344CB8AC3E}">
-        <p14:creationId xmlns:p14="http://schemas.microsoft.com/office/powerpoint/2010/main" val="2088408451"/>
       </p:ext>
     </p:extLst>
   </p:cSld>
@@ -4665,6 +4466,432 @@
       </p:grpSpPr>
       <p:sp>
         <p:nvSpPr>
+          <p:cNvPr id="13" name="Title 5">
+            <a:extLst>
+              <a:ext uri="{FF2B5EF4-FFF2-40B4-BE49-F238E27FC236}">
+                <a16:creationId xmlns:a16="http://schemas.microsoft.com/office/drawing/2014/main" id="{CDC9ADFD-B255-4949-9DBF-F75C26FEB243}"/>
+              </a:ext>
+            </a:extLst>
+          </p:cNvPr>
+          <p:cNvSpPr>
+            <a:spLocks noGrp="1"/>
+          </p:cNvSpPr>
+          <p:nvPr>
+            <p:ph type="title"/>
+          </p:nvPr>
+        </p:nvSpPr>
+        <p:spPr>
+          <a:xfrm>
+            <a:off x="1027885" y="432775"/>
+            <a:ext cx="10136229" cy="1499616"/>
+          </a:xfrm>
+        </p:spPr>
+        <p:txBody>
+          <a:bodyPr>
+            <a:normAutofit/>
+          </a:bodyPr>
+          <a:lstStyle/>
+          <a:p>
+            <a:pPr algn="ctr"/>
+            <a:r>
+              <a:rPr lang="en-US" sz="4500">
+                <a:latin typeface="Aharoni" panose="02010803020104030203" pitchFamily="2" charset="-79"/>
+                <a:cs typeface="Aharoni" panose="02010803020104030203" pitchFamily="2" charset="-79"/>
+              </a:rPr>
+              <a:t>Participants</a:t>
+            </a:r>
+            <a:endParaRPr lang="en-US" sz="4500" dirty="0">
+              <a:latin typeface="Aharoni" panose="02010803020104030203" pitchFamily="2" charset="-79"/>
+              <a:cs typeface="Aharoni" panose="02010803020104030203" pitchFamily="2" charset="-79"/>
+            </a:endParaRPr>
+          </a:p>
+        </p:txBody>
+      </p:sp>
+      <p:sp>
+        <p:nvSpPr>
+          <p:cNvPr id="8" name="TextBox 10">
+            <a:extLst>
+              <a:ext uri="{FF2B5EF4-FFF2-40B4-BE49-F238E27FC236}">
+                <a16:creationId xmlns:a16="http://schemas.microsoft.com/office/drawing/2014/main" id="{DC445080-3AE9-4948-92CA-B243F5E98371}"/>
+              </a:ext>
+            </a:extLst>
+          </p:cNvPr>
+          <p:cNvSpPr txBox="1"/>
+          <p:nvPr/>
+        </p:nvSpPr>
+        <p:spPr>
+          <a:xfrm>
+            <a:off x="1379981" y="2400714"/>
+            <a:ext cx="9432036" cy="3200876"/>
+          </a:xfrm>
+          <a:prstGeom prst="rect">
+            <a:avLst/>
+          </a:prstGeom>
+          <a:noFill/>
+        </p:spPr>
+        <p:txBody>
+          <a:bodyPr wrap="square" rtlCol="0">
+            <a:spAutoFit/>
+          </a:bodyPr>
+          <a:lstStyle/>
+          <a:p>
+            <a:pPr marL="285750" indent="-285750" fontAlgn="base">
+              <a:buFont typeface="Wingdings" panose="05000000000000000000" pitchFamily="2" charset="2"/>
+              <a:buChar char="§"/>
+            </a:pPr>
+            <a:r>
+              <a:rPr lang="en-US" sz="2400">
+                <a:ln w="0" cmpd="thinThick">
+                  <a:solidFill>
+                    <a:schemeClr val="tx1">
+                      <a:alpha val="6000"/>
+                    </a:schemeClr>
+                  </a:solidFill>
+                </a:ln>
+                <a:latin typeface="Bahnschrift SemiLight" panose="020B0502040204020203" pitchFamily="34" charset="0"/>
+                <a:cs typeface="Times New Roman" panose="02020603050405020304" pitchFamily="18" charset="0"/>
+              </a:rPr>
+              <a:t>declares an interface common to all supported algorithms, context uses this interface to call the algorithm defined by a concreteStrategy</a:t>
+            </a:r>
+          </a:p>
+          <a:p>
+            <a:pPr marL="285750" indent="-285750" fontAlgn="base">
+              <a:buFont typeface="Wingdings" panose="05000000000000000000" pitchFamily="2" charset="2"/>
+              <a:buChar char="§"/>
+            </a:pPr>
+            <a:endParaRPr lang="en-US" sz="500">
+              <a:ln w="0" cmpd="thinThick">
+                <a:solidFill>
+                  <a:schemeClr val="tx1">
+                    <a:alpha val="6000"/>
+                  </a:schemeClr>
+                </a:solidFill>
+              </a:ln>
+              <a:latin typeface="Bahnschrift SemiLight" panose="020B0502040204020203" pitchFamily="34" charset="0"/>
+              <a:cs typeface="Times New Roman" panose="02020603050405020304" pitchFamily="18" charset="0"/>
+            </a:endParaRPr>
+          </a:p>
+          <a:p>
+            <a:pPr marL="285750" indent="-285750" fontAlgn="base">
+              <a:buFont typeface="Wingdings" panose="05000000000000000000" pitchFamily="2" charset="2"/>
+              <a:buChar char="§"/>
+            </a:pPr>
+            <a:r>
+              <a:rPr lang="en-US" sz="2400">
+                <a:ln w="0" cmpd="thinThick">
+                  <a:solidFill>
+                    <a:schemeClr val="tx1">
+                      <a:alpha val="6000"/>
+                    </a:schemeClr>
+                  </a:solidFill>
+                </a:ln>
+                <a:latin typeface="Bahnschrift SemiLight" panose="020B0502040204020203" pitchFamily="34" charset="0"/>
+                <a:cs typeface="Times New Roman" panose="02020603050405020304" pitchFamily="18" charset="0"/>
+              </a:rPr>
+              <a:t>concreteStrategy implements the algorithm using the strategy interface</a:t>
+            </a:r>
+          </a:p>
+          <a:p>
+            <a:pPr marL="285750" indent="-285750" fontAlgn="base">
+              <a:buFont typeface="Wingdings" panose="05000000000000000000" pitchFamily="2" charset="2"/>
+              <a:buChar char="§"/>
+            </a:pPr>
+            <a:endParaRPr lang="en-US" sz="500">
+              <a:ln w="0" cmpd="thinThick">
+                <a:solidFill>
+                  <a:schemeClr val="tx1">
+                    <a:alpha val="6000"/>
+                  </a:schemeClr>
+                </a:solidFill>
+              </a:ln>
+              <a:latin typeface="Bahnschrift SemiLight" panose="020B0502040204020203" pitchFamily="34" charset="0"/>
+              <a:cs typeface="Times New Roman" panose="02020603050405020304" pitchFamily="18" charset="0"/>
+            </a:endParaRPr>
+          </a:p>
+          <a:p>
+            <a:pPr marL="285750" indent="-285750" fontAlgn="base">
+              <a:buFont typeface="Wingdings" panose="05000000000000000000" pitchFamily="2" charset="2"/>
+              <a:buChar char="§"/>
+            </a:pPr>
+            <a:r>
+              <a:rPr lang="en-US" sz="2400">
+                <a:ln w="0" cmpd="thinThick">
+                  <a:solidFill>
+                    <a:schemeClr val="tx1">
+                      <a:alpha val="6000"/>
+                    </a:schemeClr>
+                  </a:solidFill>
+                </a:ln>
+                <a:latin typeface="Bahnschrift SemiLight" panose="020B0502040204020203" pitchFamily="34" charset="0"/>
+                <a:cs typeface="Times New Roman" panose="02020603050405020304" pitchFamily="18" charset="0"/>
+              </a:rPr>
+              <a:t>contex configured with a concreteStrategy object, maintains a reference to a strategy object, may define an interface that lets strategy access its data</a:t>
+            </a:r>
+            <a:endParaRPr lang="en-US" sz="1600" dirty="0">
+              <a:ln w="0" cmpd="thinThick">
+                <a:solidFill>
+                  <a:schemeClr val="tx1">
+                    <a:alpha val="6000"/>
+                  </a:schemeClr>
+                </a:solidFill>
+              </a:ln>
+              <a:solidFill>
+                <a:schemeClr val="bg1"/>
+              </a:solidFill>
+              <a:latin typeface="Bahnschrift SemiLight" panose="020B0502040204020203" pitchFamily="34" charset="0"/>
+              <a:cs typeface="Times New Roman" panose="02020603050405020304" pitchFamily="18" charset="0"/>
+            </a:endParaRPr>
+          </a:p>
+        </p:txBody>
+      </p:sp>
+    </p:spTree>
+    <p:extLst>
+      <p:ext uri="{BB962C8B-B14F-4D97-AF65-F5344CB8AC3E}">
+        <p14:creationId xmlns:p14="http://schemas.microsoft.com/office/powerpoint/2010/main" val="3654986529"/>
+      </p:ext>
+    </p:extLst>
+  </p:cSld>
+  <p:clrMapOvr>
+    <a:masterClrMapping/>
+  </p:clrMapOvr>
+  <p:timing>
+    <p:tnLst>
+      <p:par>
+        <p:cTn id="1" dur="indefinite" restart="never" nodeType="tmRoot">
+          <p:childTnLst>
+            <p:seq concurrent="1" nextAc="seek">
+              <p:cTn id="2" dur="indefinite" nodeType="mainSeq">
+                <p:childTnLst>
+                  <p:par>
+                    <p:cTn id="3" fill="hold">
+                      <p:stCondLst>
+                        <p:cond delay="indefinite"/>
+                      </p:stCondLst>
+                      <p:childTnLst>
+                        <p:par>
+                          <p:cTn id="4" fill="hold">
+                            <p:stCondLst>
+                              <p:cond delay="0"/>
+                            </p:stCondLst>
+                            <p:childTnLst>
+                              <p:par>
+                                <p:cTn id="5" presetID="22" presetClass="entr" presetSubtype="8" fill="hold" grpId="0" nodeType="clickEffect">
+                                  <p:stCondLst>
+                                    <p:cond delay="0"/>
+                                  </p:stCondLst>
+                                  <p:childTnLst>
+                                    <p:set>
+                                      <p:cBhvr>
+                                        <p:cTn id="6" dur="1" fill="hold">
+                                          <p:stCondLst>
+                                            <p:cond delay="0"/>
+                                          </p:stCondLst>
+                                        </p:cTn>
+                                        <p:tgtEl>
+                                          <p:spTgt spid="8">
+                                            <p:txEl>
+                                              <p:pRg st="0" end="0"/>
+                                            </p:txEl>
+                                          </p:spTgt>
+                                        </p:tgtEl>
+                                        <p:attrNameLst>
+                                          <p:attrName>style.visibility</p:attrName>
+                                        </p:attrNameLst>
+                                      </p:cBhvr>
+                                      <p:to>
+                                        <p:strVal val="visible"/>
+                                      </p:to>
+                                    </p:set>
+                                    <p:animEffect transition="in" filter="wipe(left)">
+                                      <p:cBhvr>
+                                        <p:cTn id="7" dur="500"/>
+                                        <p:tgtEl>
+                                          <p:spTgt spid="8">
+                                            <p:txEl>
+                                              <p:pRg st="0" end="0"/>
+                                            </p:txEl>
+                                          </p:spTgt>
+                                        </p:tgtEl>
+                                      </p:cBhvr>
+                                    </p:animEffect>
+                                  </p:childTnLst>
+                                </p:cTn>
+                              </p:par>
+                            </p:childTnLst>
+                          </p:cTn>
+                        </p:par>
+                      </p:childTnLst>
+                    </p:cTn>
+                  </p:par>
+                  <p:par>
+                    <p:cTn id="8" fill="hold">
+                      <p:stCondLst>
+                        <p:cond delay="indefinite"/>
+                      </p:stCondLst>
+                      <p:childTnLst>
+                        <p:par>
+                          <p:cTn id="9" fill="hold">
+                            <p:stCondLst>
+                              <p:cond delay="0"/>
+                            </p:stCondLst>
+                            <p:childTnLst>
+                              <p:par>
+                                <p:cTn id="10" presetID="22" presetClass="entr" presetSubtype="8" fill="hold" grpId="0" nodeType="clickEffect">
+                                  <p:stCondLst>
+                                    <p:cond delay="0"/>
+                                  </p:stCondLst>
+                                  <p:childTnLst>
+                                    <p:set>
+                                      <p:cBhvr>
+                                        <p:cTn id="11" dur="1" fill="hold">
+                                          <p:stCondLst>
+                                            <p:cond delay="0"/>
+                                          </p:stCondLst>
+                                        </p:cTn>
+                                        <p:tgtEl>
+                                          <p:spTgt spid="8">
+                                            <p:txEl>
+                                              <p:pRg st="2" end="2"/>
+                                            </p:txEl>
+                                          </p:spTgt>
+                                        </p:tgtEl>
+                                        <p:attrNameLst>
+                                          <p:attrName>style.visibility</p:attrName>
+                                        </p:attrNameLst>
+                                      </p:cBhvr>
+                                      <p:to>
+                                        <p:strVal val="visible"/>
+                                      </p:to>
+                                    </p:set>
+                                    <p:animEffect transition="in" filter="wipe(left)">
+                                      <p:cBhvr>
+                                        <p:cTn id="12" dur="500"/>
+                                        <p:tgtEl>
+                                          <p:spTgt spid="8">
+                                            <p:txEl>
+                                              <p:pRg st="2" end="2"/>
+                                            </p:txEl>
+                                          </p:spTgt>
+                                        </p:tgtEl>
+                                      </p:cBhvr>
+                                    </p:animEffect>
+                                  </p:childTnLst>
+                                </p:cTn>
+                              </p:par>
+                            </p:childTnLst>
+                          </p:cTn>
+                        </p:par>
+                      </p:childTnLst>
+                    </p:cTn>
+                  </p:par>
+                  <p:par>
+                    <p:cTn id="13" fill="hold">
+                      <p:stCondLst>
+                        <p:cond delay="indefinite"/>
+                      </p:stCondLst>
+                      <p:childTnLst>
+                        <p:par>
+                          <p:cTn id="14" fill="hold">
+                            <p:stCondLst>
+                              <p:cond delay="0"/>
+                            </p:stCondLst>
+                            <p:childTnLst>
+                              <p:par>
+                                <p:cTn id="15" presetID="22" presetClass="entr" presetSubtype="8" fill="hold" grpId="0" nodeType="clickEffect">
+                                  <p:stCondLst>
+                                    <p:cond delay="0"/>
+                                  </p:stCondLst>
+                                  <p:childTnLst>
+                                    <p:set>
+                                      <p:cBhvr>
+                                        <p:cTn id="16" dur="1" fill="hold">
+                                          <p:stCondLst>
+                                            <p:cond delay="0"/>
+                                          </p:stCondLst>
+                                        </p:cTn>
+                                        <p:tgtEl>
+                                          <p:spTgt spid="8">
+                                            <p:txEl>
+                                              <p:pRg st="4" end="4"/>
+                                            </p:txEl>
+                                          </p:spTgt>
+                                        </p:tgtEl>
+                                        <p:attrNameLst>
+                                          <p:attrName>style.visibility</p:attrName>
+                                        </p:attrNameLst>
+                                      </p:cBhvr>
+                                      <p:to>
+                                        <p:strVal val="visible"/>
+                                      </p:to>
+                                    </p:set>
+                                    <p:animEffect transition="in" filter="wipe(left)">
+                                      <p:cBhvr>
+                                        <p:cTn id="17" dur="500"/>
+                                        <p:tgtEl>
+                                          <p:spTgt spid="8">
+                                            <p:txEl>
+                                              <p:pRg st="4" end="4"/>
+                                            </p:txEl>
+                                          </p:spTgt>
+                                        </p:tgtEl>
+                                      </p:cBhvr>
+                                    </p:animEffect>
+                                  </p:childTnLst>
+                                </p:cTn>
+                              </p:par>
+                            </p:childTnLst>
+                          </p:cTn>
+                        </p:par>
+                      </p:childTnLst>
+                    </p:cTn>
+                  </p:par>
+                </p:childTnLst>
+              </p:cTn>
+              <p:prevCondLst>
+                <p:cond evt="onPrev" delay="0">
+                  <p:tgtEl>
+                    <p:sldTgt/>
+                  </p:tgtEl>
+                </p:cond>
+              </p:prevCondLst>
+              <p:nextCondLst>
+                <p:cond evt="onNext" delay="0">
+                  <p:tgtEl>
+                    <p:sldTgt/>
+                  </p:tgtEl>
+                </p:cond>
+              </p:nextCondLst>
+            </p:seq>
+          </p:childTnLst>
+        </p:cTn>
+      </p:par>
+    </p:tnLst>
+    <p:bldLst>
+      <p:bldP spid="8" grpId="0" build="p"/>
+    </p:bldLst>
+  </p:timing>
+</p:sld>
+</file>
+
+<file path=ppt/slides/slide16.xml><?xml version="1.0" encoding="utf-8"?>
+<p:sld xmlns:a="http://schemas.openxmlformats.org/drawingml/2006/main" xmlns:r="http://schemas.openxmlformats.org/officeDocument/2006/relationships" xmlns:p="http://schemas.openxmlformats.org/presentationml/2006/main" showMasterSp="0">
+  <p:cSld>
+    <p:spTree>
+      <p:nvGrpSpPr>
+        <p:cNvPr id="1" name=""/>
+        <p:cNvGrpSpPr/>
+        <p:nvPr/>
+      </p:nvGrpSpPr>
+      <p:grpSpPr>
+        <a:xfrm>
+          <a:off x="0" y="0"/>
+          <a:ext cx="0" cy="0"/>
+          <a:chOff x="0" y="0"/>
+          <a:chExt cx="0" cy="0"/>
+        </a:xfrm>
+      </p:grpSpPr>
+      <p:sp>
+        <p:nvSpPr>
           <p:cNvPr id="9" name="Oval 8">
             <a:extLst>
               <a:ext uri="{FF2B5EF4-FFF2-40B4-BE49-F238E27FC236}">
@@ -4902,7 +5129,7 @@
     </p:spTree>
     <p:extLst>
       <p:ext uri="{BB962C8B-B14F-4D97-AF65-F5344CB8AC3E}">
-        <p14:creationId xmlns:p14="http://schemas.microsoft.com/office/powerpoint/2010/main" val="3654986529"/>
+        <p14:creationId xmlns:p14="http://schemas.microsoft.com/office/powerpoint/2010/main" val="1107218124"/>
       </p:ext>
     </p:extLst>
   </p:cSld>
@@ -5051,7 +5278,7 @@
 </p:sld>
 </file>
 
-<file path=ppt/slides/slide16.xml><?xml version="1.0" encoding="utf-8"?>
+<file path=ppt/slides/slide17.xml><?xml version="1.0" encoding="utf-8"?>
 <p:sld xmlns:a="http://schemas.openxmlformats.org/drawingml/2006/main" xmlns:r="http://schemas.openxmlformats.org/officeDocument/2006/relationships" xmlns:p="http://schemas.openxmlformats.org/presentationml/2006/main" showMasterSp="0">
   <p:cSld>
     <p:spTree>
@@ -5629,7 +5856,7 @@
 </p:sld>
 </file>
 
-<file path=ppt/slides/slide17.xml><?xml version="1.0" encoding="utf-8"?>
+<file path=ppt/slides/slide18.xml><?xml version="1.0" encoding="utf-8"?>
 <p:sld xmlns:a="http://schemas.openxmlformats.org/drawingml/2006/main" xmlns:r="http://schemas.openxmlformats.org/officeDocument/2006/relationships" xmlns:p="http://schemas.openxmlformats.org/presentationml/2006/main" showMasterSp="0">
   <p:cSld>
     <p:spTree>
@@ -6266,7 +6493,7 @@
 </p:sld>
 </file>
 
-<file path=ppt/slides/slide18.xml><?xml version="1.0" encoding="utf-8"?>
+<file path=ppt/slides/slide19.xml><?xml version="1.0" encoding="utf-8"?>
 <p:sld xmlns:a="http://schemas.openxmlformats.org/drawingml/2006/main" xmlns:r="http://schemas.openxmlformats.org/officeDocument/2006/relationships" xmlns:p="http://schemas.openxmlformats.org/presentationml/2006/main" showMasterSp="0">
   <p:cSld>
     <p:spTree>
@@ -6363,16 +6590,24 @@
           </a:bodyPr>
           <a:lstStyle/>
           <a:p>
-            <a:r>
-              <a:rPr lang="en-US" sz="3200" dirty="0">
+            <a:pPr algn="ctr"/>
+            <a:r>
+              <a:rPr lang="en-US" sz="3200">
                 <a:solidFill>
                   <a:srgbClr val="0685A9"/>
                 </a:solidFill>
                 <a:latin typeface="Bahnschrift SemiBold" panose="020B0502040204020203" pitchFamily="34" charset="0"/>
                 <a:cs typeface="Times New Roman" panose="02020603050405020304" pitchFamily="18" charset="0"/>
               </a:rPr>
-              <a:t>Which group does Strategy pattern belong to? </a:t>
-            </a:r>
+              <a:t>Which is the definition of Strategy Pattern? </a:t>
+            </a:r>
+            <a:endParaRPr lang="en-US" sz="3200" dirty="0">
+              <a:solidFill>
+                <a:srgbClr val="0685A9"/>
+              </a:solidFill>
+              <a:latin typeface="Bahnschrift SemiBold" panose="020B0502040204020203" pitchFamily="34" charset="0"/>
+              <a:cs typeface="Times New Roman" panose="02020603050405020304" pitchFamily="18" charset="0"/>
+            </a:endParaRPr>
           </a:p>
           <a:p>
             <a:pPr marL="342900" indent="-342900">
@@ -6869,7 +7104,141 @@
 </p:sld>
 </file>
 
-<file path=ppt/slides/slide19.xml><?xml version="1.0" encoding="utf-8"?>
+<file path=ppt/slides/slide2.xml><?xml version="1.0" encoding="utf-8"?>
+<p:sld xmlns:a="http://schemas.openxmlformats.org/drawingml/2006/main" xmlns:r="http://schemas.openxmlformats.org/officeDocument/2006/relationships" xmlns:p="http://schemas.openxmlformats.org/presentationml/2006/main" showMasterSp="0">
+  <p:cSld>
+    <p:bg>
+      <p:bgPr>
+        <a:solidFill>
+          <a:schemeClr val="bg1"/>
+        </a:solidFill>
+        <a:effectLst/>
+      </p:bgPr>
+    </p:bg>
+    <p:spTree>
+      <p:nvGrpSpPr>
+        <p:cNvPr id="1" name=""/>
+        <p:cNvGrpSpPr/>
+        <p:nvPr/>
+      </p:nvGrpSpPr>
+      <p:grpSpPr>
+        <a:xfrm>
+          <a:off x="0" y="0"/>
+          <a:ext cx="0" cy="0"/>
+          <a:chOff x="0" y="0"/>
+          <a:chExt cx="0" cy="0"/>
+        </a:xfrm>
+      </p:grpSpPr>
+      <p:sp>
+        <p:nvSpPr>
+          <p:cNvPr id="4" name="TextBox 3">
+            <a:extLst>
+              <a:ext uri="{FF2B5EF4-FFF2-40B4-BE49-F238E27FC236}">
+                <a16:creationId xmlns:a16="http://schemas.microsoft.com/office/drawing/2014/main" id="{B5A78BAB-5811-43A9-9B30-95AE3C1663E0}"/>
+              </a:ext>
+            </a:extLst>
+          </p:cNvPr>
+          <p:cNvSpPr txBox="1"/>
+          <p:nvPr/>
+        </p:nvSpPr>
+        <p:spPr>
+          <a:xfrm>
+            <a:off x="1491842" y="646883"/>
+            <a:ext cx="8841996" cy="938719"/>
+          </a:xfrm>
+          <a:prstGeom prst="rect">
+            <a:avLst/>
+          </a:prstGeom>
+          <a:noFill/>
+        </p:spPr>
+        <p:txBody>
+          <a:bodyPr wrap="square" rtlCol="0">
+            <a:spAutoFit/>
+          </a:bodyPr>
+          <a:lstStyle/>
+          <a:p>
+            <a:pPr algn="ctr">
+              <a:spcBef>
+                <a:spcPts val="300"/>
+              </a:spcBef>
+            </a:pPr>
+            <a:r>
+              <a:rPr lang="en-US" sz="5500" dirty="0">
+                <a:solidFill>
+                  <a:schemeClr val="accent4">
+                    <a:lumMod val="50000"/>
+                  </a:schemeClr>
+                </a:solidFill>
+                <a:latin typeface="Aharoni" panose="02010803020104030203" pitchFamily="2" charset="-79"/>
+                <a:ea typeface="Verdana" panose="020B0604030504040204" pitchFamily="34" charset="0"/>
+                <a:cs typeface="Aharoni" panose="02010803020104030203" pitchFamily="2" charset="-79"/>
+              </a:rPr>
+              <a:t>What is strategy?</a:t>
+            </a:r>
+          </a:p>
+        </p:txBody>
+      </p:sp>
+      <p:pic>
+        <p:nvPicPr>
+          <p:cNvPr id="1030" name="Picture 6" descr="Image result for tom and jerry holding bomb&quot;">
+            <a:extLst>
+              <a:ext uri="{FF2B5EF4-FFF2-40B4-BE49-F238E27FC236}">
+                <a16:creationId xmlns:a16="http://schemas.microsoft.com/office/drawing/2014/main" id="{D85940D6-AC2E-49BE-B7A9-A9802341473C}"/>
+              </a:ext>
+            </a:extLst>
+          </p:cNvPr>
+          <p:cNvPicPr>
+            <a:picLocks noChangeAspect="1" noChangeArrowheads="1"/>
+          </p:cNvPicPr>
+          <p:nvPr/>
+        </p:nvPicPr>
+        <p:blipFill>
+          <a:blip r:embed="rId2">
+            <a:extLst>
+              <a:ext uri="{28A0092B-C50C-407E-A947-70E740481C1C}">
+                <a14:useLocalDpi xmlns:a14="http://schemas.microsoft.com/office/drawing/2010/main" val="0"/>
+              </a:ext>
+            </a:extLst>
+          </a:blip>
+          <a:srcRect/>
+          <a:stretch>
+            <a:fillRect/>
+          </a:stretch>
+        </p:blipFill>
+        <p:spPr bwMode="auto">
+          <a:xfrm>
+            <a:off x="3497316" y="1653346"/>
+            <a:ext cx="4627179" cy="4557771"/>
+          </a:xfrm>
+          <a:prstGeom prst="rect">
+            <a:avLst/>
+          </a:prstGeom>
+          <a:noFill/>
+          <a:extLst>
+            <a:ext uri="{909E8E84-426E-40DD-AFC4-6F175D3DCCD1}">
+              <a14:hiddenFill xmlns:a14="http://schemas.microsoft.com/office/drawing/2010/main">
+                <a:solidFill>
+                  <a:srgbClr val="FFFFFF"/>
+                </a:solidFill>
+              </a14:hiddenFill>
+            </a:ext>
+          </a:extLst>
+        </p:spPr>
+      </p:pic>
+    </p:spTree>
+    <p:extLst>
+      <p:ext uri="{BB962C8B-B14F-4D97-AF65-F5344CB8AC3E}">
+        <p14:creationId xmlns:p14="http://schemas.microsoft.com/office/powerpoint/2010/main" val="830906783"/>
+      </p:ext>
+    </p:extLst>
+  </p:cSld>
+  <p:clrMapOvr>
+    <a:masterClrMapping/>
+  </p:clrMapOvr>
+</p:sld>
+</file>
+
+<file path=ppt/slides/slide20.xml><?xml version="1.0" encoding="utf-8"?>
 <p:sld xmlns:a="http://schemas.openxmlformats.org/drawingml/2006/main" xmlns:r="http://schemas.openxmlformats.org/officeDocument/2006/relationships" xmlns:p="http://schemas.openxmlformats.org/presentationml/2006/main" showMasterSp="0">
   <p:cSld>
     <p:spTree>
@@ -7364,141 +7733,7 @@
 </p:sld>
 </file>
 
-<file path=ppt/slides/slide2.xml><?xml version="1.0" encoding="utf-8"?>
-<p:sld xmlns:a="http://schemas.openxmlformats.org/drawingml/2006/main" xmlns:r="http://schemas.openxmlformats.org/officeDocument/2006/relationships" xmlns:p="http://schemas.openxmlformats.org/presentationml/2006/main" showMasterSp="0">
-  <p:cSld>
-    <p:bg>
-      <p:bgPr>
-        <a:solidFill>
-          <a:schemeClr val="bg1"/>
-        </a:solidFill>
-        <a:effectLst/>
-      </p:bgPr>
-    </p:bg>
-    <p:spTree>
-      <p:nvGrpSpPr>
-        <p:cNvPr id="1" name=""/>
-        <p:cNvGrpSpPr/>
-        <p:nvPr/>
-      </p:nvGrpSpPr>
-      <p:grpSpPr>
-        <a:xfrm>
-          <a:off x="0" y="0"/>
-          <a:ext cx="0" cy="0"/>
-          <a:chOff x="0" y="0"/>
-          <a:chExt cx="0" cy="0"/>
-        </a:xfrm>
-      </p:grpSpPr>
-      <p:sp>
-        <p:nvSpPr>
-          <p:cNvPr id="4" name="TextBox 3">
-            <a:extLst>
-              <a:ext uri="{FF2B5EF4-FFF2-40B4-BE49-F238E27FC236}">
-                <a16:creationId xmlns:a16="http://schemas.microsoft.com/office/drawing/2014/main" id="{B5A78BAB-5811-43A9-9B30-95AE3C1663E0}"/>
-              </a:ext>
-            </a:extLst>
-          </p:cNvPr>
-          <p:cNvSpPr txBox="1"/>
-          <p:nvPr/>
-        </p:nvSpPr>
-        <p:spPr>
-          <a:xfrm>
-            <a:off x="1491842" y="646883"/>
-            <a:ext cx="8841996" cy="938719"/>
-          </a:xfrm>
-          <a:prstGeom prst="rect">
-            <a:avLst/>
-          </a:prstGeom>
-          <a:noFill/>
-        </p:spPr>
-        <p:txBody>
-          <a:bodyPr wrap="square" rtlCol="0">
-            <a:spAutoFit/>
-          </a:bodyPr>
-          <a:lstStyle/>
-          <a:p>
-            <a:pPr algn="ctr">
-              <a:spcBef>
-                <a:spcPts val="300"/>
-              </a:spcBef>
-            </a:pPr>
-            <a:r>
-              <a:rPr lang="en-US" sz="5500" dirty="0">
-                <a:solidFill>
-                  <a:schemeClr val="accent4">
-                    <a:lumMod val="50000"/>
-                  </a:schemeClr>
-                </a:solidFill>
-                <a:latin typeface="Aharoni" panose="02010803020104030203" pitchFamily="2" charset="-79"/>
-                <a:ea typeface="Verdana" panose="020B0604030504040204" pitchFamily="34" charset="0"/>
-                <a:cs typeface="Aharoni" panose="02010803020104030203" pitchFamily="2" charset="-79"/>
-              </a:rPr>
-              <a:t>What is strategy?</a:t>
-            </a:r>
-          </a:p>
-        </p:txBody>
-      </p:sp>
-      <p:pic>
-        <p:nvPicPr>
-          <p:cNvPr id="1030" name="Picture 6" descr="Image result for tom and jerry holding bomb&quot;">
-            <a:extLst>
-              <a:ext uri="{FF2B5EF4-FFF2-40B4-BE49-F238E27FC236}">
-                <a16:creationId xmlns:a16="http://schemas.microsoft.com/office/drawing/2014/main" id="{D85940D6-AC2E-49BE-B7A9-A9802341473C}"/>
-              </a:ext>
-            </a:extLst>
-          </p:cNvPr>
-          <p:cNvPicPr>
-            <a:picLocks noChangeAspect="1" noChangeArrowheads="1"/>
-          </p:cNvPicPr>
-          <p:nvPr/>
-        </p:nvPicPr>
-        <p:blipFill>
-          <a:blip r:embed="rId2">
-            <a:extLst>
-              <a:ext uri="{28A0092B-C50C-407E-A947-70E740481C1C}">
-                <a14:useLocalDpi xmlns:a14="http://schemas.microsoft.com/office/drawing/2010/main" val="0"/>
-              </a:ext>
-            </a:extLst>
-          </a:blip>
-          <a:srcRect/>
-          <a:stretch>
-            <a:fillRect/>
-          </a:stretch>
-        </p:blipFill>
-        <p:spPr bwMode="auto">
-          <a:xfrm>
-            <a:off x="3497316" y="1653346"/>
-            <a:ext cx="4627179" cy="4557771"/>
-          </a:xfrm>
-          <a:prstGeom prst="rect">
-            <a:avLst/>
-          </a:prstGeom>
-          <a:noFill/>
-          <a:extLst>
-            <a:ext uri="{909E8E84-426E-40DD-AFC4-6F175D3DCCD1}">
-              <a14:hiddenFill xmlns:a14="http://schemas.microsoft.com/office/drawing/2010/main">
-                <a:solidFill>
-                  <a:srgbClr val="FFFFFF"/>
-                </a:solidFill>
-              </a14:hiddenFill>
-            </a:ext>
-          </a:extLst>
-        </p:spPr>
-      </p:pic>
-    </p:spTree>
-    <p:extLst>
-      <p:ext uri="{BB962C8B-B14F-4D97-AF65-F5344CB8AC3E}">
-        <p14:creationId xmlns:p14="http://schemas.microsoft.com/office/powerpoint/2010/main" val="830906783"/>
-      </p:ext>
-    </p:extLst>
-  </p:cSld>
-  <p:clrMapOvr>
-    <a:masterClrMapping/>
-  </p:clrMapOvr>
-</p:sld>
-</file>
-
-<file path=ppt/slides/slide20.xml><?xml version="1.0" encoding="utf-8"?>
+<file path=ppt/slides/slide21.xml><?xml version="1.0" encoding="utf-8"?>
 <p:sld xmlns:a="http://schemas.openxmlformats.org/drawingml/2006/main" xmlns:r="http://schemas.openxmlformats.org/officeDocument/2006/relationships" xmlns:p="http://schemas.openxmlformats.org/presentationml/2006/main" showMasterSp="0">
   <p:cSld>
     <p:spTree>
@@ -7668,337 +7903,6 @@
     <p:extLst>
       <p:ext uri="{BB962C8B-B14F-4D97-AF65-F5344CB8AC3E}">
         <p14:creationId xmlns:p14="http://schemas.microsoft.com/office/powerpoint/2010/main" val="1325669918"/>
-      </p:ext>
-    </p:extLst>
-  </p:cSld>
-  <p:clrMapOvr>
-    <a:masterClrMapping/>
-  </p:clrMapOvr>
-  <p:timing>
-    <p:tnLst>
-      <p:par>
-        <p:cTn id="1" dur="indefinite" restart="never" nodeType="tmRoot">
-          <p:childTnLst>
-            <p:seq concurrent="1" nextAc="seek">
-              <p:cTn id="2" dur="indefinite" nodeType="mainSeq">
-                <p:childTnLst>
-                  <p:par>
-                    <p:cTn id="3" fill="hold">
-                      <p:stCondLst>
-                        <p:cond delay="indefinite"/>
-                        <p:cond evt="onBegin" delay="0">
-                          <p:tn val="2"/>
-                        </p:cond>
-                      </p:stCondLst>
-                      <p:childTnLst>
-                        <p:par>
-                          <p:cTn id="4" fill="hold">
-                            <p:stCondLst>
-                              <p:cond delay="0"/>
-                            </p:stCondLst>
-                            <p:childTnLst>
-                              <p:par>
-                                <p:cTn id="5" presetID="16" presetClass="entr" presetSubtype="21" fill="hold" nodeType="withEffect">
-                                  <p:stCondLst>
-                                    <p:cond delay="0"/>
-                                  </p:stCondLst>
-                                  <p:childTnLst>
-                                    <p:set>
-                                      <p:cBhvr>
-                                        <p:cTn id="6" dur="1" fill="hold">
-                                          <p:stCondLst>
-                                            <p:cond delay="0"/>
-                                          </p:stCondLst>
-                                        </p:cTn>
-                                        <p:tgtEl>
-                                          <p:spTgt spid="14">
-                                            <p:txEl>
-                                              <p:pRg st="0" end="0"/>
-                                            </p:txEl>
-                                          </p:spTgt>
-                                        </p:tgtEl>
-                                        <p:attrNameLst>
-                                          <p:attrName>style.visibility</p:attrName>
-                                        </p:attrNameLst>
-                                      </p:cBhvr>
-                                      <p:to>
-                                        <p:strVal val="visible"/>
-                                      </p:to>
-                                    </p:set>
-                                    <p:animEffect transition="in" filter="barn(inVertical)">
-                                      <p:cBhvr>
-                                        <p:cTn id="7" dur="500"/>
-                                        <p:tgtEl>
-                                          <p:spTgt spid="14">
-                                            <p:txEl>
-                                              <p:pRg st="0" end="0"/>
-                                            </p:txEl>
-                                          </p:spTgt>
-                                        </p:tgtEl>
-                                      </p:cBhvr>
-                                    </p:animEffect>
-                                  </p:childTnLst>
-                                </p:cTn>
-                              </p:par>
-                            </p:childTnLst>
-                          </p:cTn>
-                        </p:par>
-                      </p:childTnLst>
-                    </p:cTn>
-                  </p:par>
-                  <p:par>
-                    <p:cTn id="8" fill="hold">
-                      <p:stCondLst>
-                        <p:cond delay="indefinite"/>
-                      </p:stCondLst>
-                      <p:childTnLst>
-                        <p:par>
-                          <p:cTn id="9" fill="hold">
-                            <p:stCondLst>
-                              <p:cond delay="0"/>
-                            </p:stCondLst>
-                            <p:childTnLst>
-                              <p:par>
-                                <p:cTn id="10" presetID="10" presetClass="entr" presetSubtype="0" fill="hold" nodeType="clickEffect">
-                                  <p:stCondLst>
-                                    <p:cond delay="0"/>
-                                  </p:stCondLst>
-                                  <p:childTnLst>
-                                    <p:set>
-                                      <p:cBhvr>
-                                        <p:cTn id="11" dur="1" fill="hold">
-                                          <p:stCondLst>
-                                            <p:cond delay="0"/>
-                                          </p:stCondLst>
-                                        </p:cTn>
-                                        <p:tgtEl>
-                                          <p:spTgt spid="6">
-                                            <p:txEl>
-                                              <p:pRg st="0" end="0"/>
-                                            </p:txEl>
-                                          </p:spTgt>
-                                        </p:tgtEl>
-                                        <p:attrNameLst>
-                                          <p:attrName>style.visibility</p:attrName>
-                                        </p:attrNameLst>
-                                      </p:cBhvr>
-                                      <p:to>
-                                        <p:strVal val="visible"/>
-                                      </p:to>
-                                    </p:set>
-                                    <p:animEffect transition="in" filter="fade">
-                                      <p:cBhvr>
-                                        <p:cTn id="12" dur="500"/>
-                                        <p:tgtEl>
-                                          <p:spTgt spid="6">
-                                            <p:txEl>
-                                              <p:pRg st="0" end="0"/>
-                                            </p:txEl>
-                                          </p:spTgt>
-                                        </p:tgtEl>
-                                      </p:cBhvr>
-                                    </p:animEffect>
-                                  </p:childTnLst>
-                                </p:cTn>
-                              </p:par>
-                            </p:childTnLst>
-                          </p:cTn>
-                        </p:par>
-                      </p:childTnLst>
-                    </p:cTn>
-                  </p:par>
-                </p:childTnLst>
-              </p:cTn>
-              <p:prevCondLst>
-                <p:cond evt="onPrev" delay="0">
-                  <p:tgtEl>
-                    <p:sldTgt/>
-                  </p:tgtEl>
-                </p:cond>
-              </p:prevCondLst>
-              <p:nextCondLst>
-                <p:cond evt="onNext" delay="0">
-                  <p:tgtEl>
-                    <p:sldTgt/>
-                  </p:tgtEl>
-                </p:cond>
-              </p:nextCondLst>
-            </p:seq>
-          </p:childTnLst>
-        </p:cTn>
-      </p:par>
-    </p:tnLst>
-  </p:timing>
-</p:sld>
-</file>
-
-<file path=ppt/slides/slide21.xml><?xml version="1.0" encoding="utf-8"?>
-<p:sld xmlns:a="http://schemas.openxmlformats.org/drawingml/2006/main" xmlns:r="http://schemas.openxmlformats.org/officeDocument/2006/relationships" xmlns:p="http://schemas.openxmlformats.org/presentationml/2006/main" showMasterSp="0">
-  <p:cSld>
-    <p:spTree>
-      <p:nvGrpSpPr>
-        <p:cNvPr id="1" name=""/>
-        <p:cNvGrpSpPr/>
-        <p:nvPr/>
-      </p:nvGrpSpPr>
-      <p:grpSpPr>
-        <a:xfrm>
-          <a:off x="0" y="0"/>
-          <a:ext cx="0" cy="0"/>
-          <a:chOff x="0" y="0"/>
-          <a:chExt cx="0" cy="0"/>
-        </a:xfrm>
-      </p:grpSpPr>
-      <p:sp>
-        <p:nvSpPr>
-          <p:cNvPr id="14" name="TextBox 13">
-            <a:extLst>
-              <a:ext uri="{FF2B5EF4-FFF2-40B4-BE49-F238E27FC236}">
-                <a16:creationId xmlns:a16="http://schemas.microsoft.com/office/drawing/2014/main" id="{32FB5582-0011-46BE-AA44-F3D8E0F0A8D3}"/>
-              </a:ext>
-            </a:extLst>
-          </p:cNvPr>
-          <p:cNvSpPr txBox="1"/>
-          <p:nvPr/>
-        </p:nvSpPr>
-        <p:spPr>
-          <a:xfrm>
-            <a:off x="1422300" y="1751617"/>
-            <a:ext cx="9347400" cy="3354765"/>
-          </a:xfrm>
-          <a:prstGeom prst="rect">
-            <a:avLst/>
-          </a:prstGeom>
-          <a:noFill/>
-        </p:spPr>
-        <p:txBody>
-          <a:bodyPr wrap="square" rtlCol="0">
-            <a:spAutoFit/>
-          </a:bodyPr>
-          <a:lstStyle/>
-          <a:p>
-            <a:r>
-              <a:rPr lang="en-US" sz="3200" dirty="0">
-                <a:solidFill>
-                  <a:srgbClr val="0685A9"/>
-                </a:solidFill>
-                <a:latin typeface="Bahnschrift SemiBold" panose="020B0502040204020203" pitchFamily="34" charset="0"/>
-                <a:cs typeface="Times New Roman" panose="02020603050405020304" pitchFamily="18" charset="0"/>
-              </a:rPr>
-              <a:t>Which of the following are disadvantages of using inheritance to provide Duck behavior?</a:t>
-            </a:r>
-          </a:p>
-          <a:p>
-            <a:endParaRPr lang="en-US" sz="3200" dirty="0">
-              <a:latin typeface="Bahnschrift SemiLight" panose="020B0502040204020203" pitchFamily="34" charset="0"/>
-              <a:cs typeface="Times New Roman" panose="02020603050405020304" pitchFamily="18" charset="0"/>
-            </a:endParaRPr>
-          </a:p>
-          <a:p>
-            <a:pPr marL="514350" indent="-514350">
-              <a:buAutoNum type="alphaUcPeriod"/>
-            </a:pPr>
-            <a:r>
-              <a:rPr lang="en-US" sz="2800" dirty="0">
-                <a:latin typeface="Bahnschrift SemiLight" panose="020B0502040204020203" pitchFamily="34" charset="0"/>
-                <a:cs typeface="Times New Roman" panose="02020603050405020304" pitchFamily="18" charset="0"/>
-              </a:rPr>
-              <a:t>Code is duplicated across subclasses.</a:t>
-            </a:r>
-          </a:p>
-          <a:p>
-            <a:pPr marL="514350" indent="-514350">
-              <a:buAutoNum type="alphaUcPeriod"/>
-            </a:pPr>
-            <a:r>
-              <a:rPr lang="en-US" sz="2800" dirty="0">
-                <a:latin typeface="Bahnschrift SemiLight" panose="020B0502040204020203" pitchFamily="34" charset="0"/>
-                <a:cs typeface="Times New Roman" panose="02020603050405020304" pitchFamily="18" charset="0"/>
-              </a:rPr>
-              <a:t>Runtime behavior changes are difficult.</a:t>
-            </a:r>
-          </a:p>
-          <a:p>
-            <a:pPr marL="514350" indent="-514350">
-              <a:buAutoNum type="alphaUcPeriod"/>
-            </a:pPr>
-            <a:r>
-              <a:rPr lang="en-US" sz="2800" dirty="0">
-                <a:latin typeface="Bahnschrift SemiLight" panose="020B0502040204020203" pitchFamily="34" charset="0"/>
-                <a:cs typeface="Times New Roman" panose="02020603050405020304" pitchFamily="18" charset="0"/>
-              </a:rPr>
-              <a:t>We can’t make ducks dance.</a:t>
-            </a:r>
-          </a:p>
-          <a:p>
-            <a:pPr marL="514350" indent="-514350">
-              <a:buAutoNum type="alphaUcPeriod"/>
-            </a:pPr>
-            <a:r>
-              <a:rPr lang="en-US" sz="2800" dirty="0">
-                <a:latin typeface="Bahnschrift SemiLight" panose="020B0502040204020203" pitchFamily="34" charset="0"/>
-                <a:cs typeface="Times New Roman" panose="02020603050405020304" pitchFamily="18" charset="0"/>
-              </a:rPr>
-              <a:t>Ducks can’t fly and quack at the same time</a:t>
-            </a:r>
-            <a:r>
-              <a:rPr lang="en-US" sz="3200" dirty="0">
-                <a:latin typeface="Bahnschrift SemiLight" panose="020B0502040204020203" pitchFamily="34" charset="0"/>
-                <a:cs typeface="Times New Roman" panose="02020603050405020304" pitchFamily="18" charset="0"/>
-              </a:rPr>
-              <a:t>.</a:t>
-            </a:r>
-            <a:endParaRPr lang="en-US" dirty="0">
-              <a:latin typeface="Bahnschrift SemiLight" panose="020B0502040204020203" pitchFamily="34" charset="0"/>
-            </a:endParaRPr>
-          </a:p>
-        </p:txBody>
-      </p:sp>
-      <p:sp>
-        <p:nvSpPr>
-          <p:cNvPr id="6" name="TextBox 5">
-            <a:extLst>
-              <a:ext uri="{FF2B5EF4-FFF2-40B4-BE49-F238E27FC236}">
-                <a16:creationId xmlns:a16="http://schemas.microsoft.com/office/drawing/2014/main" id="{9C449272-7E7C-476D-A23F-C90633536724}"/>
-              </a:ext>
-            </a:extLst>
-          </p:cNvPr>
-          <p:cNvSpPr txBox="1"/>
-          <p:nvPr/>
-        </p:nvSpPr>
-        <p:spPr>
-          <a:xfrm>
-            <a:off x="1942560" y="3633933"/>
-            <a:ext cx="8622108" cy="523220"/>
-          </a:xfrm>
-          <a:prstGeom prst="rect">
-            <a:avLst/>
-          </a:prstGeom>
-          <a:noFill/>
-        </p:spPr>
-        <p:txBody>
-          <a:bodyPr wrap="square" rtlCol="0">
-            <a:spAutoFit/>
-          </a:bodyPr>
-          <a:lstStyle/>
-          <a:p>
-            <a:r>
-              <a:rPr lang="en-US" sz="2800" dirty="0">
-                <a:solidFill>
-                  <a:srgbClr val="FF0000"/>
-                </a:solidFill>
-                <a:latin typeface="Bahnschrift SemiLight" panose="020B0502040204020203" pitchFamily="34" charset="0"/>
-                <a:cs typeface="Times New Roman" panose="02020603050405020304" pitchFamily="18" charset="0"/>
-              </a:rPr>
-              <a:t>Runtime behavior changes are difficult.</a:t>
-            </a:r>
-          </a:p>
-        </p:txBody>
-      </p:sp>
-    </p:spTree>
-    <p:extLst>
-      <p:ext uri="{BB962C8B-B14F-4D97-AF65-F5344CB8AC3E}">
-        <p14:creationId xmlns:p14="http://schemas.microsoft.com/office/powerpoint/2010/main" val="34744068"/>
       </p:ext>
     </p:extLst>
   </p:cSld>
@@ -8182,6 +8086,337 @@
       </p:grpSpPr>
       <p:sp>
         <p:nvSpPr>
+          <p:cNvPr id="14" name="TextBox 13">
+            <a:extLst>
+              <a:ext uri="{FF2B5EF4-FFF2-40B4-BE49-F238E27FC236}">
+                <a16:creationId xmlns:a16="http://schemas.microsoft.com/office/drawing/2014/main" id="{32FB5582-0011-46BE-AA44-F3D8E0F0A8D3}"/>
+              </a:ext>
+            </a:extLst>
+          </p:cNvPr>
+          <p:cNvSpPr txBox="1"/>
+          <p:nvPr/>
+        </p:nvSpPr>
+        <p:spPr>
+          <a:xfrm>
+            <a:off x="1422300" y="1751617"/>
+            <a:ext cx="9347400" cy="3354765"/>
+          </a:xfrm>
+          <a:prstGeom prst="rect">
+            <a:avLst/>
+          </a:prstGeom>
+          <a:noFill/>
+        </p:spPr>
+        <p:txBody>
+          <a:bodyPr wrap="square" rtlCol="0">
+            <a:spAutoFit/>
+          </a:bodyPr>
+          <a:lstStyle/>
+          <a:p>
+            <a:r>
+              <a:rPr lang="en-US" sz="3200" dirty="0">
+                <a:solidFill>
+                  <a:srgbClr val="0685A9"/>
+                </a:solidFill>
+                <a:latin typeface="Bahnschrift SemiBold" panose="020B0502040204020203" pitchFamily="34" charset="0"/>
+                <a:cs typeface="Times New Roman" panose="02020603050405020304" pitchFamily="18" charset="0"/>
+              </a:rPr>
+              <a:t>Which of the following are disadvantages of using inheritance to provide Duck behavior?</a:t>
+            </a:r>
+          </a:p>
+          <a:p>
+            <a:endParaRPr lang="en-US" sz="3200" dirty="0">
+              <a:latin typeface="Bahnschrift SemiLight" panose="020B0502040204020203" pitchFamily="34" charset="0"/>
+              <a:cs typeface="Times New Roman" panose="02020603050405020304" pitchFamily="18" charset="0"/>
+            </a:endParaRPr>
+          </a:p>
+          <a:p>
+            <a:pPr marL="514350" indent="-514350">
+              <a:buAutoNum type="alphaUcPeriod"/>
+            </a:pPr>
+            <a:r>
+              <a:rPr lang="en-US" sz="2800" dirty="0">
+                <a:latin typeface="Bahnschrift SemiLight" panose="020B0502040204020203" pitchFamily="34" charset="0"/>
+                <a:cs typeface="Times New Roman" panose="02020603050405020304" pitchFamily="18" charset="0"/>
+              </a:rPr>
+              <a:t>Code is duplicated across subclasses.</a:t>
+            </a:r>
+          </a:p>
+          <a:p>
+            <a:pPr marL="514350" indent="-514350">
+              <a:buAutoNum type="alphaUcPeriod"/>
+            </a:pPr>
+            <a:r>
+              <a:rPr lang="en-US" sz="2800" dirty="0">
+                <a:latin typeface="Bahnschrift SemiLight" panose="020B0502040204020203" pitchFamily="34" charset="0"/>
+                <a:cs typeface="Times New Roman" panose="02020603050405020304" pitchFamily="18" charset="0"/>
+              </a:rPr>
+              <a:t>Runtime behavior changes are difficult.</a:t>
+            </a:r>
+          </a:p>
+          <a:p>
+            <a:pPr marL="514350" indent="-514350">
+              <a:buAutoNum type="alphaUcPeriod"/>
+            </a:pPr>
+            <a:r>
+              <a:rPr lang="en-US" sz="2800" dirty="0">
+                <a:latin typeface="Bahnschrift SemiLight" panose="020B0502040204020203" pitchFamily="34" charset="0"/>
+                <a:cs typeface="Times New Roman" panose="02020603050405020304" pitchFamily="18" charset="0"/>
+              </a:rPr>
+              <a:t>We can’t make ducks dance.</a:t>
+            </a:r>
+          </a:p>
+          <a:p>
+            <a:pPr marL="514350" indent="-514350">
+              <a:buAutoNum type="alphaUcPeriod"/>
+            </a:pPr>
+            <a:r>
+              <a:rPr lang="en-US" sz="2800" dirty="0">
+                <a:latin typeface="Bahnschrift SemiLight" panose="020B0502040204020203" pitchFamily="34" charset="0"/>
+                <a:cs typeface="Times New Roman" panose="02020603050405020304" pitchFamily="18" charset="0"/>
+              </a:rPr>
+              <a:t>Ducks can’t fly and quack at the same time</a:t>
+            </a:r>
+            <a:r>
+              <a:rPr lang="en-US" sz="3200" dirty="0">
+                <a:latin typeface="Bahnschrift SemiLight" panose="020B0502040204020203" pitchFamily="34" charset="0"/>
+                <a:cs typeface="Times New Roman" panose="02020603050405020304" pitchFamily="18" charset="0"/>
+              </a:rPr>
+              <a:t>.</a:t>
+            </a:r>
+            <a:endParaRPr lang="en-US" dirty="0">
+              <a:latin typeface="Bahnschrift SemiLight" panose="020B0502040204020203" pitchFamily="34" charset="0"/>
+            </a:endParaRPr>
+          </a:p>
+        </p:txBody>
+      </p:sp>
+      <p:sp>
+        <p:nvSpPr>
+          <p:cNvPr id="6" name="TextBox 5">
+            <a:extLst>
+              <a:ext uri="{FF2B5EF4-FFF2-40B4-BE49-F238E27FC236}">
+                <a16:creationId xmlns:a16="http://schemas.microsoft.com/office/drawing/2014/main" id="{9C449272-7E7C-476D-A23F-C90633536724}"/>
+              </a:ext>
+            </a:extLst>
+          </p:cNvPr>
+          <p:cNvSpPr txBox="1"/>
+          <p:nvPr/>
+        </p:nvSpPr>
+        <p:spPr>
+          <a:xfrm>
+            <a:off x="1942560" y="3633933"/>
+            <a:ext cx="8622108" cy="523220"/>
+          </a:xfrm>
+          <a:prstGeom prst="rect">
+            <a:avLst/>
+          </a:prstGeom>
+          <a:noFill/>
+        </p:spPr>
+        <p:txBody>
+          <a:bodyPr wrap="square" rtlCol="0">
+            <a:spAutoFit/>
+          </a:bodyPr>
+          <a:lstStyle/>
+          <a:p>
+            <a:r>
+              <a:rPr lang="en-US" sz="2800" dirty="0">
+                <a:solidFill>
+                  <a:srgbClr val="FF0000"/>
+                </a:solidFill>
+                <a:latin typeface="Bahnschrift SemiLight" panose="020B0502040204020203" pitchFamily="34" charset="0"/>
+                <a:cs typeface="Times New Roman" panose="02020603050405020304" pitchFamily="18" charset="0"/>
+              </a:rPr>
+              <a:t>Runtime behavior changes are difficult.</a:t>
+            </a:r>
+          </a:p>
+        </p:txBody>
+      </p:sp>
+    </p:spTree>
+    <p:extLst>
+      <p:ext uri="{BB962C8B-B14F-4D97-AF65-F5344CB8AC3E}">
+        <p14:creationId xmlns:p14="http://schemas.microsoft.com/office/powerpoint/2010/main" val="34744068"/>
+      </p:ext>
+    </p:extLst>
+  </p:cSld>
+  <p:clrMapOvr>
+    <a:masterClrMapping/>
+  </p:clrMapOvr>
+  <p:timing>
+    <p:tnLst>
+      <p:par>
+        <p:cTn id="1" dur="indefinite" restart="never" nodeType="tmRoot">
+          <p:childTnLst>
+            <p:seq concurrent="1" nextAc="seek">
+              <p:cTn id="2" dur="indefinite" nodeType="mainSeq">
+                <p:childTnLst>
+                  <p:par>
+                    <p:cTn id="3" fill="hold">
+                      <p:stCondLst>
+                        <p:cond delay="indefinite"/>
+                        <p:cond evt="onBegin" delay="0">
+                          <p:tn val="2"/>
+                        </p:cond>
+                      </p:stCondLst>
+                      <p:childTnLst>
+                        <p:par>
+                          <p:cTn id="4" fill="hold">
+                            <p:stCondLst>
+                              <p:cond delay="0"/>
+                            </p:stCondLst>
+                            <p:childTnLst>
+                              <p:par>
+                                <p:cTn id="5" presetID="16" presetClass="entr" presetSubtype="21" fill="hold" nodeType="withEffect">
+                                  <p:stCondLst>
+                                    <p:cond delay="0"/>
+                                  </p:stCondLst>
+                                  <p:childTnLst>
+                                    <p:set>
+                                      <p:cBhvr>
+                                        <p:cTn id="6" dur="1" fill="hold">
+                                          <p:stCondLst>
+                                            <p:cond delay="0"/>
+                                          </p:stCondLst>
+                                        </p:cTn>
+                                        <p:tgtEl>
+                                          <p:spTgt spid="14">
+                                            <p:txEl>
+                                              <p:pRg st="0" end="0"/>
+                                            </p:txEl>
+                                          </p:spTgt>
+                                        </p:tgtEl>
+                                        <p:attrNameLst>
+                                          <p:attrName>style.visibility</p:attrName>
+                                        </p:attrNameLst>
+                                      </p:cBhvr>
+                                      <p:to>
+                                        <p:strVal val="visible"/>
+                                      </p:to>
+                                    </p:set>
+                                    <p:animEffect transition="in" filter="barn(inVertical)">
+                                      <p:cBhvr>
+                                        <p:cTn id="7" dur="500"/>
+                                        <p:tgtEl>
+                                          <p:spTgt spid="14">
+                                            <p:txEl>
+                                              <p:pRg st="0" end="0"/>
+                                            </p:txEl>
+                                          </p:spTgt>
+                                        </p:tgtEl>
+                                      </p:cBhvr>
+                                    </p:animEffect>
+                                  </p:childTnLst>
+                                </p:cTn>
+                              </p:par>
+                            </p:childTnLst>
+                          </p:cTn>
+                        </p:par>
+                      </p:childTnLst>
+                    </p:cTn>
+                  </p:par>
+                  <p:par>
+                    <p:cTn id="8" fill="hold">
+                      <p:stCondLst>
+                        <p:cond delay="indefinite"/>
+                      </p:stCondLst>
+                      <p:childTnLst>
+                        <p:par>
+                          <p:cTn id="9" fill="hold">
+                            <p:stCondLst>
+                              <p:cond delay="0"/>
+                            </p:stCondLst>
+                            <p:childTnLst>
+                              <p:par>
+                                <p:cTn id="10" presetID="10" presetClass="entr" presetSubtype="0" fill="hold" nodeType="clickEffect">
+                                  <p:stCondLst>
+                                    <p:cond delay="0"/>
+                                  </p:stCondLst>
+                                  <p:childTnLst>
+                                    <p:set>
+                                      <p:cBhvr>
+                                        <p:cTn id="11" dur="1" fill="hold">
+                                          <p:stCondLst>
+                                            <p:cond delay="0"/>
+                                          </p:stCondLst>
+                                        </p:cTn>
+                                        <p:tgtEl>
+                                          <p:spTgt spid="6">
+                                            <p:txEl>
+                                              <p:pRg st="0" end="0"/>
+                                            </p:txEl>
+                                          </p:spTgt>
+                                        </p:tgtEl>
+                                        <p:attrNameLst>
+                                          <p:attrName>style.visibility</p:attrName>
+                                        </p:attrNameLst>
+                                      </p:cBhvr>
+                                      <p:to>
+                                        <p:strVal val="visible"/>
+                                      </p:to>
+                                    </p:set>
+                                    <p:animEffect transition="in" filter="fade">
+                                      <p:cBhvr>
+                                        <p:cTn id="12" dur="500"/>
+                                        <p:tgtEl>
+                                          <p:spTgt spid="6">
+                                            <p:txEl>
+                                              <p:pRg st="0" end="0"/>
+                                            </p:txEl>
+                                          </p:spTgt>
+                                        </p:tgtEl>
+                                      </p:cBhvr>
+                                    </p:animEffect>
+                                  </p:childTnLst>
+                                </p:cTn>
+                              </p:par>
+                            </p:childTnLst>
+                          </p:cTn>
+                        </p:par>
+                      </p:childTnLst>
+                    </p:cTn>
+                  </p:par>
+                </p:childTnLst>
+              </p:cTn>
+              <p:prevCondLst>
+                <p:cond evt="onPrev" delay="0">
+                  <p:tgtEl>
+                    <p:sldTgt/>
+                  </p:tgtEl>
+                </p:cond>
+              </p:prevCondLst>
+              <p:nextCondLst>
+                <p:cond evt="onNext" delay="0">
+                  <p:tgtEl>
+                    <p:sldTgt/>
+                  </p:tgtEl>
+                </p:cond>
+              </p:nextCondLst>
+            </p:seq>
+          </p:childTnLst>
+        </p:cTn>
+      </p:par>
+    </p:tnLst>
+  </p:timing>
+</p:sld>
+</file>
+
+<file path=ppt/slides/slide23.xml><?xml version="1.0" encoding="utf-8"?>
+<p:sld xmlns:a="http://schemas.openxmlformats.org/drawingml/2006/main" xmlns:r="http://schemas.openxmlformats.org/officeDocument/2006/relationships" xmlns:p="http://schemas.openxmlformats.org/presentationml/2006/main" showMasterSp="0">
+  <p:cSld>
+    <p:spTree>
+      <p:nvGrpSpPr>
+        <p:cNvPr id="1" name=""/>
+        <p:cNvGrpSpPr/>
+        <p:nvPr/>
+      </p:nvGrpSpPr>
+      <p:grpSpPr>
+        <a:xfrm>
+          <a:off x="0" y="0"/>
+          <a:ext cx="0" cy="0"/>
+          <a:chOff x="0" y="0"/>
+          <a:chExt cx="0" cy="0"/>
+        </a:xfrm>
+      </p:grpSpPr>
+      <p:sp>
+        <p:nvSpPr>
           <p:cNvPr id="12" name="TextBox 11">
             <a:extLst>
               <a:ext uri="{FF2B5EF4-FFF2-40B4-BE49-F238E27FC236}">
@@ -8208,6 +8443,7 @@
           </a:bodyPr>
           <a:lstStyle/>
           <a:p>
+            <a:pPr algn="ctr"/>
             <a:r>
               <a:rPr lang="en-US" sz="3200" dirty="0">
                 <a:solidFill>
@@ -9174,9 +9410,9 @@
           <p:nvPr/>
         </p:nvCxnSpPr>
         <p:spPr>
-          <a:xfrm>
-            <a:off x="6096000" y="2649068"/>
-            <a:ext cx="7376" cy="1214283"/>
+          <a:xfrm flipH="1">
+            <a:off x="6094221" y="2649068"/>
+            <a:ext cx="1779" cy="1528579"/>
           </a:xfrm>
           <a:prstGeom prst="straightConnector1">
             <a:avLst/>
@@ -9221,8 +9457,8 @@
         </p:nvCxnSpPr>
         <p:spPr>
           <a:xfrm flipH="1">
-            <a:off x="3500282" y="2649068"/>
-            <a:ext cx="2595718" cy="1214283"/>
+            <a:off x="3491127" y="2649068"/>
+            <a:ext cx="2604873" cy="1528579"/>
           </a:xfrm>
           <a:prstGeom prst="straightConnector1">
             <a:avLst/>
@@ -9268,7 +9504,7 @@
         <p:spPr>
           <a:xfrm>
             <a:off x="6096000" y="2649068"/>
-            <a:ext cx="2615383" cy="1214283"/>
+            <a:ext cx="2606228" cy="1528579"/>
           </a:xfrm>
           <a:prstGeom prst="straightConnector1">
             <a:avLst/>
@@ -9309,7 +9545,7 @@
         </p:nvSpPr>
         <p:spPr>
           <a:xfrm>
-            <a:off x="2694039" y="3863351"/>
+            <a:off x="2684884" y="4177647"/>
             <a:ext cx="1612485" cy="1081548"/>
           </a:xfrm>
           <a:prstGeom prst="roundRect">
@@ -9379,7 +9615,7 @@
         </p:nvSpPr>
         <p:spPr>
           <a:xfrm>
-            <a:off x="7905140" y="3863351"/>
+            <a:off x="7895985" y="4177647"/>
             <a:ext cx="1612485" cy="1081548"/>
           </a:xfrm>
           <a:prstGeom prst="roundRect">
@@ -9482,7 +9718,7 @@
         </p:nvSpPr>
         <p:spPr>
           <a:xfrm>
-            <a:off x="5297133" y="3863351"/>
+            <a:off x="5287978" y="4177647"/>
             <a:ext cx="1612485" cy="1081548"/>
           </a:xfrm>
           <a:prstGeom prst="roundRect">
@@ -9534,138 +9770,6 @@
                 <a:latin typeface="Keep Calm Med" pitchFamily="2" charset="0"/>
               </a:rPr>
               <a:t>Structural pattern</a:t>
-            </a:r>
-          </a:p>
-        </p:txBody>
-      </p:sp>
-      <p:sp>
-        <p:nvSpPr>
-          <p:cNvPr id="21" name="TextBox 20">
-            <a:extLst>
-              <a:ext uri="{FF2B5EF4-FFF2-40B4-BE49-F238E27FC236}">
-                <a16:creationId xmlns:a16="http://schemas.microsoft.com/office/drawing/2014/main" id="{7ACB2E50-FA1C-4EA4-9DD0-4A310956006A}"/>
-              </a:ext>
-            </a:extLst>
-          </p:cNvPr>
-          <p:cNvSpPr txBox="1"/>
-          <p:nvPr/>
-        </p:nvSpPr>
-        <p:spPr>
-          <a:xfrm>
-            <a:off x="2448232" y="5057527"/>
-            <a:ext cx="2104098" cy="738664"/>
-          </a:xfrm>
-          <a:prstGeom prst="rect">
-            <a:avLst/>
-          </a:prstGeom>
-          <a:noFill/>
-        </p:spPr>
-        <p:txBody>
-          <a:bodyPr wrap="square" rtlCol="0">
-            <a:spAutoFit/>
-          </a:bodyPr>
-          <a:lstStyle/>
-          <a:p>
-            <a:pPr algn="ctr"/>
-            <a:r>
-              <a:rPr lang="en-US" sz="1400" dirty="0" err="1">
-                <a:latin typeface="Indie Flower" panose="02000000000000000000" pitchFamily="2" charset="0"/>
-              </a:rPr>
-              <a:t>E.g</a:t>
-            </a:r>
-            <a:r>
-              <a:rPr lang="en-US" sz="1400" dirty="0">
-                <a:latin typeface="Indie Flower" panose="02000000000000000000" pitchFamily="2" charset="0"/>
-              </a:rPr>
-              <a:t>: Abstract Factory, Factory Method, Singleton,.. </a:t>
-            </a:r>
-          </a:p>
-        </p:txBody>
-      </p:sp>
-      <p:sp>
-        <p:nvSpPr>
-          <p:cNvPr id="22" name="TextBox 21">
-            <a:extLst>
-              <a:ext uri="{FF2B5EF4-FFF2-40B4-BE49-F238E27FC236}">
-                <a16:creationId xmlns:a16="http://schemas.microsoft.com/office/drawing/2014/main" id="{E19D2C3C-7133-4BA1-B0F7-46A8CCB08273}"/>
-              </a:ext>
-            </a:extLst>
-          </p:cNvPr>
-          <p:cNvSpPr txBox="1"/>
-          <p:nvPr/>
-        </p:nvSpPr>
-        <p:spPr>
-          <a:xfrm>
-            <a:off x="5397910" y="5043223"/>
-            <a:ext cx="1415845" cy="738664"/>
-          </a:xfrm>
-          <a:prstGeom prst="rect">
-            <a:avLst/>
-          </a:prstGeom>
-          <a:noFill/>
-        </p:spPr>
-        <p:txBody>
-          <a:bodyPr wrap="square" rtlCol="0">
-            <a:spAutoFit/>
-          </a:bodyPr>
-          <a:lstStyle/>
-          <a:p>
-            <a:pPr algn="ctr"/>
-            <a:r>
-              <a:rPr lang="en-US" sz="1400" dirty="0" err="1">
-                <a:latin typeface="Indie Flower" panose="02000000000000000000" pitchFamily="2" charset="0"/>
-              </a:rPr>
-              <a:t>E.g</a:t>
-            </a:r>
-            <a:r>
-              <a:rPr lang="en-US" sz="1400" dirty="0">
-                <a:latin typeface="Indie Flower" panose="02000000000000000000" pitchFamily="2" charset="0"/>
-              </a:rPr>
-              <a:t>: Adapter, Bridge, Composite,..</a:t>
-            </a:r>
-          </a:p>
-        </p:txBody>
-      </p:sp>
-      <p:sp>
-        <p:nvSpPr>
-          <p:cNvPr id="23" name="TextBox 22">
-            <a:extLst>
-              <a:ext uri="{FF2B5EF4-FFF2-40B4-BE49-F238E27FC236}">
-                <a16:creationId xmlns:a16="http://schemas.microsoft.com/office/drawing/2014/main" id="{490BEBF3-D814-4756-BBA9-A26C20498DA4}"/>
-              </a:ext>
-            </a:extLst>
-          </p:cNvPr>
-          <p:cNvSpPr txBox="1"/>
-          <p:nvPr/>
-        </p:nvSpPr>
-        <p:spPr>
-          <a:xfrm>
-            <a:off x="8042787" y="5043223"/>
-            <a:ext cx="1415845" cy="738664"/>
-          </a:xfrm>
-          <a:prstGeom prst="rect">
-            <a:avLst/>
-          </a:prstGeom>
-          <a:noFill/>
-        </p:spPr>
-        <p:txBody>
-          <a:bodyPr wrap="square" rtlCol="0">
-            <a:spAutoFit/>
-          </a:bodyPr>
-          <a:lstStyle/>
-          <a:p>
-            <a:pPr algn="ctr"/>
-            <a:r>
-              <a:rPr lang="en-US" sz="1400" dirty="0" err="1">
-                <a:latin typeface="Indie Flower" panose="02000000000000000000" pitchFamily="2" charset="0"/>
-              </a:rPr>
-              <a:t>E.g</a:t>
-            </a:r>
-            <a:r>
-              <a:rPr lang="en-US" sz="1400" dirty="0">
-                <a:latin typeface="Indie Flower" panose="02000000000000000000" pitchFamily="2" charset="0"/>
-              </a:rPr>
-              <a:t>: Interpreter, Template Method,...</a:t>
             </a:r>
           </a:p>
         </p:txBody>
@@ -9929,7 +10033,7 @@
                             </p:stCondLst>
                             <p:childTnLst>
                               <p:par>
-                                <p:cTn id="18" presetID="10" presetClass="entr" presetSubtype="0" fill="hold" grpId="0" nodeType="clickEffect">
+                                <p:cTn id="18" presetID="10" presetClass="entr" presetSubtype="0" fill="hold" nodeType="clickEffect">
                                   <p:stCondLst>
                                     <p:cond delay="0"/>
                                   </p:stCondLst>
@@ -9937,59 +10041,6 @@
                                     <p:set>
                                       <p:cBhvr>
                                         <p:cTn id="19" dur="1" fill="hold">
-                                          <p:stCondLst>
-                                            <p:cond delay="0"/>
-                                          </p:stCondLst>
-                                        </p:cTn>
-                                        <p:tgtEl>
-                                          <p:spTgt spid="21"/>
-                                        </p:tgtEl>
-                                        <p:attrNameLst>
-                                          <p:attrName>style.visibility</p:attrName>
-                                        </p:attrNameLst>
-                                      </p:cBhvr>
-                                      <p:to>
-                                        <p:strVal val="visible"/>
-                                      </p:to>
-                                    </p:set>
-                                    <p:animEffect transition="in" filter="fade">
-                                      <p:cBhvr>
-                                        <p:cTn id="20" dur="500"/>
-                                        <p:tgtEl>
-                                          <p:spTgt spid="21"/>
-                                        </p:tgtEl>
-                                      </p:cBhvr>
-                                    </p:animEffect>
-                                  </p:childTnLst>
-                                </p:cTn>
-                              </p:par>
-                            </p:childTnLst>
-                          </p:cTn>
-                        </p:par>
-                      </p:childTnLst>
-                    </p:cTn>
-                  </p:par>
-                  <p:par>
-                    <p:cTn id="21" fill="hold">
-                      <p:stCondLst>
-                        <p:cond delay="indefinite"/>
-                      </p:stCondLst>
-                      <p:childTnLst>
-                        <p:par>
-                          <p:cTn id="22" fill="hold">
-                            <p:stCondLst>
-                              <p:cond delay="0"/>
-                            </p:stCondLst>
-                            <p:childTnLst>
-                              <p:par>
-                                <p:cTn id="23" presetID="10" presetClass="entr" presetSubtype="0" fill="hold" nodeType="clickEffect">
-                                  <p:stCondLst>
-                                    <p:cond delay="0"/>
-                                  </p:stCondLst>
-                                  <p:childTnLst>
-                                    <p:set>
-                                      <p:cBhvr>
-                                        <p:cTn id="24" dur="1" fill="hold">
                                           <p:stCondLst>
                                             <p:cond delay="0"/>
                                           </p:stCondLst>
@@ -10007,7 +10058,7 @@
                                     </p:set>
                                     <p:animEffect transition="in" filter="fade">
                                       <p:cBhvr>
-                                        <p:cTn id="25" dur="500"/>
+                                        <p:cTn id="20" dur="500"/>
                                         <p:tgtEl>
                                           <p:spTgt spid="15"/>
                                         </p:tgtEl>
@@ -10017,14 +10068,14 @@
                                 </p:cTn>
                               </p:par>
                               <p:par>
-                                <p:cTn id="26" presetID="10" presetClass="entr" presetSubtype="0" fill="hold" grpId="0" nodeType="withEffect">
+                                <p:cTn id="21" presetID="10" presetClass="entr" presetSubtype="0" fill="hold" grpId="0" nodeType="withEffect">
                                   <p:stCondLst>
                                     <p:cond delay="0"/>
                                   </p:stCondLst>
                                   <p:childTnLst>
                                     <p:set>
                                       <p:cBhvr>
-                                        <p:cTn id="27" dur="1" fill="hold">
+                                        <p:cTn id="22" dur="1" fill="hold">
                                           <p:stCondLst>
                                             <p:cond delay="0"/>
                                           </p:stCondLst>
@@ -10042,7 +10093,7 @@
                                     </p:set>
                                     <p:animEffect transition="in" filter="fade">
                                       <p:cBhvr>
-                                        <p:cTn id="28" dur="500"/>
+                                        <p:cTn id="23" dur="500"/>
                                         <p:tgtEl>
                                           <p:spTgt spid="20"/>
                                         </p:tgtEl>
@@ -10058,79 +10109,26 @@
                     </p:cTn>
                   </p:par>
                   <p:par>
-                    <p:cTn id="29" fill="hold">
+                    <p:cTn id="24" fill="hold">
                       <p:stCondLst>
                         <p:cond delay="indefinite"/>
                       </p:stCondLst>
                       <p:childTnLst>
                         <p:par>
-                          <p:cTn id="30" fill="hold">
+                          <p:cTn id="25" fill="hold">
                             <p:stCondLst>
                               <p:cond delay="0"/>
                             </p:stCondLst>
                             <p:childTnLst>
                               <p:par>
-                                <p:cTn id="31" presetID="10" presetClass="entr" presetSubtype="0" fill="hold" grpId="0" nodeType="clickEffect">
+                                <p:cTn id="26" presetID="10" presetClass="entr" presetSubtype="0" fill="hold" nodeType="clickEffect">
                                   <p:stCondLst>
                                     <p:cond delay="0"/>
                                   </p:stCondLst>
                                   <p:childTnLst>
                                     <p:set>
                                       <p:cBhvr>
-                                        <p:cTn id="32" dur="1" fill="hold">
-                                          <p:stCondLst>
-                                            <p:cond delay="0"/>
-                                          </p:stCondLst>
-                                        </p:cTn>
-                                        <p:tgtEl>
-                                          <p:spTgt spid="22"/>
-                                        </p:tgtEl>
-                                        <p:attrNameLst>
-                                          <p:attrName>style.visibility</p:attrName>
-                                        </p:attrNameLst>
-                                      </p:cBhvr>
-                                      <p:to>
-                                        <p:strVal val="visible"/>
-                                      </p:to>
-                                    </p:set>
-                                    <p:animEffect transition="in" filter="fade">
-                                      <p:cBhvr>
-                                        <p:cTn id="33" dur="500"/>
-                                        <p:tgtEl>
-                                          <p:spTgt spid="22"/>
-                                        </p:tgtEl>
-                                      </p:cBhvr>
-                                    </p:animEffect>
-                                  </p:childTnLst>
-                                </p:cTn>
-                              </p:par>
-                            </p:childTnLst>
-                          </p:cTn>
-                        </p:par>
-                      </p:childTnLst>
-                    </p:cTn>
-                  </p:par>
-                  <p:par>
-                    <p:cTn id="34" fill="hold">
-                      <p:stCondLst>
-                        <p:cond delay="indefinite"/>
-                      </p:stCondLst>
-                      <p:childTnLst>
-                        <p:par>
-                          <p:cTn id="35" fill="hold">
-                            <p:stCondLst>
-                              <p:cond delay="0"/>
-                            </p:stCondLst>
-                            <p:childTnLst>
-                              <p:par>
-                                <p:cTn id="36" presetID="10" presetClass="entr" presetSubtype="0" fill="hold" nodeType="clickEffect">
-                                  <p:stCondLst>
-                                    <p:cond delay="0"/>
-                                  </p:stCondLst>
-                                  <p:childTnLst>
-                                    <p:set>
-                                      <p:cBhvr>
-                                        <p:cTn id="37" dur="1" fill="hold">
+                                        <p:cTn id="27" dur="1" fill="hold">
                                           <p:stCondLst>
                                             <p:cond delay="0"/>
                                           </p:stCondLst>
@@ -10148,7 +10146,7 @@
                                     </p:set>
                                     <p:animEffect transition="in" filter="fade">
                                       <p:cBhvr>
-                                        <p:cTn id="38" dur="500"/>
+                                        <p:cTn id="28" dur="500"/>
                                         <p:tgtEl>
                                           <p:spTgt spid="17"/>
                                         </p:tgtEl>
@@ -10158,14 +10156,14 @@
                                 </p:cTn>
                               </p:par>
                               <p:par>
-                                <p:cTn id="39" presetID="10" presetClass="entr" presetSubtype="0" fill="hold" grpId="0" nodeType="withEffect">
+                                <p:cTn id="29" presetID="10" presetClass="entr" presetSubtype="0" fill="hold" grpId="0" nodeType="withEffect">
                                   <p:stCondLst>
                                     <p:cond delay="0"/>
                                   </p:stCondLst>
                                   <p:childTnLst>
                                     <p:set>
                                       <p:cBhvr>
-                                        <p:cTn id="40" dur="1" fill="hold">
+                                        <p:cTn id="30" dur="1" fill="hold">
                                           <p:stCondLst>
                                             <p:cond delay="0"/>
                                           </p:stCondLst>
@@ -10183,7 +10181,7 @@
                                     </p:set>
                                     <p:animEffect transition="in" filter="fade">
                                       <p:cBhvr>
-                                        <p:cTn id="41" dur="500"/>
+                                        <p:cTn id="31" dur="500"/>
                                         <p:tgtEl>
                                           <p:spTgt spid="19"/>
                                         </p:tgtEl>
@@ -10199,79 +10197,26 @@
                     </p:cTn>
                   </p:par>
                   <p:par>
-                    <p:cTn id="42" fill="hold">
+                    <p:cTn id="32" fill="hold">
                       <p:stCondLst>
                         <p:cond delay="indefinite"/>
                       </p:stCondLst>
                       <p:childTnLst>
                         <p:par>
-                          <p:cTn id="43" fill="hold">
+                          <p:cTn id="33" fill="hold">
                             <p:stCondLst>
                               <p:cond delay="0"/>
                             </p:stCondLst>
                             <p:childTnLst>
                               <p:par>
-                                <p:cTn id="44" presetID="10" presetClass="entr" presetSubtype="0" fill="hold" grpId="0" nodeType="clickEffect">
+                                <p:cTn id="34" presetID="42" presetClass="entr" presetSubtype="0" fill="hold" grpId="0" nodeType="clickEffect">
                                   <p:stCondLst>
                                     <p:cond delay="0"/>
                                   </p:stCondLst>
                                   <p:childTnLst>
                                     <p:set>
                                       <p:cBhvr>
-                                        <p:cTn id="45" dur="1" fill="hold">
-                                          <p:stCondLst>
-                                            <p:cond delay="0"/>
-                                          </p:stCondLst>
-                                        </p:cTn>
-                                        <p:tgtEl>
-                                          <p:spTgt spid="23"/>
-                                        </p:tgtEl>
-                                        <p:attrNameLst>
-                                          <p:attrName>style.visibility</p:attrName>
-                                        </p:attrNameLst>
-                                      </p:cBhvr>
-                                      <p:to>
-                                        <p:strVal val="visible"/>
-                                      </p:to>
-                                    </p:set>
-                                    <p:animEffect transition="in" filter="fade">
-                                      <p:cBhvr>
-                                        <p:cTn id="46" dur="500"/>
-                                        <p:tgtEl>
-                                          <p:spTgt spid="23"/>
-                                        </p:tgtEl>
-                                      </p:cBhvr>
-                                    </p:animEffect>
-                                  </p:childTnLst>
-                                </p:cTn>
-                              </p:par>
-                            </p:childTnLst>
-                          </p:cTn>
-                        </p:par>
-                      </p:childTnLst>
-                    </p:cTn>
-                  </p:par>
-                  <p:par>
-                    <p:cTn id="47" fill="hold">
-                      <p:stCondLst>
-                        <p:cond delay="indefinite"/>
-                      </p:stCondLst>
-                      <p:childTnLst>
-                        <p:par>
-                          <p:cTn id="48" fill="hold">
-                            <p:stCondLst>
-                              <p:cond delay="0"/>
-                            </p:stCondLst>
-                            <p:childTnLst>
-                              <p:par>
-                                <p:cTn id="49" presetID="42" presetClass="entr" presetSubtype="0" fill="hold" grpId="0" nodeType="clickEffect">
-                                  <p:stCondLst>
-                                    <p:cond delay="0"/>
-                                  </p:stCondLst>
-                                  <p:childTnLst>
-                                    <p:set>
-                                      <p:cBhvr>
-                                        <p:cTn id="50" dur="1" fill="hold">
+                                        <p:cTn id="35" dur="1" fill="hold">
                                           <p:stCondLst>
                                             <p:cond delay="0"/>
                                           </p:stCondLst>
@@ -10289,7 +10234,7 @@
                                     </p:set>
                                     <p:animEffect transition="in" filter="fade">
                                       <p:cBhvr>
-                                        <p:cTn id="51" dur="600"/>
+                                        <p:cTn id="36" dur="600"/>
                                         <p:tgtEl>
                                           <p:spTgt spid="24"/>
                                         </p:tgtEl>
@@ -10297,7 +10242,7 @@
                                     </p:animEffect>
                                     <p:anim calcmode="lin" valueType="num">
                                       <p:cBhvr>
-                                        <p:cTn id="52" dur="600" fill="hold"/>
+                                        <p:cTn id="37" dur="600" fill="hold"/>
                                         <p:tgtEl>
                                           <p:spTgt spid="24"/>
                                         </p:tgtEl>
@@ -10320,7 +10265,7 @@
                                     </p:anim>
                                     <p:anim calcmode="lin" valueType="num">
                                       <p:cBhvr>
-                                        <p:cTn id="53" dur="600" fill="hold"/>
+                                        <p:cTn id="38" dur="600" fill="hold"/>
                                         <p:tgtEl>
                                           <p:spTgt spid="24"/>
                                         </p:tgtEl>
@@ -10376,9 +10321,6 @@
       <p:bldP spid="18" grpId="0" animBg="1"/>
       <p:bldP spid="19" grpId="0" animBg="1"/>
       <p:bldP spid="20" grpId="0" animBg="1"/>
-      <p:bldP spid="21" grpId="0"/>
-      <p:bldP spid="22" grpId="0"/>
-      <p:bldP spid="23" grpId="0"/>
       <p:bldP spid="24" grpId="0"/>
     </p:bldLst>
   </p:timing>
@@ -10386,6 +10328,437 @@
 </file>
 
 <file path=ppt/slides/slide4.xml><?xml version="1.0" encoding="utf-8"?>
+<p:sld xmlns:a="http://schemas.openxmlformats.org/drawingml/2006/main" xmlns:r="http://schemas.openxmlformats.org/officeDocument/2006/relationships" xmlns:p="http://schemas.openxmlformats.org/presentationml/2006/main" showMasterSp="0">
+  <p:cSld>
+    <p:spTree>
+      <p:nvGrpSpPr>
+        <p:cNvPr id="1" name=""/>
+        <p:cNvGrpSpPr/>
+        <p:nvPr/>
+      </p:nvGrpSpPr>
+      <p:grpSpPr>
+        <a:xfrm>
+          <a:off x="0" y="0"/>
+          <a:ext cx="0" cy="0"/>
+          <a:chOff x="0" y="0"/>
+          <a:chExt cx="0" cy="0"/>
+        </a:xfrm>
+      </p:grpSpPr>
+      <p:sp>
+        <p:nvSpPr>
+          <p:cNvPr id="6" name="Title 5">
+            <a:extLst>
+              <a:ext uri="{FF2B5EF4-FFF2-40B4-BE49-F238E27FC236}">
+                <a16:creationId xmlns:a16="http://schemas.microsoft.com/office/drawing/2014/main" id="{5DB504B7-A9DA-42C6-8EFE-9C90D39C86B7}"/>
+              </a:ext>
+            </a:extLst>
+          </p:cNvPr>
+          <p:cNvSpPr>
+            <a:spLocks noGrp="1"/>
+          </p:cNvSpPr>
+          <p:nvPr>
+            <p:ph type="title"/>
+          </p:nvPr>
+        </p:nvSpPr>
+        <p:spPr>
+          <a:xfrm>
+            <a:off x="1024128" y="342621"/>
+            <a:ext cx="9720072" cy="1499616"/>
+          </a:xfrm>
+        </p:spPr>
+        <p:txBody>
+          <a:bodyPr>
+            <a:normAutofit/>
+          </a:bodyPr>
+          <a:lstStyle/>
+          <a:p>
+            <a:pPr algn="ctr"/>
+            <a:r>
+              <a:rPr lang="en-US" sz="6000" dirty="0">
+                <a:latin typeface="Aharoni" panose="02010803020104030203" pitchFamily="2" charset="-79"/>
+                <a:cs typeface="Aharoni" panose="02010803020104030203" pitchFamily="2" charset="-79"/>
+              </a:rPr>
+              <a:t>Strategy pattern</a:t>
+            </a:r>
+          </a:p>
+        </p:txBody>
+      </p:sp>
+      <p:sp>
+        <p:nvSpPr>
+          <p:cNvPr id="4" name="TextBox 3">
+            <a:extLst>
+              <a:ext uri="{FF2B5EF4-FFF2-40B4-BE49-F238E27FC236}">
+                <a16:creationId xmlns:a16="http://schemas.microsoft.com/office/drawing/2014/main" id="{4F618712-6F1B-4CFC-A1DE-B3C1736A1042}"/>
+              </a:ext>
+            </a:extLst>
+          </p:cNvPr>
+          <p:cNvSpPr txBox="1"/>
+          <p:nvPr/>
+        </p:nvSpPr>
+        <p:spPr>
+          <a:xfrm>
+            <a:off x="1788603" y="2243474"/>
+            <a:ext cx="8442075" cy="3470181"/>
+          </a:xfrm>
+          <a:prstGeom prst="rect">
+            <a:avLst/>
+          </a:prstGeom>
+          <a:noFill/>
+        </p:spPr>
+        <p:txBody>
+          <a:bodyPr wrap="square" rtlCol="0">
+            <a:spAutoFit/>
+          </a:bodyPr>
+          <a:lstStyle/>
+          <a:p>
+            <a:pPr algn="just">
+              <a:spcBef>
+                <a:spcPts val="300"/>
+              </a:spcBef>
+            </a:pPr>
+            <a:r>
+              <a:rPr lang="en-US" sz="3500" dirty="0">
+                <a:solidFill>
+                  <a:schemeClr val="accent2"/>
+                </a:solidFill>
+                <a:latin typeface="Aharoni" panose="02010803020104030203" pitchFamily="2" charset="-79"/>
+                <a:ea typeface="Verdana" panose="020B0604030504040204" pitchFamily="34" charset="0"/>
+                <a:cs typeface="Aharoni" panose="02010803020104030203" pitchFamily="2" charset="-79"/>
+              </a:rPr>
+              <a:t>Origin:</a:t>
+            </a:r>
+            <a:r>
+              <a:rPr lang="en-US" sz="3500" dirty="0">
+                <a:solidFill>
+                  <a:schemeClr val="accent2"/>
+                </a:solidFill>
+                <a:latin typeface="Bahnschrift SemiLight" panose="020B0502040204020203" pitchFamily="34" charset="0"/>
+                <a:ea typeface="Verdana" panose="020B0604030504040204" pitchFamily="34" charset="0"/>
+                <a:cs typeface="Helvetica" panose="020B0604020202020204" pitchFamily="34" charset="0"/>
+              </a:rPr>
+              <a:t>  </a:t>
+            </a:r>
+            <a:r>
+              <a:rPr lang="en-US" sz="4000" dirty="0">
+                <a:solidFill>
+                  <a:schemeClr val="accent2"/>
+                </a:solidFill>
+                <a:latin typeface="Bahnschrift SemiLight" panose="020B0502040204020203" pitchFamily="34" charset="0"/>
+                <a:ea typeface="Verdana" panose="020B0604030504040204" pitchFamily="34" charset="0"/>
+                <a:cs typeface="Helvetica" panose="020B0604020202020204" pitchFamily="34" charset="0"/>
+              </a:rPr>
+              <a:t>	</a:t>
+            </a:r>
+            <a:r>
+              <a:rPr lang="en-US" sz="2200" dirty="0">
+                <a:latin typeface="Bahnschrift SemiLight" panose="020B0502040204020203" pitchFamily="34" charset="0"/>
+                <a:ea typeface="Verdana" panose="020B0604030504040204" pitchFamily="34" charset="0"/>
+                <a:cs typeface="Helvetica" panose="020B0604020202020204" pitchFamily="34" charset="0"/>
+              </a:rPr>
+              <a:t>the Strategy Pattern is known as a </a:t>
+            </a:r>
+            <a:r>
+              <a:rPr lang="en-US" sz="2200" b="1" dirty="0">
+                <a:solidFill>
+                  <a:schemeClr val="accent2">
+                    <a:lumMod val="75000"/>
+                  </a:schemeClr>
+                </a:solidFill>
+                <a:latin typeface="Bahnschrift SemiLight" panose="020B0502040204020203" pitchFamily="34" charset="0"/>
+                <a:ea typeface="Verdana" panose="020B0604030504040204" pitchFamily="34" charset="0"/>
+                <a:cs typeface="Helvetica" panose="020B0604020202020204" pitchFamily="34" charset="0"/>
+              </a:rPr>
+              <a:t>behavioral</a:t>
+            </a:r>
+            <a:r>
+              <a:rPr lang="en-US" sz="2200" dirty="0">
+                <a:latin typeface="Bahnschrift SemiLight" panose="020B0502040204020203" pitchFamily="34" charset="0"/>
+                <a:ea typeface="Verdana" panose="020B0604030504040204" pitchFamily="34" charset="0"/>
+                <a:cs typeface="Helvetica" panose="020B0604020202020204" pitchFamily="34" charset="0"/>
+              </a:rPr>
+              <a:t> 						pattern and is used to manage algorithms, 							relationships </a:t>
+            </a:r>
+            <a:r>
+              <a:rPr lang="en-US" sz="2200">
+                <a:latin typeface="Bahnschrift SemiLight" panose="020B0502040204020203" pitchFamily="34" charset="0"/>
+                <a:ea typeface="Verdana" panose="020B0604030504040204" pitchFamily="34" charset="0"/>
+                <a:cs typeface="Helvetica" panose="020B0604020202020204" pitchFamily="34" charset="0"/>
+              </a:rPr>
+              <a:t>and responsibilities </a:t>
+            </a:r>
+            <a:r>
+              <a:rPr lang="en-US" sz="2200" dirty="0">
+                <a:latin typeface="Bahnschrift SemiLight" panose="020B0502040204020203" pitchFamily="34" charset="0"/>
+                <a:ea typeface="Verdana" panose="020B0604030504040204" pitchFamily="34" charset="0"/>
+                <a:cs typeface="Helvetica" panose="020B0604020202020204" pitchFamily="34" charset="0"/>
+              </a:rPr>
+              <a:t>between objects</a:t>
+            </a:r>
+            <a:endParaRPr lang="en-US" sz="2200" dirty="0">
+              <a:solidFill>
+                <a:schemeClr val="accent2"/>
+              </a:solidFill>
+              <a:latin typeface="Aharoni" panose="02010803020104030203" pitchFamily="2" charset="-79"/>
+              <a:ea typeface="Verdana" panose="020B0604030504040204" pitchFamily="34" charset="0"/>
+              <a:cs typeface="Aharoni" panose="02010803020104030203" pitchFamily="2" charset="-79"/>
+            </a:endParaRPr>
+          </a:p>
+          <a:p>
+            <a:pPr algn="just">
+              <a:spcBef>
+                <a:spcPts val="300"/>
+              </a:spcBef>
+            </a:pPr>
+            <a:endParaRPr lang="en-US" sz="500" dirty="0">
+              <a:solidFill>
+                <a:schemeClr val="accent2"/>
+              </a:solidFill>
+              <a:latin typeface="Aharoni" panose="02010803020104030203" pitchFamily="2" charset="-79"/>
+              <a:ea typeface="Verdana" panose="020B0604030504040204" pitchFamily="34" charset="0"/>
+              <a:cs typeface="Aharoni" panose="02010803020104030203" pitchFamily="2" charset="-79"/>
+            </a:endParaRPr>
+          </a:p>
+          <a:p>
+            <a:pPr algn="just">
+              <a:spcBef>
+                <a:spcPts val="300"/>
+              </a:spcBef>
+            </a:pPr>
+            <a:r>
+              <a:rPr lang="en-US" sz="2500">
+                <a:solidFill>
+                  <a:schemeClr val="accent2"/>
+                </a:solidFill>
+                <a:latin typeface="Aharoni" panose="02010803020104030203" pitchFamily="2" charset="-79"/>
+                <a:ea typeface="Verdana" panose="020B0604030504040204" pitchFamily="34" charset="0"/>
+                <a:cs typeface="Aharoni" panose="02010803020104030203" pitchFamily="2" charset="-79"/>
+              </a:rPr>
+              <a:t>Definition</a:t>
+            </a:r>
+            <a:r>
+              <a:rPr lang="en-US" sz="3500">
+                <a:solidFill>
+                  <a:schemeClr val="accent2"/>
+                </a:solidFill>
+                <a:latin typeface="Aharoni" panose="02010803020104030203" pitchFamily="2" charset="-79"/>
+                <a:ea typeface="Verdana" panose="020B0604030504040204" pitchFamily="34" charset="0"/>
+                <a:cs typeface="Aharoni" panose="02010803020104030203" pitchFamily="2" charset="-79"/>
+              </a:rPr>
+              <a:t>:</a:t>
+            </a:r>
+            <a:r>
+              <a:rPr lang="en-US" sz="3500">
+                <a:solidFill>
+                  <a:schemeClr val="accent2"/>
+                </a:solidFill>
+                <a:latin typeface="Bahnschrift SemiLight" panose="020B0502040204020203" pitchFamily="34" charset="0"/>
+                <a:ea typeface="Verdana" panose="020B0604030504040204" pitchFamily="34" charset="0"/>
+                <a:cs typeface="Helvetica" panose="020B0604020202020204" pitchFamily="34" charset="0"/>
+              </a:rPr>
+              <a:t>  </a:t>
+            </a:r>
+            <a:r>
+              <a:rPr lang="en-US" sz="2800" dirty="0">
+                <a:solidFill>
+                  <a:schemeClr val="accent2"/>
+                </a:solidFill>
+                <a:latin typeface="Bahnschrift SemiLight" panose="020B0502040204020203" pitchFamily="34" charset="0"/>
+                <a:ea typeface="Verdana" panose="020B0604030504040204" pitchFamily="34" charset="0"/>
+                <a:cs typeface="Helvetica" panose="020B0604020202020204" pitchFamily="34" charset="0"/>
+              </a:rPr>
+              <a:t>	</a:t>
+            </a:r>
+            <a:r>
+              <a:rPr lang="en-US" sz="2200" dirty="0">
+                <a:latin typeface="Bahnschrift SemiLight" panose="020B0502040204020203" pitchFamily="34" charset="0"/>
+                <a:ea typeface="Verdana" panose="020B0604030504040204" pitchFamily="34" charset="0"/>
+                <a:cs typeface="Helvetica" panose="020B0604020202020204" pitchFamily="34" charset="0"/>
+              </a:rPr>
+              <a:t>defines a family of algorithms</a:t>
+            </a:r>
+            <a:r>
+              <a:rPr lang="en-US" sz="2200">
+                <a:latin typeface="Bahnschrift SemiLight" panose="020B0502040204020203" pitchFamily="34" charset="0"/>
+                <a:ea typeface="Verdana" panose="020B0604030504040204" pitchFamily="34" charset="0"/>
+                <a:cs typeface="Helvetica" panose="020B0604020202020204" pitchFamily="34" charset="0"/>
+              </a:rPr>
+              <a:t>, envelop </a:t>
+            </a:r>
+            <a:r>
+              <a:rPr lang="en-US" sz="2200" dirty="0">
+                <a:latin typeface="Bahnschrift SemiLight" panose="020B0502040204020203" pitchFamily="34" charset="0"/>
+                <a:ea typeface="Verdana" panose="020B0604030504040204" pitchFamily="34" charset="0"/>
+                <a:cs typeface="Helvetica" panose="020B0604020202020204" pitchFamily="34" charset="0"/>
+              </a:rPr>
+              <a:t>each 			</a:t>
+            </a:r>
+            <a:r>
+              <a:rPr lang="en-US" sz="2200">
+                <a:latin typeface="Bahnschrift SemiLight" panose="020B0502040204020203" pitchFamily="34" charset="0"/>
+                <a:ea typeface="Verdana" panose="020B0604030504040204" pitchFamily="34" charset="0"/>
+                <a:cs typeface="Helvetica" panose="020B0604020202020204" pitchFamily="34" charset="0"/>
+              </a:rPr>
+              <a:t>				one, </a:t>
+            </a:r>
+            <a:r>
+              <a:rPr lang="en-US" sz="2200" dirty="0">
+                <a:latin typeface="Bahnschrift SemiLight" panose="020B0502040204020203" pitchFamily="34" charset="0"/>
+                <a:ea typeface="Verdana" panose="020B0604030504040204" pitchFamily="34" charset="0"/>
+                <a:cs typeface="Helvetica" panose="020B0604020202020204" pitchFamily="34" charset="0"/>
+              </a:rPr>
+              <a:t>and makes </a:t>
+            </a:r>
+            <a:r>
+              <a:rPr lang="en-US" sz="2200">
+                <a:latin typeface="Bahnschrift SemiLight" panose="020B0502040204020203" pitchFamily="34" charset="0"/>
+                <a:ea typeface="Verdana" panose="020B0604030504040204" pitchFamily="34" charset="0"/>
+                <a:cs typeface="Helvetica" panose="020B0604020202020204" pitchFamily="34" charset="0"/>
+              </a:rPr>
+              <a:t>them exchangable </a:t>
+            </a:r>
+            <a:r>
+              <a:rPr lang="en-US" sz="2200" dirty="0">
+                <a:latin typeface="Bahnschrift SemiLight" panose="020B0502040204020203" pitchFamily="34" charset="0"/>
+                <a:ea typeface="Verdana" panose="020B0604030504040204" pitchFamily="34" charset="0"/>
+                <a:cs typeface="Helvetica" panose="020B0604020202020204" pitchFamily="34" charset="0"/>
+              </a:rPr>
+              <a:t>within 		</a:t>
+            </a:r>
+            <a:r>
+              <a:rPr lang="en-US" sz="2200">
+                <a:latin typeface="Bahnschrift SemiLight" panose="020B0502040204020203" pitchFamily="34" charset="0"/>
+                <a:ea typeface="Verdana" panose="020B0604030504040204" pitchFamily="34" charset="0"/>
+                <a:cs typeface="Helvetica" panose="020B0604020202020204" pitchFamily="34" charset="0"/>
+              </a:rPr>
+              <a:t>					that family</a:t>
+            </a:r>
+            <a:r>
+              <a:rPr lang="en-US" sz="1500">
+                <a:latin typeface="Bahnschrift SemiLight" panose="020B0502040204020203" pitchFamily="34" charset="0"/>
+                <a:ea typeface="Verdana" panose="020B0604030504040204" pitchFamily="34" charset="0"/>
+                <a:cs typeface="Helvetica" panose="020B0604020202020204" pitchFamily="34" charset="0"/>
+              </a:rPr>
+              <a:t> </a:t>
+            </a:r>
+          </a:p>
+          <a:p>
+            <a:pPr algn="just">
+              <a:spcBef>
+                <a:spcPts val="300"/>
+              </a:spcBef>
+            </a:pPr>
+            <a:r>
+              <a:rPr lang="en-US" sz="2200">
+                <a:latin typeface="Bahnschrift SemiLight" panose="020B0502040204020203" pitchFamily="34" charset="0"/>
+                <a:ea typeface="Verdana" panose="020B0604030504040204" pitchFamily="34" charset="0"/>
+                <a:cs typeface="Helvetica" panose="020B0604020202020204" pitchFamily="34" charset="0"/>
+              </a:rPr>
+              <a:t>				strategy </a:t>
+            </a:r>
+            <a:r>
+              <a:rPr lang="en-US" sz="2200" dirty="0">
+                <a:latin typeface="Bahnschrift SemiLight" panose="020B0502040204020203" pitchFamily="34" charset="0"/>
+                <a:ea typeface="Verdana" panose="020B0604030504040204" pitchFamily="34" charset="0"/>
+                <a:cs typeface="Helvetica" panose="020B0604020202020204" pitchFamily="34" charset="0"/>
+              </a:rPr>
+              <a:t>lets the algorithm </a:t>
+            </a:r>
+            <a:r>
+              <a:rPr lang="en-US" sz="2200">
+                <a:latin typeface="Bahnschrift SemiLight" panose="020B0502040204020203" pitchFamily="34" charset="0"/>
+                <a:ea typeface="Verdana" panose="020B0604030504040204" pitchFamily="34" charset="0"/>
+                <a:cs typeface="Helvetica" panose="020B0604020202020204" pitchFamily="34" charset="0"/>
+              </a:rPr>
+              <a:t>vary independently from 					clients </a:t>
+            </a:r>
+            <a:r>
+              <a:rPr lang="en-US" sz="2200" dirty="0">
+                <a:latin typeface="Bahnschrift SemiLight" panose="020B0502040204020203" pitchFamily="34" charset="0"/>
+                <a:ea typeface="Verdana" panose="020B0604030504040204" pitchFamily="34" charset="0"/>
+                <a:cs typeface="Helvetica" panose="020B0604020202020204" pitchFamily="34" charset="0"/>
+              </a:rPr>
+              <a:t>who use it</a:t>
+            </a:r>
+          </a:p>
+        </p:txBody>
+      </p:sp>
+      <p:sp>
+        <p:nvSpPr>
+          <p:cNvPr id="5" name="TextBox 4">
+            <a:extLst>
+              <a:ext uri="{FF2B5EF4-FFF2-40B4-BE49-F238E27FC236}">
+                <a16:creationId xmlns:a16="http://schemas.microsoft.com/office/drawing/2014/main" id="{1EBF2545-6B9D-4EF2-B0FE-99E0D6D3A927}"/>
+              </a:ext>
+            </a:extLst>
+          </p:cNvPr>
+          <p:cNvSpPr txBox="1"/>
+          <p:nvPr/>
+        </p:nvSpPr>
+        <p:spPr>
+          <a:xfrm>
+            <a:off x="1675002" y="1381700"/>
+            <a:ext cx="8841996" cy="861774"/>
+          </a:xfrm>
+          <a:prstGeom prst="rect">
+            <a:avLst/>
+          </a:prstGeom>
+          <a:noFill/>
+        </p:spPr>
+        <p:txBody>
+          <a:bodyPr wrap="square" rtlCol="0">
+            <a:spAutoFit/>
+          </a:bodyPr>
+          <a:lstStyle/>
+          <a:p>
+            <a:pPr algn="ctr">
+              <a:spcBef>
+                <a:spcPts val="300"/>
+              </a:spcBef>
+            </a:pPr>
+            <a:r>
+              <a:rPr lang="en-US" sz="5000">
+                <a:solidFill>
+                  <a:schemeClr val="accent2"/>
+                </a:solidFill>
+                <a:latin typeface="Aharoni" panose="02010803020104030203" pitchFamily="2" charset="-79"/>
+                <a:ea typeface="Verdana" panose="020B0604030504040204" pitchFamily="34" charset="0"/>
+                <a:cs typeface="Aharoni" panose="02010803020104030203" pitchFamily="2" charset="-79"/>
+              </a:rPr>
+              <a:t>•</a:t>
+            </a:r>
+            <a:r>
+              <a:rPr lang="en-US" sz="4000">
+                <a:solidFill>
+                  <a:schemeClr val="accent2"/>
+                </a:solidFill>
+                <a:latin typeface="Bahnschrift SemiLight" panose="020B0502040204020203" pitchFamily="34" charset="0"/>
+                <a:ea typeface="Verdana" panose="020B0604030504040204" pitchFamily="34" charset="0"/>
+                <a:cs typeface="Helvetica" panose="020B0604020202020204" pitchFamily="34" charset="0"/>
+              </a:rPr>
+              <a:t>	</a:t>
+            </a:r>
+            <a:endParaRPr lang="en-US" sz="2200">
+              <a:latin typeface="Bahnschrift SemiLight" panose="020B0502040204020203" pitchFamily="34" charset="0"/>
+              <a:ea typeface="Verdana" panose="020B0604030504040204" pitchFamily="34" charset="0"/>
+              <a:cs typeface="Helvetica" panose="020B0604020202020204" pitchFamily="34" charset="0"/>
+            </a:endParaRPr>
+          </a:p>
+        </p:txBody>
+      </p:sp>
+    </p:spTree>
+    <p:extLst>
+      <p:ext uri="{BB962C8B-B14F-4D97-AF65-F5344CB8AC3E}">
+        <p14:creationId xmlns:p14="http://schemas.microsoft.com/office/powerpoint/2010/main" val="2088408451"/>
+      </p:ext>
+    </p:extLst>
+  </p:cSld>
+  <p:clrMapOvr>
+    <a:masterClrMapping/>
+  </p:clrMapOvr>
+</p:sld>
+</file>
+
+<file path=ppt/slides/slide5.xml><?xml version="1.0" encoding="utf-8"?>
 <p:sld xmlns:a="http://schemas.openxmlformats.org/drawingml/2006/main" xmlns:r="http://schemas.openxmlformats.org/officeDocument/2006/relationships" xmlns:p="http://schemas.openxmlformats.org/presentationml/2006/main" showMasterSp="0">
   <p:cSld>
     <p:spTree>
@@ -10600,7 +10973,7 @@
 </p:sld>
 </file>
 
-<file path=ppt/slides/slide5.xml><?xml version="1.0" encoding="utf-8"?>
+<file path=ppt/slides/slide6.xml><?xml version="1.0" encoding="utf-8"?>
 <p:sld xmlns:a="http://schemas.openxmlformats.org/drawingml/2006/main" xmlns:r="http://schemas.openxmlformats.org/officeDocument/2006/relationships" xmlns:p="http://schemas.openxmlformats.org/presentationml/2006/main" showMasterSp="0">
   <p:cSld>
     <p:bg>
@@ -10686,7 +11059,7 @@
             <a:pPr algn="ctr"/>
             <a:r>
               <a:rPr lang="en-US">
-                <a:latin typeface="Indie Flower" panose="02000000000000000000" pitchFamily="2" charset="0"/>
+                <a:latin typeface="Indie Flower" panose="02000000000000000000"/>
                 <a:cs typeface="Helvetica" panose="020B0604020202020204" pitchFamily="34" charset="0"/>
               </a:rPr>
               <a:t>Lots of other types</a:t>
@@ -10696,7 +11069,7 @@
             <a:pPr algn="ctr"/>
             <a:r>
               <a:rPr lang="en-US">
-                <a:latin typeface="Indie Flower" panose="02000000000000000000" pitchFamily="2" charset="0"/>
+                <a:latin typeface="Indie Flower" panose="02000000000000000000"/>
                 <a:cs typeface="Helvetica" panose="020B0604020202020204" pitchFamily="34" charset="0"/>
               </a:rPr>
               <a:t>of duck inherit from</a:t>
@@ -10706,7 +11079,7 @@
             <a:pPr algn="ctr"/>
             <a:r>
               <a:rPr lang="en-US">
-                <a:latin typeface="Indie Flower" panose="02000000000000000000" pitchFamily="2" charset="0"/>
+                <a:latin typeface="Indie Flower" panose="02000000000000000000"/>
                 <a:cs typeface="Helvetica" panose="020B0604020202020204" pitchFamily="34" charset="0"/>
               </a:rPr>
               <a:t>the Duck class</a:t>
@@ -10776,7 +11149,7 @@
 </p:sld>
 </file>
 
-<file path=ppt/slides/slide6.xml><?xml version="1.0" encoding="utf-8"?>
+<file path=ppt/slides/slide7.xml><?xml version="1.0" encoding="utf-8"?>
 <p:sld xmlns:a="http://schemas.openxmlformats.org/drawingml/2006/main" xmlns:r="http://schemas.openxmlformats.org/officeDocument/2006/relationships" xmlns:p="http://schemas.openxmlformats.org/presentationml/2006/main" showMasterSp="0">
   <p:cSld>
     <p:bg>
@@ -11011,7 +11384,7 @@
 </p:sld>
 </file>
 
-<file path=ppt/slides/slide7.xml><?xml version="1.0" encoding="utf-8"?>
+<file path=ppt/slides/slide8.xml><?xml version="1.0" encoding="utf-8"?>
 <p:sld xmlns:a="http://schemas.openxmlformats.org/drawingml/2006/main" xmlns:r="http://schemas.openxmlformats.org/officeDocument/2006/relationships" xmlns:p="http://schemas.openxmlformats.org/presentationml/2006/main" showMasterSp="0">
   <p:cSld>
     <p:bg>
@@ -11315,7 +11688,7 @@
 </p:sld>
 </file>
 
-<file path=ppt/slides/slide8.xml><?xml version="1.0" encoding="utf-8"?>
+<file path=ppt/slides/slide9.xml><?xml version="1.0" encoding="utf-8"?>
 <p:sld xmlns:a="http://schemas.openxmlformats.org/drawingml/2006/main" xmlns:r="http://schemas.openxmlformats.org/officeDocument/2006/relationships" xmlns:p="http://schemas.openxmlformats.org/presentationml/2006/main" showMasterSp="0">
   <p:cSld>
     <p:bg>
@@ -11549,123 +11922,6 @@
     <p:extLst>
       <p:ext uri="{BB962C8B-B14F-4D97-AF65-F5344CB8AC3E}">
         <p14:creationId xmlns:p14="http://schemas.microsoft.com/office/powerpoint/2010/main" val="112266801"/>
-      </p:ext>
-    </p:extLst>
-  </p:cSld>
-  <p:clrMapOvr>
-    <a:masterClrMapping/>
-  </p:clrMapOvr>
-</p:sld>
-</file>
-
-<file path=ppt/slides/slide9.xml><?xml version="1.0" encoding="utf-8"?>
-<p:sld xmlns:a="http://schemas.openxmlformats.org/drawingml/2006/main" xmlns:r="http://schemas.openxmlformats.org/officeDocument/2006/relationships" xmlns:p="http://schemas.openxmlformats.org/presentationml/2006/main" showMasterSp="0">
-  <p:cSld>
-    <p:bg>
-      <p:bgPr>
-        <a:solidFill>
-          <a:schemeClr val="bg1"/>
-        </a:solidFill>
-        <a:effectLst/>
-      </p:bgPr>
-    </p:bg>
-    <p:spTree>
-      <p:nvGrpSpPr>
-        <p:cNvPr id="1" name=""/>
-        <p:cNvGrpSpPr/>
-        <p:nvPr/>
-      </p:nvGrpSpPr>
-      <p:grpSpPr>
-        <a:xfrm>
-          <a:off x="0" y="0"/>
-          <a:ext cx="0" cy="0"/>
-          <a:chOff x="0" y="0"/>
-          <a:chExt cx="0" cy="0"/>
-        </a:xfrm>
-      </p:grpSpPr>
-      <p:sp>
-        <p:nvSpPr>
-          <p:cNvPr id="8" name="TextBox 7">
-            <a:extLst>
-              <a:ext uri="{FF2B5EF4-FFF2-40B4-BE49-F238E27FC236}">
-                <a16:creationId xmlns:a16="http://schemas.microsoft.com/office/drawing/2014/main" id="{27D439ED-754F-41BB-B4DE-AB32597D52D0}"/>
-              </a:ext>
-            </a:extLst>
-          </p:cNvPr>
-          <p:cNvSpPr txBox="1"/>
-          <p:nvPr/>
-        </p:nvSpPr>
-        <p:spPr>
-          <a:xfrm>
-            <a:off x="913001" y="383563"/>
-            <a:ext cx="9883585" cy="784830"/>
-          </a:xfrm>
-          <a:prstGeom prst="rect">
-            <a:avLst/>
-          </a:prstGeom>
-          <a:noFill/>
-        </p:spPr>
-        <p:txBody>
-          <a:bodyPr wrap="square" rtlCol="0">
-            <a:spAutoFit/>
-          </a:bodyPr>
-          <a:lstStyle/>
-          <a:p>
-            <a:pPr algn="ctr">
-              <a:spcBef>
-                <a:spcPts val="300"/>
-              </a:spcBef>
-            </a:pPr>
-            <a:r>
-              <a:rPr lang="en-US" sz="4500">
-                <a:solidFill>
-                  <a:schemeClr val="accent4">
-                    <a:lumMod val="50000"/>
-                  </a:schemeClr>
-                </a:solidFill>
-                <a:latin typeface="Aharoni" panose="02010803020104030203" pitchFamily="2" charset="-79"/>
-                <a:ea typeface="Verdana" panose="020B0604030504040204" pitchFamily="34" charset="0"/>
-                <a:cs typeface="Aharoni" panose="02010803020104030203" pitchFamily="2" charset="-79"/>
-              </a:rPr>
-              <a:t>what about an interface?</a:t>
-            </a:r>
-          </a:p>
-        </p:txBody>
-      </p:sp>
-      <p:pic>
-        <p:nvPicPr>
-          <p:cNvPr id="7" name="Picture 6">
-            <a:extLst>
-              <a:ext uri="{FF2B5EF4-FFF2-40B4-BE49-F238E27FC236}">
-                <a16:creationId xmlns:a16="http://schemas.microsoft.com/office/drawing/2014/main" id="{6F580011-23E0-4AB8-B47A-D91E58A0418F}"/>
-              </a:ext>
-            </a:extLst>
-          </p:cNvPr>
-          <p:cNvPicPr>
-            <a:picLocks noChangeAspect="1"/>
-          </p:cNvPicPr>
-          <p:nvPr/>
-        </p:nvPicPr>
-        <p:blipFill>
-          <a:blip r:embed="rId2"/>
-          <a:stretch>
-            <a:fillRect/>
-          </a:stretch>
-        </p:blipFill>
-        <p:spPr>
-          <a:xfrm>
-            <a:off x="2408075" y="1391585"/>
-            <a:ext cx="7375849" cy="4477078"/>
-          </a:xfrm>
-          <a:prstGeom prst="rect">
-            <a:avLst/>
-          </a:prstGeom>
-        </p:spPr>
-      </p:pic>
-    </p:spTree>
-    <p:extLst>
-      <p:ext uri="{BB962C8B-B14F-4D97-AF65-F5344CB8AC3E}">
-        <p14:creationId xmlns:p14="http://schemas.microsoft.com/office/powerpoint/2010/main" val="3156013238"/>
       </p:ext>
     </p:extLst>
   </p:cSld>

</xml_diff>

<commit_message>
hoàn thành slide StrategyPattern
</commit_message>
<xml_diff>
--- a/seminar/StrategyPattern.pptx
+++ b/seminar/StrategyPattern.pptx
@@ -2,31 +2,35 @@
 <file path=ppt/presentation.xml><?xml version="1.0" encoding="utf-8"?>
 <p:presentation xmlns:a="http://schemas.openxmlformats.org/drawingml/2006/main" xmlns:r="http://schemas.openxmlformats.org/officeDocument/2006/relationships" xmlns:p="http://schemas.openxmlformats.org/presentationml/2006/main" autoCompressPictures="0">
   <p:sldMasterIdLst>
-    <p:sldMasterId id="2147483674" r:id="rId1"/>
+    <p:sldMasterId id="2147483722" r:id="rId1"/>
   </p:sldMasterIdLst>
   <p:sldIdLst>
     <p:sldId id="256" r:id="rId2"/>
     <p:sldId id="278" r:id="rId3"/>
     <p:sldId id="271" r:id="rId4"/>
-    <p:sldId id="263" r:id="rId5"/>
-    <p:sldId id="259" r:id="rId6"/>
-    <p:sldId id="265" r:id="rId7"/>
-    <p:sldId id="266" r:id="rId8"/>
-    <p:sldId id="268" r:id="rId9"/>
-    <p:sldId id="267" r:id="rId10"/>
-    <p:sldId id="269" r:id="rId11"/>
-    <p:sldId id="262" r:id="rId12"/>
+    <p:sldId id="262" r:id="rId5"/>
+    <p:sldId id="263" r:id="rId6"/>
+    <p:sldId id="259" r:id="rId7"/>
+    <p:sldId id="265" r:id="rId8"/>
+    <p:sldId id="266" r:id="rId9"/>
+    <p:sldId id="268" r:id="rId10"/>
+    <p:sldId id="267" r:id="rId11"/>
+    <p:sldId id="269" r:id="rId12"/>
     <p:sldId id="264" r:id="rId13"/>
     <p:sldId id="280" r:id="rId14"/>
     <p:sldId id="282" r:id="rId15"/>
-    <p:sldId id="270" r:id="rId16"/>
-    <p:sldId id="272" r:id="rId17"/>
-    <p:sldId id="273" r:id="rId18"/>
-    <p:sldId id="274" r:id="rId19"/>
-    <p:sldId id="284" r:id="rId20"/>
-    <p:sldId id="279" r:id="rId21"/>
-    <p:sldId id="283" r:id="rId22"/>
-    <p:sldId id="275" r:id="rId23"/>
+    <p:sldId id="287" r:id="rId16"/>
+    <p:sldId id="270" r:id="rId17"/>
+    <p:sldId id="285" r:id="rId18"/>
+    <p:sldId id="272" r:id="rId19"/>
+    <p:sldId id="273" r:id="rId20"/>
+    <p:sldId id="274" r:id="rId21"/>
+    <p:sldId id="284" r:id="rId22"/>
+    <p:sldId id="289" r:id="rId23"/>
+    <p:sldId id="283" r:id="rId24"/>
+    <p:sldId id="275" r:id="rId25"/>
+    <p:sldId id="288" r:id="rId26"/>
+    <p:sldId id="286" r:id="rId27"/>
   </p:sldIdLst>
   <p:sldSz cx="12192000" cy="6858000"/>
   <p:notesSz cx="6858000" cy="9144000"/>
@@ -131,6 +135,32 @@
     </p:ext>
   </p:extLst>
 </p:presentation>
+</file>
+
+<file path=ppt/commentAuthors.xml><?xml version="1.0" encoding="utf-8"?>
+<p:cmAuthorLst xmlns:a="http://schemas.openxmlformats.org/drawingml/2006/main" xmlns:r="http://schemas.openxmlformats.org/officeDocument/2006/relationships" xmlns:p="http://schemas.openxmlformats.org/presentationml/2006/main">
+  <p:cmAuthor id="1" name="TRƯƠNG THÚY QUYÊN" initials="TTQ" lastIdx="1" clrIdx="0">
+    <p:extLst>
+      <p:ext uri="{19B8F6BF-5375-455C-9EA6-DF929625EA0E}">
+        <p15:presenceInfo xmlns:p15="http://schemas.microsoft.com/office/powerpoint/2012/main" userId="TRƯƠNG THÚY QUYÊN" providerId="None"/>
+      </p:ext>
+    </p:extLst>
+  </p:cmAuthor>
+</p:cmAuthorLst>
+</file>
+
+<file path=ppt/comments/comment1.xml><?xml version="1.0" encoding="utf-8"?>
+<p:cmLst xmlns:a="http://schemas.openxmlformats.org/drawingml/2006/main" xmlns:r="http://schemas.openxmlformats.org/officeDocument/2006/relationships" xmlns:p="http://schemas.openxmlformats.org/presentationml/2006/main">
+  <p:cm authorId="1" dt="2019-12-08T10:46:34.194" idx="1">
+    <p:pos x="10" y="10"/>
+    <p:text/>
+    <p:extLst>
+      <p:ext uri="{C676402C-5697-4E1C-873F-D02D1690AC5C}">
+        <p15:threadingInfo xmlns:p15="http://schemas.microsoft.com/office/powerpoint/2012/main" timeZoneBias="-420"/>
+      </p:ext>
+    </p:extLst>
+  </p:cm>
+</p:cmLst>
 </file>
 
 <file path=ppt/ink/ink1.xml><?xml version="1.0" encoding="utf-8"?>
@@ -408,7 +438,7 @@
             <a:fld id="{96DFF08F-DC6B-4601-B491-B0F83F6DD2DA}" type="datetimeFigureOut">
               <a:rPr lang="en-US" smtClean="0"/>
               <a:pPr/>
-              <a:t>12/1/2019</a:t>
+              <a:t>12/8/2019</a:t>
             </a:fld>
             <a:endParaRPr lang="en-US" dirty="0"/>
           </a:p>
@@ -494,7 +524,7 @@
     </p:spTree>
     <p:extLst>
       <p:ext uri="{BB962C8B-B14F-4D97-AF65-F5344CB8AC3E}">
-        <p14:creationId xmlns:p14="http://schemas.microsoft.com/office/powerpoint/2010/main" val="847521186"/>
+        <p14:creationId xmlns:p14="http://schemas.microsoft.com/office/powerpoint/2010/main" val="3909701945"/>
       </p:ext>
     </p:extLst>
   </p:cSld>
@@ -613,7 +643,7 @@
           <a:p>
             <a:fld id="{96DFF08F-DC6B-4601-B491-B0F83F6DD2DA}" type="datetimeFigureOut">
               <a:rPr lang="en-US" smtClean="0"/>
-              <a:t>12/1/2019</a:t>
+              <a:t>12/8/2019</a:t>
             </a:fld>
             <a:endParaRPr lang="en-US" dirty="0"/>
           </a:p>
@@ -664,7 +694,7 @@
     </p:spTree>
     <p:extLst>
       <p:ext uri="{BB962C8B-B14F-4D97-AF65-F5344CB8AC3E}">
-        <p14:creationId xmlns:p14="http://schemas.microsoft.com/office/powerpoint/2010/main" val="594120726"/>
+        <p14:creationId xmlns:p14="http://schemas.microsoft.com/office/powerpoint/2010/main" val="1796914002"/>
       </p:ext>
     </p:extLst>
   </p:cSld>
@@ -793,7 +823,7 @@
           <a:p>
             <a:fld id="{96DFF08F-DC6B-4601-B491-B0F83F6DD2DA}" type="datetimeFigureOut">
               <a:rPr lang="en-US" smtClean="0"/>
-              <a:t>12/1/2019</a:t>
+              <a:t>12/8/2019</a:t>
             </a:fld>
             <a:endParaRPr lang="en-US" dirty="0"/>
           </a:p>
@@ -879,7 +909,7 @@
     </p:spTree>
     <p:extLst>
       <p:ext uri="{BB962C8B-B14F-4D97-AF65-F5344CB8AC3E}">
-        <p14:creationId xmlns:p14="http://schemas.microsoft.com/office/powerpoint/2010/main" val="1039655084"/>
+        <p14:creationId xmlns:p14="http://schemas.microsoft.com/office/powerpoint/2010/main" val="1639632687"/>
       </p:ext>
     </p:extLst>
   </p:cSld>
@@ -998,7 +1028,7 @@
           <a:p>
             <a:fld id="{96DFF08F-DC6B-4601-B491-B0F83F6DD2DA}" type="datetimeFigureOut">
               <a:rPr lang="en-US" smtClean="0"/>
-              <a:t>12/1/2019</a:t>
+              <a:t>12/8/2019</a:t>
             </a:fld>
             <a:endParaRPr lang="en-US" dirty="0"/>
           </a:p>
@@ -1049,7 +1079,7 @@
     </p:spTree>
     <p:extLst>
       <p:ext uri="{BB962C8B-B14F-4D97-AF65-F5344CB8AC3E}">
-        <p14:creationId xmlns:p14="http://schemas.microsoft.com/office/powerpoint/2010/main" val="1155329160"/>
+        <p14:creationId xmlns:p14="http://schemas.microsoft.com/office/powerpoint/2010/main" val="2596141478"/>
       </p:ext>
     </p:extLst>
   </p:cSld>
@@ -1293,7 +1323,7 @@
           <a:p>
             <a:fld id="{96DFF08F-DC6B-4601-B491-B0F83F6DD2DA}" type="datetimeFigureOut">
               <a:rPr lang="en-US" smtClean="0"/>
-              <a:t>12/1/2019</a:t>
+              <a:t>12/8/2019</a:t>
             </a:fld>
             <a:endParaRPr lang="en-US" dirty="0"/>
           </a:p>
@@ -1379,7 +1409,7 @@
     </p:spTree>
     <p:extLst>
       <p:ext uri="{BB962C8B-B14F-4D97-AF65-F5344CB8AC3E}">
-        <p14:creationId xmlns:p14="http://schemas.microsoft.com/office/powerpoint/2010/main" val="3000386714"/>
+        <p14:creationId xmlns:p14="http://schemas.microsoft.com/office/powerpoint/2010/main" val="2365789837"/>
       </p:ext>
     </p:extLst>
   </p:cSld>
@@ -1565,7 +1595,7 @@
           <a:p>
             <a:fld id="{96DFF08F-DC6B-4601-B491-B0F83F6DD2DA}" type="datetimeFigureOut">
               <a:rPr lang="en-US" smtClean="0"/>
-              <a:t>12/1/2019</a:t>
+              <a:t>12/8/2019</a:t>
             </a:fld>
             <a:endParaRPr lang="en-US" dirty="0"/>
           </a:p>
@@ -1616,7 +1646,7 @@
     </p:spTree>
     <p:extLst>
       <p:ext uri="{BB962C8B-B14F-4D97-AF65-F5344CB8AC3E}">
-        <p14:creationId xmlns:p14="http://schemas.microsoft.com/office/powerpoint/2010/main" val="38321342"/>
+        <p14:creationId xmlns:p14="http://schemas.microsoft.com/office/powerpoint/2010/main" val="821134549"/>
       </p:ext>
     </p:extLst>
   </p:cSld>
@@ -1972,7 +2002,7 @@
           <a:p>
             <a:fld id="{96DFF08F-DC6B-4601-B491-B0F83F6DD2DA}" type="datetimeFigureOut">
               <a:rPr lang="en-US" smtClean="0"/>
-              <a:t>12/1/2019</a:t>
+              <a:t>12/8/2019</a:t>
             </a:fld>
             <a:endParaRPr lang="en-US" dirty="0"/>
           </a:p>
@@ -2023,7 +2053,7 @@
     </p:spTree>
     <p:extLst>
       <p:ext uri="{BB962C8B-B14F-4D97-AF65-F5344CB8AC3E}">
-        <p14:creationId xmlns:p14="http://schemas.microsoft.com/office/powerpoint/2010/main" val="1070690042"/>
+        <p14:creationId xmlns:p14="http://schemas.microsoft.com/office/powerpoint/2010/main" val="1621641407"/>
       </p:ext>
     </p:extLst>
   </p:cSld>
@@ -2090,7 +2120,7 @@
           <a:p>
             <a:fld id="{96DFF08F-DC6B-4601-B491-B0F83F6DD2DA}" type="datetimeFigureOut">
               <a:rPr lang="en-US" smtClean="0"/>
-              <a:t>12/1/2019</a:t>
+              <a:t>12/8/2019</a:t>
             </a:fld>
             <a:endParaRPr lang="en-US" dirty="0"/>
           </a:p>
@@ -2141,7 +2171,7 @@
     </p:spTree>
     <p:extLst>
       <p:ext uri="{BB962C8B-B14F-4D97-AF65-F5344CB8AC3E}">
-        <p14:creationId xmlns:p14="http://schemas.microsoft.com/office/powerpoint/2010/main" val="2335782306"/>
+        <p14:creationId xmlns:p14="http://schemas.microsoft.com/office/powerpoint/2010/main" val="2513378704"/>
       </p:ext>
     </p:extLst>
   </p:cSld>
@@ -2185,7 +2215,7 @@
           <a:p>
             <a:fld id="{96DFF08F-DC6B-4601-B491-B0F83F6DD2DA}" type="datetimeFigureOut">
               <a:rPr lang="en-US" smtClean="0"/>
-              <a:t>12/1/2019</a:t>
+              <a:t>12/8/2019</a:t>
             </a:fld>
             <a:endParaRPr lang="en-US" dirty="0"/>
           </a:p>
@@ -2236,7 +2266,7 @@
     </p:spTree>
     <p:extLst>
       <p:ext uri="{BB962C8B-B14F-4D97-AF65-F5344CB8AC3E}">
-        <p14:creationId xmlns:p14="http://schemas.microsoft.com/office/powerpoint/2010/main" val="4239516233"/>
+        <p14:creationId xmlns:p14="http://schemas.microsoft.com/office/powerpoint/2010/main" val="2352192291"/>
       </p:ext>
     </p:extLst>
   </p:cSld>
@@ -2475,7 +2505,7 @@
           <a:p>
             <a:fld id="{96DFF08F-DC6B-4601-B491-B0F83F6DD2DA}" type="datetimeFigureOut">
               <a:rPr lang="en-US" smtClean="0"/>
-              <a:t>12/1/2019</a:t>
+              <a:t>12/8/2019</a:t>
             </a:fld>
             <a:endParaRPr lang="en-US" dirty="0"/>
           </a:p>
@@ -2526,7 +2556,7 @@
     </p:spTree>
     <p:extLst>
       <p:ext uri="{BB962C8B-B14F-4D97-AF65-F5344CB8AC3E}">
-        <p14:creationId xmlns:p14="http://schemas.microsoft.com/office/powerpoint/2010/main" val="2704240328"/>
+        <p14:creationId xmlns:p14="http://schemas.microsoft.com/office/powerpoint/2010/main" val="2086195295"/>
       </p:ext>
     </p:extLst>
   </p:cSld>
@@ -2755,7 +2785,7 @@
           <a:p>
             <a:fld id="{C7616CA0-919D-4A49-9C8A-62FDFB3A5183}" type="datetimeFigureOut">
               <a:rPr lang="en-US" smtClean="0"/>
-              <a:t>12/1/2019</a:t>
+              <a:t>12/8/2019</a:t>
             </a:fld>
             <a:endParaRPr lang="en-US" dirty="0"/>
           </a:p>
@@ -2841,7 +2871,7 @@
     </p:spTree>
     <p:extLst>
       <p:ext uri="{BB962C8B-B14F-4D97-AF65-F5344CB8AC3E}">
-        <p14:creationId xmlns:p14="http://schemas.microsoft.com/office/powerpoint/2010/main" val="856298316"/>
+        <p14:creationId xmlns:p14="http://schemas.microsoft.com/office/powerpoint/2010/main" val="392294537"/>
       </p:ext>
     </p:extLst>
   </p:cSld>
@@ -3006,7 +3036,7 @@
             <a:fld id="{96DFF08F-DC6B-4601-B491-B0F83F6DD2DA}" type="datetimeFigureOut">
               <a:rPr lang="en-US" smtClean="0"/>
               <a:pPr/>
-              <a:t>12/1/2019</a:t>
+              <a:t>12/8/2019</a:t>
             </a:fld>
             <a:endParaRPr lang="en-US" dirty="0"/>
           </a:p>
@@ -3133,23 +3163,23 @@
     </p:spTree>
     <p:extLst>
       <p:ext uri="{BB962C8B-B14F-4D97-AF65-F5344CB8AC3E}">
-        <p14:creationId xmlns:p14="http://schemas.microsoft.com/office/powerpoint/2010/main" val="4004844269"/>
+        <p14:creationId xmlns:p14="http://schemas.microsoft.com/office/powerpoint/2010/main" val="2234770067"/>
       </p:ext>
     </p:extLst>
   </p:cSld>
   <p:clrMap bg1="lt1" tx1="dk1" bg2="lt2" tx2="dk2" accent1="accent1" accent2="accent2" accent3="accent3" accent4="accent4" accent5="accent5" accent6="accent6" hlink="hlink" folHlink="folHlink"/>
   <p:sldLayoutIdLst>
-    <p:sldLayoutId id="2147483675" r:id="rId1"/>
-    <p:sldLayoutId id="2147483676" r:id="rId2"/>
-    <p:sldLayoutId id="2147483677" r:id="rId3"/>
-    <p:sldLayoutId id="2147483678" r:id="rId4"/>
-    <p:sldLayoutId id="2147483679" r:id="rId5"/>
-    <p:sldLayoutId id="2147483680" r:id="rId6"/>
-    <p:sldLayoutId id="2147483681" r:id="rId7"/>
-    <p:sldLayoutId id="2147483682" r:id="rId8"/>
-    <p:sldLayoutId id="2147483683" r:id="rId9"/>
-    <p:sldLayoutId id="2147483684" r:id="rId10"/>
-    <p:sldLayoutId id="2147483685" r:id="rId11"/>
+    <p:sldLayoutId id="2147483723" r:id="rId1"/>
+    <p:sldLayoutId id="2147483724" r:id="rId2"/>
+    <p:sldLayoutId id="2147483725" r:id="rId3"/>
+    <p:sldLayoutId id="2147483726" r:id="rId4"/>
+    <p:sldLayoutId id="2147483727" r:id="rId5"/>
+    <p:sldLayoutId id="2147483728" r:id="rId6"/>
+    <p:sldLayoutId id="2147483729" r:id="rId7"/>
+    <p:sldLayoutId id="2147483730" r:id="rId8"/>
+    <p:sldLayoutId id="2147483731" r:id="rId9"/>
+    <p:sldLayoutId id="2147483732" r:id="rId10"/>
+    <p:sldLayoutId id="2147483733" r:id="rId11"/>
   </p:sldLayoutIdLst>
   <p:txStyles>
     <p:titleStyle>
@@ -3561,14 +3591,117 @@
             <p:ph type="subTitle" idx="1"/>
           </p:nvPr>
         </p:nvSpPr>
-        <p:spPr/>
+        <p:spPr>
+          <a:xfrm>
+            <a:off x="9293772" y="4807878"/>
+            <a:ext cx="1563414" cy="505853"/>
+          </a:xfrm>
+        </p:spPr>
         <p:txBody>
           <a:bodyPr/>
           <a:lstStyle/>
           <a:p>
             <a:r>
-              <a:rPr lang="en-US"/>
+              <a:rPr lang="en-US" dirty="0"/>
               <a:t>Group 04</a:t>
+            </a:r>
+          </a:p>
+        </p:txBody>
+      </p:sp>
+      <p:sp>
+        <p:nvSpPr>
+          <p:cNvPr id="5" name="TextBox 4">
+            <a:extLst>
+              <a:ext uri="{FF2B5EF4-FFF2-40B4-BE49-F238E27FC236}">
+                <a16:creationId xmlns:a16="http://schemas.microsoft.com/office/drawing/2014/main" id="{A35EF291-B73C-4893-A807-3A31322584D4}"/>
+              </a:ext>
+            </a:extLst>
+          </p:cNvPr>
+          <p:cNvSpPr txBox="1"/>
+          <p:nvPr/>
+        </p:nvSpPr>
+        <p:spPr>
+          <a:xfrm>
+            <a:off x="8542283" y="5330660"/>
+            <a:ext cx="3731172" cy="923330"/>
+          </a:xfrm>
+          <a:prstGeom prst="rect">
+            <a:avLst/>
+          </a:prstGeom>
+          <a:noFill/>
+        </p:spPr>
+        <p:txBody>
+          <a:bodyPr wrap="square" rtlCol="0">
+            <a:spAutoFit/>
+          </a:bodyPr>
+          <a:lstStyle/>
+          <a:p>
+            <a:r>
+              <a:rPr lang="en-US" b="1" dirty="0">
+                <a:latin typeface="Tempus Sans ITC" panose="04020404030007020202" pitchFamily="82" charset="0"/>
+                <a:cs typeface="Aldhabi" panose="020B0604020202020204" pitchFamily="2" charset="-78"/>
+              </a:rPr>
+              <a:t>Nguyen Thao </a:t>
+            </a:r>
+            <a:r>
+              <a:rPr lang="en-US" b="1" dirty="0" err="1">
+                <a:latin typeface="Tempus Sans ITC" panose="04020404030007020202" pitchFamily="82" charset="0"/>
+                <a:cs typeface="Aldhabi" panose="020B0604020202020204" pitchFamily="2" charset="-78"/>
+              </a:rPr>
+              <a:t>Ninh</a:t>
+            </a:r>
+            <a:r>
+              <a:rPr lang="en-US" b="1" dirty="0">
+                <a:latin typeface="Tempus Sans ITC" panose="04020404030007020202" pitchFamily="82" charset="0"/>
+                <a:cs typeface="Aldhabi" panose="020B0604020202020204" pitchFamily="2" charset="-78"/>
+              </a:rPr>
+              <a:t> -18125106</a:t>
+            </a:r>
+          </a:p>
+          <a:p>
+            <a:r>
+              <a:rPr lang="en-US" b="1" dirty="0">
+                <a:latin typeface="Tempus Sans ITC" panose="04020404030007020202" pitchFamily="82" charset="0"/>
+                <a:cs typeface="Aldhabi" panose="020B0604020202020204" pitchFamily="2" charset="-78"/>
+              </a:rPr>
+              <a:t>Truong Thuy Quyen -18125110</a:t>
+            </a:r>
+          </a:p>
+          <a:p>
+            <a:r>
+              <a:rPr lang="en-US" b="1" dirty="0">
+                <a:latin typeface="Tempus Sans ITC" panose="04020404030007020202" pitchFamily="82" charset="0"/>
+                <a:cs typeface="Aldhabi" panose="020B0604020202020204" pitchFamily="2" charset="-78"/>
+              </a:rPr>
+              <a:t>Nguyen </a:t>
+            </a:r>
+            <a:r>
+              <a:rPr lang="en-US" b="1" dirty="0" err="1">
+                <a:latin typeface="Tempus Sans ITC" panose="04020404030007020202" pitchFamily="82" charset="0"/>
+                <a:cs typeface="Aldhabi" panose="020B0604020202020204" pitchFamily="2" charset="-78"/>
+              </a:rPr>
+              <a:t>Trung</a:t>
+            </a:r>
+            <a:r>
+              <a:rPr lang="en-US" b="1" dirty="0">
+                <a:latin typeface="Tempus Sans ITC" panose="04020404030007020202" pitchFamily="82" charset="0"/>
+                <a:cs typeface="Aldhabi" panose="020B0604020202020204" pitchFamily="2" charset="-78"/>
+              </a:rPr>
+              <a:t> </a:t>
+            </a:r>
+            <a:r>
+              <a:rPr lang="en-US" b="1" dirty="0" err="1">
+                <a:latin typeface="Tempus Sans ITC" panose="04020404030007020202" pitchFamily="82" charset="0"/>
+                <a:cs typeface="Aldhabi" panose="020B0604020202020204" pitchFamily="2" charset="-78"/>
+              </a:rPr>
+              <a:t>Hau</a:t>
+            </a:r>
+            <a:r>
+              <a:rPr lang="en-US" b="1" dirty="0">
+                <a:latin typeface="Tempus Sans ITC" panose="04020404030007020202" pitchFamily="82" charset="0"/>
+                <a:cs typeface="Aldhabi" panose="020B0604020202020204" pitchFamily="2" charset="-78"/>
+              </a:rPr>
+              <a:t> -18125129</a:t>
             </a:r>
           </a:p>
         </p:txBody>
@@ -3587,6 +3720,123 @@
 </file>
 
 <file path=ppt/slides/slide10.xml><?xml version="1.0" encoding="utf-8"?>
+<p:sld xmlns:a="http://schemas.openxmlformats.org/drawingml/2006/main" xmlns:r="http://schemas.openxmlformats.org/officeDocument/2006/relationships" xmlns:p="http://schemas.openxmlformats.org/presentationml/2006/main" showMasterSp="0">
+  <p:cSld>
+    <p:bg>
+      <p:bgPr>
+        <a:solidFill>
+          <a:schemeClr val="bg1"/>
+        </a:solidFill>
+        <a:effectLst/>
+      </p:bgPr>
+    </p:bg>
+    <p:spTree>
+      <p:nvGrpSpPr>
+        <p:cNvPr id="1" name=""/>
+        <p:cNvGrpSpPr/>
+        <p:nvPr/>
+      </p:nvGrpSpPr>
+      <p:grpSpPr>
+        <a:xfrm>
+          <a:off x="0" y="0"/>
+          <a:ext cx="0" cy="0"/>
+          <a:chOff x="0" y="0"/>
+          <a:chExt cx="0" cy="0"/>
+        </a:xfrm>
+      </p:grpSpPr>
+      <p:sp>
+        <p:nvSpPr>
+          <p:cNvPr id="8" name="TextBox 7">
+            <a:extLst>
+              <a:ext uri="{FF2B5EF4-FFF2-40B4-BE49-F238E27FC236}">
+                <a16:creationId xmlns:a16="http://schemas.microsoft.com/office/drawing/2014/main" id="{27D439ED-754F-41BB-B4DE-AB32597D52D0}"/>
+              </a:ext>
+            </a:extLst>
+          </p:cNvPr>
+          <p:cNvSpPr txBox="1"/>
+          <p:nvPr/>
+        </p:nvSpPr>
+        <p:spPr>
+          <a:xfrm>
+            <a:off x="913001" y="383563"/>
+            <a:ext cx="9883585" cy="784830"/>
+          </a:xfrm>
+          <a:prstGeom prst="rect">
+            <a:avLst/>
+          </a:prstGeom>
+          <a:noFill/>
+        </p:spPr>
+        <p:txBody>
+          <a:bodyPr wrap="square" rtlCol="0">
+            <a:spAutoFit/>
+          </a:bodyPr>
+          <a:lstStyle/>
+          <a:p>
+            <a:pPr algn="ctr">
+              <a:spcBef>
+                <a:spcPts val="300"/>
+              </a:spcBef>
+            </a:pPr>
+            <a:r>
+              <a:rPr lang="en-US" sz="4500">
+                <a:solidFill>
+                  <a:schemeClr val="accent4">
+                    <a:lumMod val="50000"/>
+                  </a:schemeClr>
+                </a:solidFill>
+                <a:latin typeface="Aharoni" panose="02010803020104030203" pitchFamily="2" charset="-79"/>
+                <a:ea typeface="Verdana" panose="020B0604030504040204" pitchFamily="34" charset="0"/>
+                <a:cs typeface="Aharoni" panose="02010803020104030203" pitchFamily="2" charset="-79"/>
+              </a:rPr>
+              <a:t>what about an interface?</a:t>
+            </a:r>
+          </a:p>
+        </p:txBody>
+      </p:sp>
+      <p:pic>
+        <p:nvPicPr>
+          <p:cNvPr id="7" name="Picture 6">
+            <a:extLst>
+              <a:ext uri="{FF2B5EF4-FFF2-40B4-BE49-F238E27FC236}">
+                <a16:creationId xmlns:a16="http://schemas.microsoft.com/office/drawing/2014/main" id="{6F580011-23E0-4AB8-B47A-D91E58A0418F}"/>
+              </a:ext>
+            </a:extLst>
+          </p:cNvPr>
+          <p:cNvPicPr>
+            <a:picLocks noChangeAspect="1"/>
+          </p:cNvPicPr>
+          <p:nvPr/>
+        </p:nvPicPr>
+        <p:blipFill>
+          <a:blip r:embed="rId2"/>
+          <a:stretch>
+            <a:fillRect/>
+          </a:stretch>
+        </p:blipFill>
+        <p:spPr>
+          <a:xfrm>
+            <a:off x="2408075" y="1391585"/>
+            <a:ext cx="7375849" cy="4477078"/>
+          </a:xfrm>
+          <a:prstGeom prst="rect">
+            <a:avLst/>
+          </a:prstGeom>
+        </p:spPr>
+      </p:pic>
+    </p:spTree>
+    <p:extLst>
+      <p:ext uri="{BB962C8B-B14F-4D97-AF65-F5344CB8AC3E}">
+        <p14:creationId xmlns:p14="http://schemas.microsoft.com/office/powerpoint/2010/main" val="3156013238"/>
+      </p:ext>
+    </p:extLst>
+  </p:cSld>
+  <p:clrMapOvr>
+    <a:masterClrMapping/>
+  </p:clrMapOvr>
+</p:sld>
+</file>
+
+<file path=ppt/slides/slide11.xml><?xml version="1.0" encoding="utf-8"?>
 <p:sld xmlns:a="http://schemas.openxmlformats.org/drawingml/2006/main" xmlns:r="http://schemas.openxmlformats.org/officeDocument/2006/relationships" xmlns:p="http://schemas.openxmlformats.org/presentationml/2006/main" showMasterSp="0">
   <p:cSld>
     <p:bg>
@@ -3895,323 +4145,6 @@
 </p:sld>
 </file>
 
-<file path=ppt/slides/slide11.xml><?xml version="1.0" encoding="utf-8"?>
-<p:sld xmlns:a="http://schemas.openxmlformats.org/drawingml/2006/main" xmlns:r="http://schemas.openxmlformats.org/officeDocument/2006/relationships" xmlns:p="http://schemas.openxmlformats.org/presentationml/2006/main" showMasterSp="0">
-  <p:cSld>
-    <p:spTree>
-      <p:nvGrpSpPr>
-        <p:cNvPr id="1" name=""/>
-        <p:cNvGrpSpPr/>
-        <p:nvPr/>
-      </p:nvGrpSpPr>
-      <p:grpSpPr>
-        <a:xfrm>
-          <a:off x="0" y="0"/>
-          <a:ext cx="0" cy="0"/>
-          <a:chOff x="0" y="0"/>
-          <a:chExt cx="0" cy="0"/>
-        </a:xfrm>
-      </p:grpSpPr>
-      <p:sp>
-        <p:nvSpPr>
-          <p:cNvPr id="6" name="Title 5">
-            <a:extLst>
-              <a:ext uri="{FF2B5EF4-FFF2-40B4-BE49-F238E27FC236}">
-                <a16:creationId xmlns:a16="http://schemas.microsoft.com/office/drawing/2014/main" id="{5DB504B7-A9DA-42C6-8EFE-9C90D39C86B7}"/>
-              </a:ext>
-            </a:extLst>
-          </p:cNvPr>
-          <p:cNvSpPr>
-            <a:spLocks noGrp="1"/>
-          </p:cNvSpPr>
-          <p:nvPr>
-            <p:ph type="title"/>
-          </p:nvPr>
-        </p:nvSpPr>
-        <p:spPr>
-          <a:xfrm>
-            <a:off x="1024128" y="342621"/>
-            <a:ext cx="9720072" cy="1499616"/>
-          </a:xfrm>
-        </p:spPr>
-        <p:txBody>
-          <a:bodyPr>
-            <a:normAutofit/>
-          </a:bodyPr>
-          <a:lstStyle/>
-          <a:p>
-            <a:pPr algn="ctr"/>
-            <a:r>
-              <a:rPr lang="en-US" sz="6000" dirty="0">
-                <a:latin typeface="Aharoni" panose="02010803020104030203" pitchFamily="2" charset="-79"/>
-                <a:cs typeface="Aharoni" panose="02010803020104030203" pitchFamily="2" charset="-79"/>
-              </a:rPr>
-              <a:t>Strategy pattern</a:t>
-            </a:r>
-          </a:p>
-        </p:txBody>
-      </p:sp>
-      <p:sp>
-        <p:nvSpPr>
-          <p:cNvPr id="4" name="TextBox 3">
-            <a:extLst>
-              <a:ext uri="{FF2B5EF4-FFF2-40B4-BE49-F238E27FC236}">
-                <a16:creationId xmlns:a16="http://schemas.microsoft.com/office/drawing/2014/main" id="{4F618712-6F1B-4CFC-A1DE-B3C1736A1042}"/>
-              </a:ext>
-            </a:extLst>
-          </p:cNvPr>
-          <p:cNvSpPr txBox="1"/>
-          <p:nvPr/>
-        </p:nvSpPr>
-        <p:spPr>
-          <a:xfrm>
-            <a:off x="1788603" y="2243474"/>
-            <a:ext cx="8841996" cy="3093154"/>
-          </a:xfrm>
-          <a:prstGeom prst="rect">
-            <a:avLst/>
-          </a:prstGeom>
-          <a:noFill/>
-        </p:spPr>
-        <p:txBody>
-          <a:bodyPr wrap="square" rtlCol="0">
-            <a:spAutoFit/>
-          </a:bodyPr>
-          <a:lstStyle/>
-          <a:p>
-            <a:pPr algn="just">
-              <a:spcBef>
-                <a:spcPts val="300"/>
-              </a:spcBef>
-            </a:pPr>
-            <a:r>
-              <a:rPr lang="en-US" sz="3500" dirty="0">
-                <a:solidFill>
-                  <a:schemeClr val="accent2"/>
-                </a:solidFill>
-                <a:latin typeface="Aharoni" panose="02010803020104030203" pitchFamily="2" charset="-79"/>
-                <a:ea typeface="Verdana" panose="020B0604030504040204" pitchFamily="34" charset="0"/>
-                <a:cs typeface="Aharoni" panose="02010803020104030203" pitchFamily="2" charset="-79"/>
-              </a:rPr>
-              <a:t>Origin:</a:t>
-            </a:r>
-            <a:r>
-              <a:rPr lang="en-US" sz="3500" dirty="0">
-                <a:solidFill>
-                  <a:schemeClr val="accent2"/>
-                </a:solidFill>
-                <a:latin typeface="Bahnschrift SemiLight" panose="020B0502040204020203" pitchFamily="34" charset="0"/>
-                <a:ea typeface="Verdana" panose="020B0604030504040204" pitchFamily="34" charset="0"/>
-                <a:cs typeface="Helvetica" panose="020B0604020202020204" pitchFamily="34" charset="0"/>
-              </a:rPr>
-              <a:t>  </a:t>
-            </a:r>
-            <a:r>
-              <a:rPr lang="en-US" sz="4000" dirty="0">
-                <a:solidFill>
-                  <a:schemeClr val="accent2"/>
-                </a:solidFill>
-                <a:latin typeface="Bahnschrift SemiLight" panose="020B0502040204020203" pitchFamily="34" charset="0"/>
-                <a:ea typeface="Verdana" panose="020B0604030504040204" pitchFamily="34" charset="0"/>
-                <a:cs typeface="Helvetica" panose="020B0604020202020204" pitchFamily="34" charset="0"/>
-              </a:rPr>
-              <a:t>	</a:t>
-            </a:r>
-            <a:r>
-              <a:rPr lang="en-US" sz="2200" dirty="0">
-                <a:latin typeface="Bahnschrift SemiLight" panose="020B0502040204020203" pitchFamily="34" charset="0"/>
-                <a:ea typeface="Verdana" panose="020B0604030504040204" pitchFamily="34" charset="0"/>
-                <a:cs typeface="Helvetica" panose="020B0604020202020204" pitchFamily="34" charset="0"/>
-              </a:rPr>
-              <a:t>the Strategy Pattern is known as a </a:t>
-            </a:r>
-            <a:r>
-              <a:rPr lang="en-US" sz="2200" b="1" dirty="0">
-                <a:solidFill>
-                  <a:schemeClr val="accent2">
-                    <a:lumMod val="75000"/>
-                  </a:schemeClr>
-                </a:solidFill>
-                <a:latin typeface="Bahnschrift SemiLight" panose="020B0502040204020203" pitchFamily="34" charset="0"/>
-                <a:ea typeface="Verdana" panose="020B0604030504040204" pitchFamily="34" charset="0"/>
-                <a:cs typeface="Helvetica" panose="020B0604020202020204" pitchFamily="34" charset="0"/>
-              </a:rPr>
-              <a:t>behavioral</a:t>
-            </a:r>
-            <a:r>
-              <a:rPr lang="en-US" sz="2200" dirty="0">
-                <a:latin typeface="Bahnschrift SemiLight" panose="020B0502040204020203" pitchFamily="34" charset="0"/>
-                <a:ea typeface="Verdana" panose="020B0604030504040204" pitchFamily="34" charset="0"/>
-                <a:cs typeface="Helvetica" panose="020B0604020202020204" pitchFamily="34" charset="0"/>
-              </a:rPr>
-              <a:t> 						pattern and is used to manage algorithms, 							relationships and 	responsibilities between objects</a:t>
-            </a:r>
-            <a:endParaRPr lang="en-US" sz="2200" dirty="0">
-              <a:solidFill>
-                <a:schemeClr val="accent2"/>
-              </a:solidFill>
-              <a:latin typeface="Aharoni" panose="02010803020104030203" pitchFamily="2" charset="-79"/>
-              <a:ea typeface="Verdana" panose="020B0604030504040204" pitchFamily="34" charset="0"/>
-              <a:cs typeface="Aharoni" panose="02010803020104030203" pitchFamily="2" charset="-79"/>
-            </a:endParaRPr>
-          </a:p>
-          <a:p>
-            <a:pPr algn="just">
-              <a:spcBef>
-                <a:spcPts val="300"/>
-              </a:spcBef>
-            </a:pPr>
-            <a:endParaRPr lang="en-US" sz="500" dirty="0">
-              <a:solidFill>
-                <a:schemeClr val="accent2"/>
-              </a:solidFill>
-              <a:latin typeface="Aharoni" panose="02010803020104030203" pitchFamily="2" charset="-79"/>
-              <a:ea typeface="Verdana" panose="020B0604030504040204" pitchFamily="34" charset="0"/>
-              <a:cs typeface="Aharoni" panose="02010803020104030203" pitchFamily="2" charset="-79"/>
-            </a:endParaRPr>
-          </a:p>
-          <a:p>
-            <a:pPr algn="just">
-              <a:spcBef>
-                <a:spcPts val="300"/>
-              </a:spcBef>
-            </a:pPr>
-            <a:r>
-              <a:rPr lang="en-US" sz="3500" dirty="0">
-                <a:solidFill>
-                  <a:schemeClr val="accent2"/>
-                </a:solidFill>
-                <a:latin typeface="Aharoni" panose="02010803020104030203" pitchFamily="2" charset="-79"/>
-                <a:ea typeface="Verdana" panose="020B0604030504040204" pitchFamily="34" charset="0"/>
-                <a:cs typeface="Aharoni" panose="02010803020104030203" pitchFamily="2" charset="-79"/>
-              </a:rPr>
-              <a:t>Intent:</a:t>
-            </a:r>
-            <a:r>
-              <a:rPr lang="en-US" sz="3500" dirty="0">
-                <a:solidFill>
-                  <a:schemeClr val="accent2"/>
-                </a:solidFill>
-                <a:latin typeface="Bahnschrift SemiLight" panose="020B0502040204020203" pitchFamily="34" charset="0"/>
-                <a:ea typeface="Verdana" panose="020B0604030504040204" pitchFamily="34" charset="0"/>
-                <a:cs typeface="Helvetica" panose="020B0604020202020204" pitchFamily="34" charset="0"/>
-              </a:rPr>
-              <a:t>  </a:t>
-            </a:r>
-            <a:r>
-              <a:rPr lang="en-US" sz="2800" dirty="0">
-                <a:solidFill>
-                  <a:schemeClr val="accent2"/>
-                </a:solidFill>
-                <a:latin typeface="Bahnschrift SemiLight" panose="020B0502040204020203" pitchFamily="34" charset="0"/>
-                <a:ea typeface="Verdana" panose="020B0604030504040204" pitchFamily="34" charset="0"/>
-                <a:cs typeface="Helvetica" panose="020B0604020202020204" pitchFamily="34" charset="0"/>
-              </a:rPr>
-              <a:t>	</a:t>
-            </a:r>
-            <a:r>
-              <a:rPr lang="en-US" sz="2200" dirty="0">
-                <a:latin typeface="Bahnschrift SemiLight" panose="020B0502040204020203" pitchFamily="34" charset="0"/>
-                <a:ea typeface="Verdana" panose="020B0604030504040204" pitchFamily="34" charset="0"/>
-                <a:cs typeface="Helvetica" panose="020B0604020202020204" pitchFamily="34" charset="0"/>
-              </a:rPr>
-              <a:t>defines a family of algorithms, encapsulates each 					algorithm, and makes them interchangeable within 				that family</a:t>
-            </a:r>
-            <a:r>
-              <a:rPr lang="en-US" sz="1500" dirty="0">
-                <a:latin typeface="Bahnschrift SemiLight" panose="020B0502040204020203" pitchFamily="34" charset="0"/>
-                <a:ea typeface="Verdana" panose="020B0604030504040204" pitchFamily="34" charset="0"/>
-                <a:cs typeface="Helvetica" panose="020B0604020202020204" pitchFamily="34" charset="0"/>
-              </a:rPr>
-              <a:t> </a:t>
-            </a:r>
-            <a:r>
-              <a:rPr lang="en-US" sz="2200" dirty="0">
-                <a:latin typeface="Bahnschrift SemiLight" panose="020B0502040204020203" pitchFamily="34" charset="0"/>
-                <a:ea typeface="Verdana" panose="020B0604030504040204" pitchFamily="34" charset="0"/>
-                <a:cs typeface="Helvetica" panose="020B0604020202020204" pitchFamily="34" charset="0"/>
-              </a:rPr>
-              <a:t>strategy lets the algorithm vary 							independently from clients who use it</a:t>
-            </a:r>
-          </a:p>
-        </p:txBody>
-      </p:sp>
-      <p:sp>
-        <p:nvSpPr>
-          <p:cNvPr id="5" name="TextBox 4">
-            <a:extLst>
-              <a:ext uri="{FF2B5EF4-FFF2-40B4-BE49-F238E27FC236}">
-                <a16:creationId xmlns:a16="http://schemas.microsoft.com/office/drawing/2014/main" id="{1EBF2545-6B9D-4EF2-B0FE-99E0D6D3A927}"/>
-              </a:ext>
-            </a:extLst>
-          </p:cNvPr>
-          <p:cNvSpPr txBox="1"/>
-          <p:nvPr/>
-        </p:nvSpPr>
-        <p:spPr>
-          <a:xfrm>
-            <a:off x="1675002" y="1381700"/>
-            <a:ext cx="8841996" cy="861774"/>
-          </a:xfrm>
-          <a:prstGeom prst="rect">
-            <a:avLst/>
-          </a:prstGeom>
-          <a:noFill/>
-        </p:spPr>
-        <p:txBody>
-          <a:bodyPr wrap="square" rtlCol="0">
-            <a:spAutoFit/>
-          </a:bodyPr>
-          <a:lstStyle/>
-          <a:p>
-            <a:pPr algn="ctr">
-              <a:spcBef>
-                <a:spcPts val="300"/>
-              </a:spcBef>
-            </a:pPr>
-            <a:r>
-              <a:rPr lang="en-US" sz="5000">
-                <a:solidFill>
-                  <a:schemeClr val="accent2"/>
-                </a:solidFill>
-                <a:latin typeface="Aharoni" panose="02010803020104030203" pitchFamily="2" charset="-79"/>
-                <a:ea typeface="Verdana" panose="020B0604030504040204" pitchFamily="34" charset="0"/>
-                <a:cs typeface="Aharoni" panose="02010803020104030203" pitchFamily="2" charset="-79"/>
-              </a:rPr>
-              <a:t>•</a:t>
-            </a:r>
-            <a:r>
-              <a:rPr lang="en-US" sz="4000">
-                <a:solidFill>
-                  <a:schemeClr val="accent2"/>
-                </a:solidFill>
-                <a:latin typeface="Bahnschrift SemiLight" panose="020B0502040204020203" pitchFamily="34" charset="0"/>
-                <a:ea typeface="Verdana" panose="020B0604030504040204" pitchFamily="34" charset="0"/>
-                <a:cs typeface="Helvetica" panose="020B0604020202020204" pitchFamily="34" charset="0"/>
-              </a:rPr>
-              <a:t>	</a:t>
-            </a:r>
-            <a:endParaRPr lang="en-US" sz="2200">
-              <a:latin typeface="Bahnschrift SemiLight" panose="020B0502040204020203" pitchFamily="34" charset="0"/>
-              <a:ea typeface="Verdana" panose="020B0604030504040204" pitchFamily="34" charset="0"/>
-              <a:cs typeface="Helvetica" panose="020B0604020202020204" pitchFamily="34" charset="0"/>
-            </a:endParaRPr>
-          </a:p>
-        </p:txBody>
-      </p:sp>
-    </p:spTree>
-    <p:extLst>
-      <p:ext uri="{BB962C8B-B14F-4D97-AF65-F5344CB8AC3E}">
-        <p14:creationId xmlns:p14="http://schemas.microsoft.com/office/powerpoint/2010/main" val="2088408451"/>
-      </p:ext>
-    </p:extLst>
-  </p:cSld>
-  <p:clrMapOvr>
-    <a:masterClrMapping/>
-  </p:clrMapOvr>
-</p:sld>
-</file>
-
 <file path=ppt/slides/slide12.xml><?xml version="1.0" encoding="utf-8"?>
 <p:sld xmlns:a="http://schemas.openxmlformats.org/drawingml/2006/main" xmlns:r="http://schemas.openxmlformats.org/officeDocument/2006/relationships" xmlns:p="http://schemas.openxmlformats.org/presentationml/2006/main" showMasterSp="0">
   <p:cSld>
@@ -4535,8 +4468,38 @@
         </p:blipFill>
         <p:spPr>
           <a:xfrm>
-            <a:off x="6484884" y="1427929"/>
+            <a:off x="6863068" y="1427929"/>
             <a:ext cx="4371975" cy="4238625"/>
+          </a:xfrm>
+          <a:prstGeom prst="rect">
+            <a:avLst/>
+          </a:prstGeom>
+        </p:spPr>
+      </p:pic>
+      <p:pic>
+        <p:nvPicPr>
+          <p:cNvPr id="3" name="Picture 2">
+            <a:extLst>
+              <a:ext uri="{FF2B5EF4-FFF2-40B4-BE49-F238E27FC236}">
+                <a16:creationId xmlns:a16="http://schemas.microsoft.com/office/drawing/2014/main" id="{D0FD79E4-C89D-47AD-AA2C-0F577B312CE7}"/>
+              </a:ext>
+            </a:extLst>
+          </p:cNvPr>
+          <p:cNvPicPr>
+            <a:picLocks noChangeAspect="1"/>
+          </p:cNvPicPr>
+          <p:nvPr/>
+        </p:nvPicPr>
+        <p:blipFill>
+          <a:blip r:embed="rId4"/>
+          <a:stretch>
+            <a:fillRect/>
+          </a:stretch>
+        </p:blipFill>
+        <p:spPr>
+          <a:xfrm>
+            <a:off x="1052007" y="733049"/>
+            <a:ext cx="5811061" cy="5391902"/>
           </a:xfrm>
           <a:prstGeom prst="rect">
             <a:avLst/>
@@ -4557,8 +4520,16 @@
 </file>
 
 <file path=ppt/slides/slide14.xml><?xml version="1.0" encoding="utf-8"?>
-<p:sld xmlns:a="http://schemas.openxmlformats.org/drawingml/2006/main" xmlns:r="http://schemas.openxmlformats.org/officeDocument/2006/relationships" xmlns:p="http://schemas.openxmlformats.org/presentationml/2006/main" showMasterSp="0">
+<p:sld xmlns:a="http://schemas.openxmlformats.org/drawingml/2006/main" xmlns:r="http://schemas.openxmlformats.org/officeDocument/2006/relationships" xmlns:p="http://schemas.openxmlformats.org/presentationml/2006/main">
   <p:cSld>
+    <p:bg>
+      <p:bgPr>
+        <a:solidFill>
+          <a:schemeClr val="bg1"/>
+        </a:solidFill>
+        <a:effectLst/>
+      </p:bgPr>
+    </p:bg>
     <p:spTree>
       <p:nvGrpSpPr>
         <p:cNvPr id="1" name=""/>
@@ -4595,8 +4566,8 @@
         </p:blipFill>
         <p:spPr>
           <a:xfrm>
-            <a:off x="797801" y="1076325"/>
-            <a:ext cx="6076950" cy="4705350"/>
+            <a:off x="643467" y="1378479"/>
+            <a:ext cx="5291667" cy="4101041"/>
           </a:xfrm>
           <a:prstGeom prst="rect">
             <a:avLst/>
@@ -4625,8 +4596,8 @@
         </p:blipFill>
         <p:spPr>
           <a:xfrm>
-            <a:off x="6451381" y="928687"/>
-            <a:ext cx="4838700" cy="5000625"/>
+            <a:off x="6256868" y="694625"/>
+            <a:ext cx="5291666" cy="5468749"/>
           </a:xfrm>
           <a:prstGeom prst="rect">
             <a:avLst/>
@@ -4647,6 +4618,581 @@
 </file>
 
 <file path=ppt/slides/slide15.xml><?xml version="1.0" encoding="utf-8"?>
+<p:sld xmlns:a="http://schemas.openxmlformats.org/drawingml/2006/main" xmlns:r="http://schemas.openxmlformats.org/officeDocument/2006/relationships" xmlns:p="http://schemas.openxmlformats.org/presentationml/2006/main">
+  <p:cSld>
+    <p:bg>
+      <p:bgPr>
+        <a:solidFill>
+          <a:schemeClr val="bg1"/>
+        </a:solidFill>
+        <a:effectLst/>
+      </p:bgPr>
+    </p:bg>
+    <p:spTree>
+      <p:nvGrpSpPr>
+        <p:cNvPr id="1" name=""/>
+        <p:cNvGrpSpPr/>
+        <p:nvPr/>
+      </p:nvGrpSpPr>
+      <p:grpSpPr>
+        <a:xfrm>
+          <a:off x="0" y="0"/>
+          <a:ext cx="0" cy="0"/>
+          <a:chOff x="0" y="0"/>
+          <a:chExt cx="0" cy="0"/>
+        </a:xfrm>
+      </p:grpSpPr>
+      <p:pic>
+        <p:nvPicPr>
+          <p:cNvPr id="8" name="Picture 7" descr="A screenshot of a cell phone&#10;&#10;Description automatically generated">
+            <a:extLst>
+              <a:ext uri="{FF2B5EF4-FFF2-40B4-BE49-F238E27FC236}">
+                <a16:creationId xmlns:a16="http://schemas.microsoft.com/office/drawing/2014/main" id="{48DC18B5-39C1-494E-95B4-61C0970F68F8}"/>
+              </a:ext>
+            </a:extLst>
+          </p:cNvPr>
+          <p:cNvPicPr>
+            <a:picLocks noChangeAspect="1"/>
+          </p:cNvPicPr>
+          <p:nvPr/>
+        </p:nvPicPr>
+        <p:blipFill>
+          <a:blip r:embed="rId2"/>
+          <a:stretch>
+            <a:fillRect/>
+          </a:stretch>
+        </p:blipFill>
+        <p:spPr>
+          <a:xfrm>
+            <a:off x="643467" y="948098"/>
+            <a:ext cx="10905066" cy="4961804"/>
+          </a:xfrm>
+          <a:prstGeom prst="rect">
+            <a:avLst/>
+          </a:prstGeom>
+        </p:spPr>
+      </p:pic>
+    </p:spTree>
+    <p:extLst>
+      <p:ext uri="{BB962C8B-B14F-4D97-AF65-F5344CB8AC3E}">
+        <p14:creationId xmlns:p14="http://schemas.microsoft.com/office/powerpoint/2010/main" val="1977466201"/>
+      </p:ext>
+    </p:extLst>
+  </p:cSld>
+  <p:clrMapOvr>
+    <a:masterClrMapping/>
+  </p:clrMapOvr>
+</p:sld>
+</file>
+
+<file path=ppt/slides/slide16.xml><?xml version="1.0" encoding="utf-8"?>
+<p:sld xmlns:a="http://schemas.openxmlformats.org/drawingml/2006/main" xmlns:r="http://schemas.openxmlformats.org/officeDocument/2006/relationships" xmlns:p="http://schemas.openxmlformats.org/presentationml/2006/main" showMasterSp="0">
+  <p:cSld>
+    <p:spTree>
+      <p:nvGrpSpPr>
+        <p:cNvPr id="1" name=""/>
+        <p:cNvGrpSpPr/>
+        <p:nvPr/>
+      </p:nvGrpSpPr>
+      <p:grpSpPr>
+        <a:xfrm>
+          <a:off x="0" y="0"/>
+          <a:ext cx="0" cy="0"/>
+          <a:chOff x="0" y="0"/>
+          <a:chExt cx="0" cy="0"/>
+        </a:xfrm>
+      </p:grpSpPr>
+      <p:sp>
+        <p:nvSpPr>
+          <p:cNvPr id="13" name="Title 5">
+            <a:extLst>
+              <a:ext uri="{FF2B5EF4-FFF2-40B4-BE49-F238E27FC236}">
+                <a16:creationId xmlns:a16="http://schemas.microsoft.com/office/drawing/2014/main" id="{CDC9ADFD-B255-4949-9DBF-F75C26FEB243}"/>
+              </a:ext>
+            </a:extLst>
+          </p:cNvPr>
+          <p:cNvSpPr>
+            <a:spLocks noGrp="1"/>
+          </p:cNvSpPr>
+          <p:nvPr>
+            <p:ph type="title"/>
+          </p:nvPr>
+        </p:nvSpPr>
+        <p:spPr>
+          <a:xfrm>
+            <a:off x="1027885" y="432775"/>
+            <a:ext cx="10136229" cy="1499616"/>
+          </a:xfrm>
+        </p:spPr>
+        <p:txBody>
+          <a:bodyPr>
+            <a:normAutofit/>
+          </a:bodyPr>
+          <a:lstStyle/>
+          <a:p>
+            <a:pPr algn="ctr"/>
+            <a:r>
+              <a:rPr lang="en-US" sz="4500">
+                <a:latin typeface="Aharoni" panose="02010803020104030203" pitchFamily="2" charset="-79"/>
+                <a:cs typeface="Aharoni" panose="02010803020104030203" pitchFamily="2" charset="-79"/>
+              </a:rPr>
+              <a:t>Participants</a:t>
+            </a:r>
+            <a:endParaRPr lang="en-US" sz="4500" dirty="0">
+              <a:latin typeface="Aharoni" panose="02010803020104030203" pitchFamily="2" charset="-79"/>
+              <a:cs typeface="Aharoni" panose="02010803020104030203" pitchFamily="2" charset="-79"/>
+            </a:endParaRPr>
+          </a:p>
+        </p:txBody>
+      </p:sp>
+      <p:sp>
+        <p:nvSpPr>
+          <p:cNvPr id="8" name="TextBox 10">
+            <a:extLst>
+              <a:ext uri="{FF2B5EF4-FFF2-40B4-BE49-F238E27FC236}">
+                <a16:creationId xmlns:a16="http://schemas.microsoft.com/office/drawing/2014/main" id="{DC445080-3AE9-4948-92CA-B243F5E98371}"/>
+              </a:ext>
+            </a:extLst>
+          </p:cNvPr>
+          <p:cNvSpPr txBox="1"/>
+          <p:nvPr/>
+        </p:nvSpPr>
+        <p:spPr>
+          <a:xfrm>
+            <a:off x="1379981" y="2400714"/>
+            <a:ext cx="9432036" cy="3200876"/>
+          </a:xfrm>
+          <a:prstGeom prst="rect">
+            <a:avLst/>
+          </a:prstGeom>
+          <a:noFill/>
+        </p:spPr>
+        <p:txBody>
+          <a:bodyPr wrap="square" rtlCol="0">
+            <a:spAutoFit/>
+          </a:bodyPr>
+          <a:lstStyle/>
+          <a:p>
+            <a:pPr marL="285750" indent="-285750" fontAlgn="base">
+              <a:buFont typeface="Wingdings" panose="05000000000000000000" pitchFamily="2" charset="2"/>
+              <a:buChar char="§"/>
+            </a:pPr>
+            <a:r>
+              <a:rPr lang="en-US" sz="2400" dirty="0">
+                <a:ln w="0" cmpd="thinThick">
+                  <a:solidFill>
+                    <a:schemeClr val="tx1">
+                      <a:alpha val="6000"/>
+                    </a:schemeClr>
+                  </a:solidFill>
+                </a:ln>
+                <a:latin typeface="Bahnschrift SemiLight" panose="020B0502040204020203" pitchFamily="34" charset="0"/>
+                <a:cs typeface="Times New Roman" panose="02020603050405020304" pitchFamily="18" charset="0"/>
+              </a:rPr>
+              <a:t>declares an interface common to all supported algorithms, context uses this interface to call the algorithm defined by a </a:t>
+            </a:r>
+            <a:r>
+              <a:rPr lang="en-US" sz="2400" dirty="0" err="1">
+                <a:ln w="0" cmpd="thinThick">
+                  <a:solidFill>
+                    <a:schemeClr val="tx1">
+                      <a:alpha val="6000"/>
+                    </a:schemeClr>
+                  </a:solidFill>
+                </a:ln>
+                <a:latin typeface="Bahnschrift SemiLight" panose="020B0502040204020203" pitchFamily="34" charset="0"/>
+                <a:cs typeface="Times New Roman" panose="02020603050405020304" pitchFamily="18" charset="0"/>
+              </a:rPr>
+              <a:t>concreteStrategy</a:t>
+            </a:r>
+            <a:endParaRPr lang="en-US" sz="2400" dirty="0">
+              <a:ln w="0" cmpd="thinThick">
+                <a:solidFill>
+                  <a:schemeClr val="tx1">
+                    <a:alpha val="6000"/>
+                  </a:schemeClr>
+                </a:solidFill>
+              </a:ln>
+              <a:latin typeface="Bahnschrift SemiLight" panose="020B0502040204020203" pitchFamily="34" charset="0"/>
+              <a:cs typeface="Times New Roman" panose="02020603050405020304" pitchFamily="18" charset="0"/>
+            </a:endParaRPr>
+          </a:p>
+          <a:p>
+            <a:pPr marL="285750" indent="-285750" fontAlgn="base">
+              <a:buFont typeface="Wingdings" panose="05000000000000000000" pitchFamily="2" charset="2"/>
+              <a:buChar char="§"/>
+            </a:pPr>
+            <a:endParaRPr lang="en-US" sz="500" dirty="0">
+              <a:ln w="0" cmpd="thinThick">
+                <a:solidFill>
+                  <a:schemeClr val="tx1">
+                    <a:alpha val="6000"/>
+                  </a:schemeClr>
+                </a:solidFill>
+              </a:ln>
+              <a:latin typeface="Bahnschrift SemiLight" panose="020B0502040204020203" pitchFamily="34" charset="0"/>
+              <a:cs typeface="Times New Roman" panose="02020603050405020304" pitchFamily="18" charset="0"/>
+            </a:endParaRPr>
+          </a:p>
+          <a:p>
+            <a:pPr marL="285750" indent="-285750" fontAlgn="base">
+              <a:buFont typeface="Wingdings" panose="05000000000000000000" pitchFamily="2" charset="2"/>
+              <a:buChar char="§"/>
+            </a:pPr>
+            <a:r>
+              <a:rPr lang="en-US" sz="2400" dirty="0" err="1">
+                <a:ln w="0" cmpd="thinThick">
+                  <a:solidFill>
+                    <a:schemeClr val="tx1">
+                      <a:alpha val="6000"/>
+                    </a:schemeClr>
+                  </a:solidFill>
+                </a:ln>
+                <a:latin typeface="Bahnschrift SemiLight" panose="020B0502040204020203" pitchFamily="34" charset="0"/>
+                <a:cs typeface="Times New Roman" panose="02020603050405020304" pitchFamily="18" charset="0"/>
+              </a:rPr>
+              <a:t>concreteStrategy</a:t>
+            </a:r>
+            <a:r>
+              <a:rPr lang="en-US" sz="2400" dirty="0">
+                <a:ln w="0" cmpd="thinThick">
+                  <a:solidFill>
+                    <a:schemeClr val="tx1">
+                      <a:alpha val="6000"/>
+                    </a:schemeClr>
+                  </a:solidFill>
+                </a:ln>
+                <a:latin typeface="Bahnschrift SemiLight" panose="020B0502040204020203" pitchFamily="34" charset="0"/>
+                <a:cs typeface="Times New Roman" panose="02020603050405020304" pitchFamily="18" charset="0"/>
+              </a:rPr>
+              <a:t> implements the algorithm using the strategy interface</a:t>
+            </a:r>
+          </a:p>
+          <a:p>
+            <a:pPr marL="285750" indent="-285750" fontAlgn="base">
+              <a:buFont typeface="Wingdings" panose="05000000000000000000" pitchFamily="2" charset="2"/>
+              <a:buChar char="§"/>
+            </a:pPr>
+            <a:endParaRPr lang="en-US" sz="500" dirty="0">
+              <a:ln w="0" cmpd="thinThick">
+                <a:solidFill>
+                  <a:schemeClr val="tx1">
+                    <a:alpha val="6000"/>
+                  </a:schemeClr>
+                </a:solidFill>
+              </a:ln>
+              <a:latin typeface="Bahnschrift SemiLight" panose="020B0502040204020203" pitchFamily="34" charset="0"/>
+              <a:cs typeface="Times New Roman" panose="02020603050405020304" pitchFamily="18" charset="0"/>
+            </a:endParaRPr>
+          </a:p>
+          <a:p>
+            <a:pPr marL="285750" indent="-285750" fontAlgn="base">
+              <a:buFont typeface="Wingdings" panose="05000000000000000000" pitchFamily="2" charset="2"/>
+              <a:buChar char="§"/>
+            </a:pPr>
+            <a:r>
+              <a:rPr lang="en-US" sz="2400" dirty="0" err="1">
+                <a:ln w="0" cmpd="thinThick">
+                  <a:solidFill>
+                    <a:schemeClr val="tx1">
+                      <a:alpha val="6000"/>
+                    </a:schemeClr>
+                  </a:solidFill>
+                </a:ln>
+                <a:latin typeface="Bahnschrift SemiLight" panose="020B0502040204020203" pitchFamily="34" charset="0"/>
+                <a:cs typeface="Times New Roman" panose="02020603050405020304" pitchFamily="18" charset="0"/>
+              </a:rPr>
+              <a:t>contex</a:t>
+            </a:r>
+            <a:r>
+              <a:rPr lang="en-US" sz="2400" dirty="0">
+                <a:ln w="0" cmpd="thinThick">
+                  <a:solidFill>
+                    <a:schemeClr val="tx1">
+                      <a:alpha val="6000"/>
+                    </a:schemeClr>
+                  </a:solidFill>
+                </a:ln>
+                <a:latin typeface="Bahnschrift SemiLight" panose="020B0502040204020203" pitchFamily="34" charset="0"/>
+                <a:cs typeface="Times New Roman" panose="02020603050405020304" pitchFamily="18" charset="0"/>
+              </a:rPr>
+              <a:t> configured with a </a:t>
+            </a:r>
+            <a:r>
+              <a:rPr lang="en-US" sz="2400" dirty="0" err="1">
+                <a:ln w="0" cmpd="thinThick">
+                  <a:solidFill>
+                    <a:schemeClr val="tx1">
+                      <a:alpha val="6000"/>
+                    </a:schemeClr>
+                  </a:solidFill>
+                </a:ln>
+                <a:latin typeface="Bahnschrift SemiLight" panose="020B0502040204020203" pitchFamily="34" charset="0"/>
+                <a:cs typeface="Times New Roman" panose="02020603050405020304" pitchFamily="18" charset="0"/>
+              </a:rPr>
+              <a:t>concreteStrategy</a:t>
+            </a:r>
+            <a:r>
+              <a:rPr lang="en-US" sz="2400" dirty="0">
+                <a:ln w="0" cmpd="thinThick">
+                  <a:solidFill>
+                    <a:schemeClr val="tx1">
+                      <a:alpha val="6000"/>
+                    </a:schemeClr>
+                  </a:solidFill>
+                </a:ln>
+                <a:latin typeface="Bahnschrift SemiLight" panose="020B0502040204020203" pitchFamily="34" charset="0"/>
+                <a:cs typeface="Times New Roman" panose="02020603050405020304" pitchFamily="18" charset="0"/>
+              </a:rPr>
+              <a:t> object, maintains a reference to a strategy object, may define an interface that lets strategy access its data</a:t>
+            </a:r>
+            <a:endParaRPr lang="en-US" sz="1600" dirty="0">
+              <a:ln w="0" cmpd="thinThick">
+                <a:solidFill>
+                  <a:schemeClr val="tx1">
+                    <a:alpha val="6000"/>
+                  </a:schemeClr>
+                </a:solidFill>
+              </a:ln>
+              <a:solidFill>
+                <a:schemeClr val="bg1"/>
+              </a:solidFill>
+              <a:latin typeface="Bahnschrift SemiLight" panose="020B0502040204020203" pitchFamily="34" charset="0"/>
+              <a:cs typeface="Times New Roman" panose="02020603050405020304" pitchFamily="18" charset="0"/>
+            </a:endParaRPr>
+          </a:p>
+        </p:txBody>
+      </p:sp>
+    </p:spTree>
+    <p:extLst>
+      <p:ext uri="{BB962C8B-B14F-4D97-AF65-F5344CB8AC3E}">
+        <p14:creationId xmlns:p14="http://schemas.microsoft.com/office/powerpoint/2010/main" val="3654986529"/>
+      </p:ext>
+    </p:extLst>
+  </p:cSld>
+  <p:clrMapOvr>
+    <a:masterClrMapping/>
+  </p:clrMapOvr>
+  <p:timing>
+    <p:tnLst>
+      <p:par>
+        <p:cTn id="1" dur="indefinite" restart="never" nodeType="tmRoot">
+          <p:childTnLst>
+            <p:seq concurrent="1" nextAc="seek">
+              <p:cTn id="2" dur="indefinite" nodeType="mainSeq">
+                <p:childTnLst>
+                  <p:par>
+                    <p:cTn id="3" fill="hold">
+                      <p:stCondLst>
+                        <p:cond delay="indefinite"/>
+                      </p:stCondLst>
+                      <p:childTnLst>
+                        <p:par>
+                          <p:cTn id="4" fill="hold">
+                            <p:stCondLst>
+                              <p:cond delay="0"/>
+                            </p:stCondLst>
+                            <p:childTnLst>
+                              <p:par>
+                                <p:cTn id="5" presetID="22" presetClass="entr" presetSubtype="8" fill="hold" grpId="0" nodeType="clickEffect">
+                                  <p:stCondLst>
+                                    <p:cond delay="0"/>
+                                  </p:stCondLst>
+                                  <p:childTnLst>
+                                    <p:set>
+                                      <p:cBhvr>
+                                        <p:cTn id="6" dur="1" fill="hold">
+                                          <p:stCondLst>
+                                            <p:cond delay="0"/>
+                                          </p:stCondLst>
+                                        </p:cTn>
+                                        <p:tgtEl>
+                                          <p:spTgt spid="8">
+                                            <p:txEl>
+                                              <p:pRg st="0" end="0"/>
+                                            </p:txEl>
+                                          </p:spTgt>
+                                        </p:tgtEl>
+                                        <p:attrNameLst>
+                                          <p:attrName>style.visibility</p:attrName>
+                                        </p:attrNameLst>
+                                      </p:cBhvr>
+                                      <p:to>
+                                        <p:strVal val="visible"/>
+                                      </p:to>
+                                    </p:set>
+                                    <p:animEffect transition="in" filter="wipe(left)">
+                                      <p:cBhvr>
+                                        <p:cTn id="7" dur="500"/>
+                                        <p:tgtEl>
+                                          <p:spTgt spid="8">
+                                            <p:txEl>
+                                              <p:pRg st="0" end="0"/>
+                                            </p:txEl>
+                                          </p:spTgt>
+                                        </p:tgtEl>
+                                      </p:cBhvr>
+                                    </p:animEffect>
+                                  </p:childTnLst>
+                                </p:cTn>
+                              </p:par>
+                            </p:childTnLst>
+                          </p:cTn>
+                        </p:par>
+                      </p:childTnLst>
+                    </p:cTn>
+                  </p:par>
+                  <p:par>
+                    <p:cTn id="8" fill="hold">
+                      <p:stCondLst>
+                        <p:cond delay="indefinite"/>
+                      </p:stCondLst>
+                      <p:childTnLst>
+                        <p:par>
+                          <p:cTn id="9" fill="hold">
+                            <p:stCondLst>
+                              <p:cond delay="0"/>
+                            </p:stCondLst>
+                            <p:childTnLst>
+                              <p:par>
+                                <p:cTn id="10" presetID="22" presetClass="entr" presetSubtype="8" fill="hold" grpId="0" nodeType="clickEffect">
+                                  <p:stCondLst>
+                                    <p:cond delay="0"/>
+                                  </p:stCondLst>
+                                  <p:childTnLst>
+                                    <p:set>
+                                      <p:cBhvr>
+                                        <p:cTn id="11" dur="1" fill="hold">
+                                          <p:stCondLst>
+                                            <p:cond delay="0"/>
+                                          </p:stCondLst>
+                                        </p:cTn>
+                                        <p:tgtEl>
+                                          <p:spTgt spid="8">
+                                            <p:txEl>
+                                              <p:pRg st="2" end="2"/>
+                                            </p:txEl>
+                                          </p:spTgt>
+                                        </p:tgtEl>
+                                        <p:attrNameLst>
+                                          <p:attrName>style.visibility</p:attrName>
+                                        </p:attrNameLst>
+                                      </p:cBhvr>
+                                      <p:to>
+                                        <p:strVal val="visible"/>
+                                      </p:to>
+                                    </p:set>
+                                    <p:animEffect transition="in" filter="wipe(left)">
+                                      <p:cBhvr>
+                                        <p:cTn id="12" dur="500"/>
+                                        <p:tgtEl>
+                                          <p:spTgt spid="8">
+                                            <p:txEl>
+                                              <p:pRg st="2" end="2"/>
+                                            </p:txEl>
+                                          </p:spTgt>
+                                        </p:tgtEl>
+                                      </p:cBhvr>
+                                    </p:animEffect>
+                                  </p:childTnLst>
+                                </p:cTn>
+                              </p:par>
+                            </p:childTnLst>
+                          </p:cTn>
+                        </p:par>
+                      </p:childTnLst>
+                    </p:cTn>
+                  </p:par>
+                  <p:par>
+                    <p:cTn id="13" fill="hold">
+                      <p:stCondLst>
+                        <p:cond delay="indefinite"/>
+                      </p:stCondLst>
+                      <p:childTnLst>
+                        <p:par>
+                          <p:cTn id="14" fill="hold">
+                            <p:stCondLst>
+                              <p:cond delay="0"/>
+                            </p:stCondLst>
+                            <p:childTnLst>
+                              <p:par>
+                                <p:cTn id="15" presetID="22" presetClass="entr" presetSubtype="8" fill="hold" grpId="0" nodeType="clickEffect">
+                                  <p:stCondLst>
+                                    <p:cond delay="0"/>
+                                  </p:stCondLst>
+                                  <p:childTnLst>
+                                    <p:set>
+                                      <p:cBhvr>
+                                        <p:cTn id="16" dur="1" fill="hold">
+                                          <p:stCondLst>
+                                            <p:cond delay="0"/>
+                                          </p:stCondLst>
+                                        </p:cTn>
+                                        <p:tgtEl>
+                                          <p:spTgt spid="8">
+                                            <p:txEl>
+                                              <p:pRg st="4" end="4"/>
+                                            </p:txEl>
+                                          </p:spTgt>
+                                        </p:tgtEl>
+                                        <p:attrNameLst>
+                                          <p:attrName>style.visibility</p:attrName>
+                                        </p:attrNameLst>
+                                      </p:cBhvr>
+                                      <p:to>
+                                        <p:strVal val="visible"/>
+                                      </p:to>
+                                    </p:set>
+                                    <p:animEffect transition="in" filter="wipe(left)">
+                                      <p:cBhvr>
+                                        <p:cTn id="17" dur="500"/>
+                                        <p:tgtEl>
+                                          <p:spTgt spid="8">
+                                            <p:txEl>
+                                              <p:pRg st="4" end="4"/>
+                                            </p:txEl>
+                                          </p:spTgt>
+                                        </p:tgtEl>
+                                      </p:cBhvr>
+                                    </p:animEffect>
+                                  </p:childTnLst>
+                                </p:cTn>
+                              </p:par>
+                            </p:childTnLst>
+                          </p:cTn>
+                        </p:par>
+                      </p:childTnLst>
+                    </p:cTn>
+                  </p:par>
+                </p:childTnLst>
+              </p:cTn>
+              <p:prevCondLst>
+                <p:cond evt="onPrev" delay="0">
+                  <p:tgtEl>
+                    <p:sldTgt/>
+                  </p:tgtEl>
+                </p:cond>
+              </p:prevCondLst>
+              <p:nextCondLst>
+                <p:cond evt="onNext" delay="0">
+                  <p:tgtEl>
+                    <p:sldTgt/>
+                  </p:tgtEl>
+                </p:cond>
+              </p:nextCondLst>
+            </p:seq>
+          </p:childTnLst>
+        </p:cTn>
+      </p:par>
+    </p:tnLst>
+    <p:bldLst>
+      <p:bldP spid="8" grpId="0" build="p"/>
+    </p:bldLst>
+  </p:timing>
+</p:sld>
+</file>
+
+<file path=ppt/slides/slide17.xml><?xml version="1.0" encoding="utf-8"?>
 <p:sld xmlns:a="http://schemas.openxmlformats.org/drawingml/2006/main" xmlns:r="http://schemas.openxmlformats.org/officeDocument/2006/relationships" xmlns:p="http://schemas.openxmlformats.org/presentationml/2006/main" showMasterSp="0">
   <p:cSld>
     <p:spTree>
@@ -4733,8 +5279,8 @@
         </p:nvSpPr>
         <p:spPr>
           <a:xfrm>
-            <a:off x="1027885" y="432775"/>
-            <a:ext cx="10136229" cy="1499616"/>
+            <a:off x="813488" y="510942"/>
+            <a:ext cx="10565024" cy="1499616"/>
           </a:xfrm>
         </p:spPr>
         <p:txBody>
@@ -4749,7 +5295,7 @@
                 <a:latin typeface="Aharoni" panose="02010803020104030203" pitchFamily="2" charset="-79"/>
                 <a:cs typeface="Aharoni" panose="02010803020104030203" pitchFamily="2" charset="-79"/>
               </a:rPr>
-              <a:t>Advantages   &amp;   disadvantage</a:t>
+              <a:t>Advantages &amp; disadvantages</a:t>
             </a:r>
           </a:p>
         </p:txBody>
@@ -4902,7 +5448,7 @@
     </p:spTree>
     <p:extLst>
       <p:ext uri="{BB962C8B-B14F-4D97-AF65-F5344CB8AC3E}">
-        <p14:creationId xmlns:p14="http://schemas.microsoft.com/office/powerpoint/2010/main" val="3654986529"/>
+        <p14:creationId xmlns:p14="http://schemas.microsoft.com/office/powerpoint/2010/main" val="1107218124"/>
       </p:ext>
     </p:extLst>
   </p:cSld>
@@ -5051,7 +5597,7 @@
 </p:sld>
 </file>
 
-<file path=ppt/slides/slide16.xml><?xml version="1.0" encoding="utf-8"?>
+<file path=ppt/slides/slide18.xml><?xml version="1.0" encoding="utf-8"?>
 <p:sld xmlns:a="http://schemas.openxmlformats.org/drawingml/2006/main" xmlns:r="http://schemas.openxmlformats.org/officeDocument/2006/relationships" xmlns:p="http://schemas.openxmlformats.org/presentationml/2006/main" showMasterSp="0">
   <p:cSld>
     <p:spTree>
@@ -5629,7 +6175,7 @@
 </p:sld>
 </file>
 
-<file path=ppt/slides/slide17.xml><?xml version="1.0" encoding="utf-8"?>
+<file path=ppt/slides/slide19.xml><?xml version="1.0" encoding="utf-8"?>
 <p:sld xmlns:a="http://schemas.openxmlformats.org/drawingml/2006/main" xmlns:r="http://schemas.openxmlformats.org/officeDocument/2006/relationships" xmlns:p="http://schemas.openxmlformats.org/presentationml/2006/main" showMasterSp="0">
   <p:cSld>
     <p:spTree>
@@ -6266,7 +6812,141 @@
 </p:sld>
 </file>
 
-<file path=ppt/slides/slide18.xml><?xml version="1.0" encoding="utf-8"?>
+<file path=ppt/slides/slide2.xml><?xml version="1.0" encoding="utf-8"?>
+<p:sld xmlns:a="http://schemas.openxmlformats.org/drawingml/2006/main" xmlns:r="http://schemas.openxmlformats.org/officeDocument/2006/relationships" xmlns:p="http://schemas.openxmlformats.org/presentationml/2006/main" showMasterSp="0">
+  <p:cSld>
+    <p:bg>
+      <p:bgPr>
+        <a:solidFill>
+          <a:schemeClr val="bg1"/>
+        </a:solidFill>
+        <a:effectLst/>
+      </p:bgPr>
+    </p:bg>
+    <p:spTree>
+      <p:nvGrpSpPr>
+        <p:cNvPr id="1" name=""/>
+        <p:cNvGrpSpPr/>
+        <p:nvPr/>
+      </p:nvGrpSpPr>
+      <p:grpSpPr>
+        <a:xfrm>
+          <a:off x="0" y="0"/>
+          <a:ext cx="0" cy="0"/>
+          <a:chOff x="0" y="0"/>
+          <a:chExt cx="0" cy="0"/>
+        </a:xfrm>
+      </p:grpSpPr>
+      <p:sp>
+        <p:nvSpPr>
+          <p:cNvPr id="4" name="TextBox 3">
+            <a:extLst>
+              <a:ext uri="{FF2B5EF4-FFF2-40B4-BE49-F238E27FC236}">
+                <a16:creationId xmlns:a16="http://schemas.microsoft.com/office/drawing/2014/main" id="{B5A78BAB-5811-43A9-9B30-95AE3C1663E0}"/>
+              </a:ext>
+            </a:extLst>
+          </p:cNvPr>
+          <p:cNvSpPr txBox="1"/>
+          <p:nvPr/>
+        </p:nvSpPr>
+        <p:spPr>
+          <a:xfrm>
+            <a:off x="1491842" y="646883"/>
+            <a:ext cx="8841996" cy="938719"/>
+          </a:xfrm>
+          <a:prstGeom prst="rect">
+            <a:avLst/>
+          </a:prstGeom>
+          <a:noFill/>
+        </p:spPr>
+        <p:txBody>
+          <a:bodyPr wrap="square" rtlCol="0">
+            <a:spAutoFit/>
+          </a:bodyPr>
+          <a:lstStyle/>
+          <a:p>
+            <a:pPr algn="ctr">
+              <a:spcBef>
+                <a:spcPts val="300"/>
+              </a:spcBef>
+            </a:pPr>
+            <a:r>
+              <a:rPr lang="en-US" sz="5500" dirty="0">
+                <a:solidFill>
+                  <a:schemeClr val="accent4">
+                    <a:lumMod val="50000"/>
+                  </a:schemeClr>
+                </a:solidFill>
+                <a:latin typeface="Aharoni" panose="02010803020104030203" pitchFamily="2" charset="-79"/>
+                <a:ea typeface="Verdana" panose="020B0604030504040204" pitchFamily="34" charset="0"/>
+                <a:cs typeface="Aharoni" panose="02010803020104030203" pitchFamily="2" charset="-79"/>
+              </a:rPr>
+              <a:t>What is strategy?</a:t>
+            </a:r>
+          </a:p>
+        </p:txBody>
+      </p:sp>
+      <p:pic>
+        <p:nvPicPr>
+          <p:cNvPr id="1030" name="Picture 6" descr="Image result for tom and jerry holding bomb&quot;">
+            <a:extLst>
+              <a:ext uri="{FF2B5EF4-FFF2-40B4-BE49-F238E27FC236}">
+                <a16:creationId xmlns:a16="http://schemas.microsoft.com/office/drawing/2014/main" id="{D85940D6-AC2E-49BE-B7A9-A9802341473C}"/>
+              </a:ext>
+            </a:extLst>
+          </p:cNvPr>
+          <p:cNvPicPr>
+            <a:picLocks noChangeAspect="1" noChangeArrowheads="1"/>
+          </p:cNvPicPr>
+          <p:nvPr/>
+        </p:nvPicPr>
+        <p:blipFill>
+          <a:blip r:embed="rId2">
+            <a:extLst>
+              <a:ext uri="{28A0092B-C50C-407E-A947-70E740481C1C}">
+                <a14:useLocalDpi xmlns:a14="http://schemas.microsoft.com/office/drawing/2010/main" val="0"/>
+              </a:ext>
+            </a:extLst>
+          </a:blip>
+          <a:srcRect/>
+          <a:stretch>
+            <a:fillRect/>
+          </a:stretch>
+        </p:blipFill>
+        <p:spPr bwMode="auto">
+          <a:xfrm>
+            <a:off x="3497316" y="1653346"/>
+            <a:ext cx="4627179" cy="4557771"/>
+          </a:xfrm>
+          <a:prstGeom prst="rect">
+            <a:avLst/>
+          </a:prstGeom>
+          <a:noFill/>
+          <a:extLst>
+            <a:ext uri="{909E8E84-426E-40DD-AFC4-6F175D3DCCD1}">
+              <a14:hiddenFill xmlns:a14="http://schemas.microsoft.com/office/drawing/2010/main">
+                <a:solidFill>
+                  <a:srgbClr val="FFFFFF"/>
+                </a:solidFill>
+              </a14:hiddenFill>
+            </a:ext>
+          </a:extLst>
+        </p:spPr>
+      </p:pic>
+    </p:spTree>
+    <p:extLst>
+      <p:ext uri="{BB962C8B-B14F-4D97-AF65-F5344CB8AC3E}">
+        <p14:creationId xmlns:p14="http://schemas.microsoft.com/office/powerpoint/2010/main" val="830906783"/>
+      </p:ext>
+    </p:extLst>
+  </p:cSld>
+  <p:clrMapOvr>
+    <a:masterClrMapping/>
+  </p:clrMapOvr>
+</p:sld>
+</file>
+
+<file path=ppt/slides/slide20.xml><?xml version="1.0" encoding="utf-8"?>
 <p:sld xmlns:a="http://schemas.openxmlformats.org/drawingml/2006/main" xmlns:r="http://schemas.openxmlformats.org/officeDocument/2006/relationships" xmlns:p="http://schemas.openxmlformats.org/presentationml/2006/main" showMasterSp="0">
   <p:cSld>
     <p:spTree>
@@ -6363,6 +7043,7 @@
           </a:bodyPr>
           <a:lstStyle/>
           <a:p>
+            <a:pPr algn="ctr"/>
             <a:r>
               <a:rPr lang="en-US" sz="3200" dirty="0">
                 <a:solidFill>
@@ -6371,7 +7052,7 @@
                 <a:latin typeface="Bahnschrift SemiBold" panose="020B0502040204020203" pitchFamily="34" charset="0"/>
                 <a:cs typeface="Times New Roman" panose="02020603050405020304" pitchFamily="18" charset="0"/>
               </a:rPr>
-              <a:t>Which group does Strategy pattern belong to? </a:t>
+              <a:t>Which is the definition of Strategy Pattern? </a:t>
             </a:r>
           </a:p>
           <a:p>
@@ -6869,7 +7550,7 @@
 </p:sld>
 </file>
 
-<file path=ppt/slides/slide19.xml><?xml version="1.0" encoding="utf-8"?>
+<file path=ppt/slides/slide21.xml><?xml version="1.0" encoding="utf-8"?>
 <p:sld xmlns:a="http://schemas.openxmlformats.org/drawingml/2006/main" xmlns:r="http://schemas.openxmlformats.org/officeDocument/2006/relationships" xmlns:p="http://schemas.openxmlformats.org/presentationml/2006/main" showMasterSp="0">
   <p:cSld>
     <p:spTree>
@@ -6997,8 +7678,8 @@
         </p:nvSpPr>
         <p:spPr>
           <a:xfrm>
-            <a:off x="2405017" y="3394805"/>
-            <a:ext cx="2997302" cy="584775"/>
+            <a:off x="2396691" y="3429000"/>
+            <a:ext cx="3005628" cy="582369"/>
           </a:xfrm>
           <a:prstGeom prst="rect">
             <a:avLst/>
@@ -7364,142 +8045,8 @@
 </p:sld>
 </file>
 
-<file path=ppt/slides/slide2.xml><?xml version="1.0" encoding="utf-8"?>
-<p:sld xmlns:a="http://schemas.openxmlformats.org/drawingml/2006/main" xmlns:r="http://schemas.openxmlformats.org/officeDocument/2006/relationships" xmlns:p="http://schemas.openxmlformats.org/presentationml/2006/main" showMasterSp="0">
-  <p:cSld>
-    <p:bg>
-      <p:bgPr>
-        <a:solidFill>
-          <a:schemeClr val="bg1"/>
-        </a:solidFill>
-        <a:effectLst/>
-      </p:bgPr>
-    </p:bg>
-    <p:spTree>
-      <p:nvGrpSpPr>
-        <p:cNvPr id="1" name=""/>
-        <p:cNvGrpSpPr/>
-        <p:nvPr/>
-      </p:nvGrpSpPr>
-      <p:grpSpPr>
-        <a:xfrm>
-          <a:off x="0" y="0"/>
-          <a:ext cx="0" cy="0"/>
-          <a:chOff x="0" y="0"/>
-          <a:chExt cx="0" cy="0"/>
-        </a:xfrm>
-      </p:grpSpPr>
-      <p:sp>
-        <p:nvSpPr>
-          <p:cNvPr id="4" name="TextBox 3">
-            <a:extLst>
-              <a:ext uri="{FF2B5EF4-FFF2-40B4-BE49-F238E27FC236}">
-                <a16:creationId xmlns:a16="http://schemas.microsoft.com/office/drawing/2014/main" id="{B5A78BAB-5811-43A9-9B30-95AE3C1663E0}"/>
-              </a:ext>
-            </a:extLst>
-          </p:cNvPr>
-          <p:cNvSpPr txBox="1"/>
-          <p:nvPr/>
-        </p:nvSpPr>
-        <p:spPr>
-          <a:xfrm>
-            <a:off x="1491842" y="646883"/>
-            <a:ext cx="8841996" cy="938719"/>
-          </a:xfrm>
-          <a:prstGeom prst="rect">
-            <a:avLst/>
-          </a:prstGeom>
-          <a:noFill/>
-        </p:spPr>
-        <p:txBody>
-          <a:bodyPr wrap="square" rtlCol="0">
-            <a:spAutoFit/>
-          </a:bodyPr>
-          <a:lstStyle/>
-          <a:p>
-            <a:pPr algn="ctr">
-              <a:spcBef>
-                <a:spcPts val="300"/>
-              </a:spcBef>
-            </a:pPr>
-            <a:r>
-              <a:rPr lang="en-US" sz="5500" dirty="0">
-                <a:solidFill>
-                  <a:schemeClr val="accent4">
-                    <a:lumMod val="50000"/>
-                  </a:schemeClr>
-                </a:solidFill>
-                <a:latin typeface="Aharoni" panose="02010803020104030203" pitchFamily="2" charset="-79"/>
-                <a:ea typeface="Verdana" panose="020B0604030504040204" pitchFamily="34" charset="0"/>
-                <a:cs typeface="Aharoni" panose="02010803020104030203" pitchFamily="2" charset="-79"/>
-              </a:rPr>
-              <a:t>What is strategy?</a:t>
-            </a:r>
-          </a:p>
-        </p:txBody>
-      </p:sp>
-      <p:pic>
-        <p:nvPicPr>
-          <p:cNvPr id="1030" name="Picture 6" descr="Image result for tom and jerry holding bomb&quot;">
-            <a:extLst>
-              <a:ext uri="{FF2B5EF4-FFF2-40B4-BE49-F238E27FC236}">
-                <a16:creationId xmlns:a16="http://schemas.microsoft.com/office/drawing/2014/main" id="{D85940D6-AC2E-49BE-B7A9-A9802341473C}"/>
-              </a:ext>
-            </a:extLst>
-          </p:cNvPr>
-          <p:cNvPicPr>
-            <a:picLocks noChangeAspect="1" noChangeArrowheads="1"/>
-          </p:cNvPicPr>
-          <p:nvPr/>
-        </p:nvPicPr>
-        <p:blipFill>
-          <a:blip r:embed="rId2">
-            <a:extLst>
-              <a:ext uri="{28A0092B-C50C-407E-A947-70E740481C1C}">
-                <a14:useLocalDpi xmlns:a14="http://schemas.microsoft.com/office/drawing/2010/main" val="0"/>
-              </a:ext>
-            </a:extLst>
-          </a:blip>
-          <a:srcRect/>
-          <a:stretch>
-            <a:fillRect/>
-          </a:stretch>
-        </p:blipFill>
-        <p:spPr bwMode="auto">
-          <a:xfrm>
-            <a:off x="3497316" y="1653346"/>
-            <a:ext cx="4627179" cy="4557771"/>
-          </a:xfrm>
-          <a:prstGeom prst="rect">
-            <a:avLst/>
-          </a:prstGeom>
-          <a:noFill/>
-          <a:extLst>
-            <a:ext uri="{909E8E84-426E-40DD-AFC4-6F175D3DCCD1}">
-              <a14:hiddenFill xmlns:a14="http://schemas.microsoft.com/office/drawing/2010/main">
-                <a:solidFill>
-                  <a:srgbClr val="FFFFFF"/>
-                </a:solidFill>
-              </a14:hiddenFill>
-            </a:ext>
-          </a:extLst>
-        </p:spPr>
-      </p:pic>
-    </p:spTree>
-    <p:extLst>
-      <p:ext uri="{BB962C8B-B14F-4D97-AF65-F5344CB8AC3E}">
-        <p14:creationId xmlns:p14="http://schemas.microsoft.com/office/powerpoint/2010/main" val="830906783"/>
-      </p:ext>
-    </p:extLst>
-  </p:cSld>
-  <p:clrMapOvr>
-    <a:masterClrMapping/>
-  </p:clrMapOvr>
-</p:sld>
-</file>
-
-<file path=ppt/slides/slide20.xml><?xml version="1.0" encoding="utf-8"?>
-<p:sld xmlns:a="http://schemas.openxmlformats.org/drawingml/2006/main" xmlns:r="http://schemas.openxmlformats.org/officeDocument/2006/relationships" xmlns:p="http://schemas.openxmlformats.org/presentationml/2006/main" showMasterSp="0">
+<file path=ppt/slides/slide22.xml><?xml version="1.0" encoding="utf-8"?>
+<p:sld xmlns:a="http://schemas.openxmlformats.org/drawingml/2006/main" xmlns:r="http://schemas.openxmlformats.org/officeDocument/2006/relationships" xmlns:p="http://schemas.openxmlformats.org/presentationml/2006/main">
   <p:cSld>
     <p:spTree>
       <p:nvGrpSpPr>
@@ -7517,10 +8064,10 @@
       </p:grpSpPr>
       <p:sp>
         <p:nvSpPr>
-          <p:cNvPr id="14" name="TextBox 13">
+          <p:cNvPr id="7" name="TextBox 6">
             <a:extLst>
               <a:ext uri="{FF2B5EF4-FFF2-40B4-BE49-F238E27FC236}">
-                <a16:creationId xmlns:a16="http://schemas.microsoft.com/office/drawing/2014/main" id="{32FB5582-0011-46BE-AA44-F3D8E0F0A8D3}"/>
+                <a16:creationId xmlns:a16="http://schemas.microsoft.com/office/drawing/2014/main" id="{0C98E2B9-6708-4D79-96A1-2B9622E11C3E}"/>
               </a:ext>
             </a:extLst>
           </p:cNvPr>
@@ -7529,8 +8076,8 @@
         </p:nvSpPr>
         <p:spPr>
           <a:xfrm>
-            <a:off x="1422300" y="889843"/>
-            <a:ext cx="9347400" cy="5078313"/>
+            <a:off x="1482291" y="1405288"/>
+            <a:ext cx="9894770" cy="4067396"/>
           </a:xfrm>
           <a:prstGeom prst="rect">
             <a:avLst/>
@@ -7544,27 +8091,39 @@
           <a:lstStyle/>
           <a:p>
             <a:r>
-              <a:rPr lang="en-US" sz="3200" dirty="0">
+              <a:rPr lang="en-US" sz="4000" dirty="0">
                 <a:solidFill>
                   <a:srgbClr val="0685A9"/>
                 </a:solidFill>
                 <a:latin typeface="Bahnschrift SemiBold" panose="020B0502040204020203" pitchFamily="34" charset="0"/>
                 <a:cs typeface="Times New Roman" panose="02020603050405020304" pitchFamily="18" charset="0"/>
               </a:rPr>
-              <a:t>Which of the following describes the Strategy pattern correctly?</a:t>
-            </a:r>
+              <a:t>When would the Strategy Pattern be used?</a:t>
+            </a:r>
+          </a:p>
+          <a:p>
+            <a:endParaRPr lang="en-US" sz="2800" dirty="0">
+              <a:solidFill>
+                <a:srgbClr val="0685A9"/>
+              </a:solidFill>
+              <a:latin typeface="Bahnschrift SemiBold" panose="020B0502040204020203" pitchFamily="34" charset="0"/>
+              <a:cs typeface="Times New Roman" panose="02020603050405020304" pitchFamily="18" charset="0"/>
+            </a:endParaRPr>
           </a:p>
           <a:p>
             <a:pPr marL="342900" indent="-342900">
               <a:buAutoNum type="arabicPeriod"/>
             </a:pPr>
-            <a:endParaRPr lang="en-US" sz="3200" dirty="0">
+            <a:endParaRPr lang="en-US" sz="2800" dirty="0">
               <a:latin typeface="Bahnschrift SemiLight" panose="020B0502040204020203" pitchFamily="34" charset="0"/>
               <a:cs typeface="Times New Roman" panose="02020603050405020304" pitchFamily="18" charset="0"/>
             </a:endParaRPr>
           </a:p>
           <a:p>
             <a:pPr marL="514350" indent="-514350">
+              <a:lnSpc>
+                <a:spcPct val="150000"/>
+              </a:lnSpc>
               <a:buAutoNum type="alphaUcPeriod"/>
             </a:pPr>
             <a:r>
@@ -7572,11 +8131,14 @@
                 <a:latin typeface="Bahnschrift SemiLight" panose="020B0502040204020203" pitchFamily="34" charset="0"/>
                 <a:cs typeface="Times New Roman" panose="02020603050405020304" pitchFamily="18" charset="0"/>
               </a:rPr>
-              <a:t>In this pattern, a class behavior changes based on its state. </a:t>
+              <a:t>many related classes differ only in their behavior. </a:t>
             </a:r>
           </a:p>
           <a:p>
             <a:pPr marL="514350" indent="-514350">
+              <a:lnSpc>
+                <a:spcPct val="150000"/>
+              </a:lnSpc>
               <a:buAutoNum type="alphaUcPeriod"/>
             </a:pPr>
             <a:r>
@@ -7584,11 +8146,14 @@
                 <a:latin typeface="Bahnschrift SemiLight" panose="020B0502040204020203" pitchFamily="34" charset="0"/>
                 <a:cs typeface="Times New Roman" panose="02020603050405020304" pitchFamily="18" charset="0"/>
               </a:rPr>
-              <a:t>In this pattern, a null object replaces check of NULL object instance. </a:t>
+              <a:t>you need different variants of an algorithm. </a:t>
             </a:r>
           </a:p>
           <a:p>
             <a:pPr marL="514350" indent="-514350">
+              <a:lnSpc>
+                <a:spcPct val="150000"/>
+              </a:lnSpc>
               <a:buAutoNum type="alphaUcPeriod"/>
             </a:pPr>
             <a:r>
@@ -7596,11 +8161,14 @@
                 <a:latin typeface="Bahnschrift SemiLight" panose="020B0502040204020203" pitchFamily="34" charset="0"/>
                 <a:cs typeface="Times New Roman" panose="02020603050405020304" pitchFamily="18" charset="0"/>
               </a:rPr>
-              <a:t>In this pattern, a class behavior or its algorithm can be changed at run time. </a:t>
+              <a:t>an algorithm uses data that clients shouldn't know about. </a:t>
             </a:r>
           </a:p>
           <a:p>
             <a:pPr marL="514350" indent="-514350">
+              <a:lnSpc>
+                <a:spcPct val="150000"/>
+              </a:lnSpc>
               <a:buAutoNum type="alphaUcPeriod"/>
             </a:pPr>
             <a:r>
@@ -7608,16 +8176,9 @@
                 <a:latin typeface="Bahnschrift SemiLight" panose="020B0502040204020203" pitchFamily="34" charset="0"/>
                 <a:cs typeface="Times New Roman" panose="02020603050405020304" pitchFamily="18" charset="0"/>
               </a:rPr>
-              <a:t>In this pattern, an abstract class exposes defined way(s)/template(s) to execute its </a:t>
-            </a:r>
-            <a:r>
-              <a:rPr lang="en-US" sz="3200" dirty="0">
-                <a:latin typeface="Bahnschrift SemiLight" panose="020B0502040204020203" pitchFamily="34" charset="0"/>
-                <a:cs typeface="Times New Roman" panose="02020603050405020304" pitchFamily="18" charset="0"/>
-              </a:rPr>
-              <a:t>methods.</a:t>
-            </a:r>
-            <a:endParaRPr lang="en-US" dirty="0">
+              <a:t>Both A, B, C</a:t>
+            </a:r>
+            <a:endParaRPr lang="en-US" sz="2800" dirty="0">
               <a:latin typeface="Bahnschrift SemiLight" panose="020B0502040204020203" pitchFamily="34" charset="0"/>
             </a:endParaRPr>
           </a:p>
@@ -7625,10 +8186,10 @@
       </p:sp>
       <p:sp>
         <p:nvSpPr>
-          <p:cNvPr id="6" name="TextBox 5">
+          <p:cNvPr id="8" name="TextBox 7">
             <a:extLst>
               <a:ext uri="{FF2B5EF4-FFF2-40B4-BE49-F238E27FC236}">
-                <a16:creationId xmlns:a16="http://schemas.microsoft.com/office/drawing/2014/main" id="{9C449272-7E7C-476D-A23F-C90633536724}"/>
+                <a16:creationId xmlns:a16="http://schemas.microsoft.com/office/drawing/2014/main" id="{A10AE2FF-D4D5-44FA-961E-3327C6140478}"/>
               </a:ext>
             </a:extLst>
           </p:cNvPr>
@@ -7637,8 +8198,8 @@
         </p:nvSpPr>
         <p:spPr>
           <a:xfrm>
-            <a:off x="1932051" y="3208912"/>
-            <a:ext cx="8622108" cy="954107"/>
+            <a:off x="1994364" y="4929492"/>
+            <a:ext cx="3005628" cy="523220"/>
           </a:xfrm>
           <a:prstGeom prst="rect">
             <a:avLst/>
@@ -7659,7 +8220,7 @@
                 <a:latin typeface="Bahnschrift SemiLight" panose="020B0502040204020203" pitchFamily="34" charset="0"/>
                 <a:cs typeface="Times New Roman" panose="02020603050405020304" pitchFamily="18" charset="0"/>
               </a:rPr>
-              <a:t>In this pattern, a null object replaces check of NULL object instance. </a:t>
+              <a:t>Both A, B, C </a:t>
             </a:r>
           </a:p>
         </p:txBody>
@@ -7667,7 +8228,7 @@
     </p:spTree>
     <p:extLst>
       <p:ext uri="{BB962C8B-B14F-4D97-AF65-F5344CB8AC3E}">
-        <p14:creationId xmlns:p14="http://schemas.microsoft.com/office/powerpoint/2010/main" val="1325669918"/>
+        <p14:creationId xmlns:p14="http://schemas.microsoft.com/office/powerpoint/2010/main" val="1315723305"/>
       </p:ext>
     </p:extLst>
   </p:cSld>
@@ -7686,9 +8247,6 @@
                     <p:cTn id="3" fill="hold">
                       <p:stCondLst>
                         <p:cond delay="indefinite"/>
-                        <p:cond evt="onBegin" delay="0">
-                          <p:tn val="2"/>
-                        </p:cond>
                       </p:stCondLst>
                       <p:childTnLst>
                         <p:par>
@@ -7698,7 +8256,7 @@
                             </p:stCondLst>
                             <p:childTnLst>
                               <p:par>
-                                <p:cTn id="5" presetID="16" presetClass="entr" presetSubtype="21" fill="hold" nodeType="withEffect">
+                                <p:cTn id="5" presetID="10" presetClass="entr" presetSubtype="0" fill="hold" nodeType="clickEffect">
                                   <p:stCondLst>
                                     <p:cond delay="0"/>
                                   </p:stCondLst>
@@ -7711,68 +8269,7 @@
                                           </p:stCondLst>
                                         </p:cTn>
                                         <p:tgtEl>
-                                          <p:spTgt spid="14">
-                                            <p:txEl>
-                                              <p:pRg st="0" end="0"/>
-                                            </p:txEl>
-                                          </p:spTgt>
-                                        </p:tgtEl>
-                                        <p:attrNameLst>
-                                          <p:attrName>style.visibility</p:attrName>
-                                        </p:attrNameLst>
-                                      </p:cBhvr>
-                                      <p:to>
-                                        <p:strVal val="visible"/>
-                                      </p:to>
-                                    </p:set>
-                                    <p:animEffect transition="in" filter="barn(inVertical)">
-                                      <p:cBhvr>
-                                        <p:cTn id="7" dur="500"/>
-                                        <p:tgtEl>
-                                          <p:spTgt spid="14">
-                                            <p:txEl>
-                                              <p:pRg st="0" end="0"/>
-                                            </p:txEl>
-                                          </p:spTgt>
-                                        </p:tgtEl>
-                                      </p:cBhvr>
-                                    </p:animEffect>
-                                  </p:childTnLst>
-                                </p:cTn>
-                              </p:par>
-                            </p:childTnLst>
-                          </p:cTn>
-                        </p:par>
-                      </p:childTnLst>
-                    </p:cTn>
-                  </p:par>
-                  <p:par>
-                    <p:cTn id="8" fill="hold">
-                      <p:stCondLst>
-                        <p:cond delay="indefinite"/>
-                      </p:stCondLst>
-                      <p:childTnLst>
-                        <p:par>
-                          <p:cTn id="9" fill="hold">
-                            <p:stCondLst>
-                              <p:cond delay="0"/>
-                            </p:stCondLst>
-                            <p:childTnLst>
-                              <p:par>
-                                <p:cTn id="10" presetID="10" presetClass="entr" presetSubtype="0" fill="hold" nodeType="clickEffect">
-                                  <p:stCondLst>
-                                    <p:cond delay="0"/>
-                                  </p:stCondLst>
-                                  <p:childTnLst>
-                                    <p:set>
-                                      <p:cBhvr>
-                                        <p:cTn id="11" dur="1" fill="hold">
-                                          <p:stCondLst>
-                                            <p:cond delay="0"/>
-                                          </p:stCondLst>
-                                        </p:cTn>
-                                        <p:tgtEl>
-                                          <p:spTgt spid="6">
+                                          <p:spTgt spid="8">
                                             <p:txEl>
                                               <p:pRg st="0" end="0"/>
                                             </p:txEl>
@@ -7788,9 +8285,9 @@
                                     </p:set>
                                     <p:animEffect transition="in" filter="fade">
                                       <p:cBhvr>
-                                        <p:cTn id="12" dur="500"/>
+                                        <p:cTn id="7" dur="500"/>
                                         <p:tgtEl>
-                                          <p:spTgt spid="6">
+                                          <p:spTgt spid="8">
                                             <p:txEl>
                                               <p:pRg st="0" end="0"/>
                                             </p:txEl>
@@ -7832,7 +8329,7 @@
 </p:sld>
 </file>
 
-<file path=ppt/slides/slide21.xml><?xml version="1.0" encoding="utf-8"?>
+<file path=ppt/slides/slide23.xml><?xml version="1.0" encoding="utf-8"?>
 <p:sld xmlns:a="http://schemas.openxmlformats.org/drawingml/2006/main" xmlns:r="http://schemas.openxmlformats.org/officeDocument/2006/relationships" xmlns:p="http://schemas.openxmlformats.org/presentationml/2006/main" showMasterSp="0">
   <p:cSld>
     <p:spTree>
@@ -8163,7 +8660,7 @@
 </p:sld>
 </file>
 
-<file path=ppt/slides/slide22.xml><?xml version="1.0" encoding="utf-8"?>
+<file path=ppt/slides/slide24.xml><?xml version="1.0" encoding="utf-8"?>
 <p:sld xmlns:a="http://schemas.openxmlformats.org/drawingml/2006/main" xmlns:r="http://schemas.openxmlformats.org/officeDocument/2006/relationships" xmlns:p="http://schemas.openxmlformats.org/presentationml/2006/main" showMasterSp="0">
   <p:cSld>
     <p:spTree>
@@ -8208,6 +8705,7 @@
           </a:bodyPr>
           <a:lstStyle/>
           <a:p>
+            <a:pPr algn="ctr"/>
             <a:r>
               <a:rPr lang="en-US" sz="3200" dirty="0">
                 <a:solidFill>
@@ -9069,6 +9567,259 @@
 </p:sld>
 </file>
 
+<file path=ppt/slides/slide25.xml><?xml version="1.0" encoding="utf-8"?>
+<p:sld xmlns:a="http://schemas.openxmlformats.org/drawingml/2006/main" xmlns:r="http://schemas.openxmlformats.org/officeDocument/2006/relationships" xmlns:p="http://schemas.openxmlformats.org/presentationml/2006/main" showMasterSp="0">
+  <p:cSld>
+    <p:bg>
+      <p:bgPr>
+        <a:gradFill>
+          <a:gsLst>
+            <a:gs pos="0">
+              <a:srgbClr val="9CBEBD"/>
+            </a:gs>
+            <a:gs pos="100000">
+              <a:schemeClr val="accent1">
+                <a:lumMod val="45000"/>
+                <a:lumOff val="55000"/>
+              </a:schemeClr>
+            </a:gs>
+            <a:gs pos="83000">
+              <a:schemeClr val="accent1">
+                <a:lumMod val="45000"/>
+                <a:lumOff val="55000"/>
+              </a:schemeClr>
+            </a:gs>
+            <a:gs pos="100000">
+              <a:schemeClr val="accent1">
+                <a:lumMod val="30000"/>
+                <a:lumOff val="70000"/>
+              </a:schemeClr>
+            </a:gs>
+          </a:gsLst>
+          <a:lin ang="5400000" scaled="1"/>
+        </a:gradFill>
+        <a:effectLst/>
+      </p:bgPr>
+    </p:bg>
+    <p:spTree>
+      <p:nvGrpSpPr>
+        <p:cNvPr id="1" name=""/>
+        <p:cNvGrpSpPr/>
+        <p:nvPr/>
+      </p:nvGrpSpPr>
+      <p:grpSpPr>
+        <a:xfrm>
+          <a:off x="0" y="0"/>
+          <a:ext cx="0" cy="0"/>
+          <a:chOff x="0" y="0"/>
+          <a:chExt cx="0" cy="0"/>
+        </a:xfrm>
+      </p:grpSpPr>
+      <p:pic>
+        <p:nvPicPr>
+          <p:cNvPr id="8" name="Picture 7">
+            <a:extLst>
+              <a:ext uri="{FF2B5EF4-FFF2-40B4-BE49-F238E27FC236}">
+                <a16:creationId xmlns:a16="http://schemas.microsoft.com/office/drawing/2014/main" id="{A08F33F2-939C-4128-82CF-35313FBC77E7}"/>
+              </a:ext>
+            </a:extLst>
+          </p:cNvPr>
+          <p:cNvPicPr>
+            <a:picLocks noChangeAspect="1"/>
+          </p:cNvPicPr>
+          <p:nvPr/>
+        </p:nvPicPr>
+        <p:blipFill rotWithShape="1">
+          <a:blip r:embed="rId2"/>
+          <a:srcRect t="29376" r="-986"/>
+          <a:stretch/>
+        </p:blipFill>
+        <p:spPr>
+          <a:xfrm>
+            <a:off x="283232" y="3166712"/>
+            <a:ext cx="4365770" cy="2700359"/>
+          </a:xfrm>
+          <a:prstGeom prst="rect">
+            <a:avLst/>
+          </a:prstGeom>
+        </p:spPr>
+      </p:pic>
+      <p:pic>
+        <p:nvPicPr>
+          <p:cNvPr id="7" name="Picture 6">
+            <a:extLst>
+              <a:ext uri="{FF2B5EF4-FFF2-40B4-BE49-F238E27FC236}">
+                <a16:creationId xmlns:a16="http://schemas.microsoft.com/office/drawing/2014/main" id="{C0BC811C-BB05-4A7B-96E0-14595D5BF861}"/>
+              </a:ext>
+            </a:extLst>
+          </p:cNvPr>
+          <p:cNvPicPr>
+            <a:picLocks noChangeAspect="1"/>
+          </p:cNvPicPr>
+          <p:nvPr/>
+        </p:nvPicPr>
+        <p:blipFill>
+          <a:blip r:embed="rId3"/>
+          <a:stretch>
+            <a:fillRect/>
+          </a:stretch>
+        </p:blipFill>
+        <p:spPr>
+          <a:xfrm>
+            <a:off x="4572000" y="640096"/>
+            <a:ext cx="6951758" cy="3196267"/>
+          </a:xfrm>
+          <a:prstGeom prst="rect">
+            <a:avLst/>
+          </a:prstGeom>
+        </p:spPr>
+      </p:pic>
+    </p:spTree>
+    <p:extLst>
+      <p:ext uri="{BB962C8B-B14F-4D97-AF65-F5344CB8AC3E}">
+        <p14:creationId xmlns:p14="http://schemas.microsoft.com/office/powerpoint/2010/main" val="4022591192"/>
+      </p:ext>
+    </p:extLst>
+  </p:cSld>
+  <p:clrMapOvr>
+    <a:masterClrMapping/>
+  </p:clrMapOvr>
+</p:sld>
+</file>
+
+<file path=ppt/slides/slide26.xml><?xml version="1.0" encoding="utf-8"?>
+<p:sld xmlns:a="http://schemas.openxmlformats.org/drawingml/2006/main" xmlns:r="http://schemas.openxmlformats.org/officeDocument/2006/relationships" xmlns:p="http://schemas.openxmlformats.org/presentationml/2006/main">
+  <p:cSld>
+    <p:bg>
+      <p:bgPr>
+        <a:solidFill>
+          <a:schemeClr val="bg1"/>
+        </a:solidFill>
+        <a:effectLst/>
+      </p:bgPr>
+    </p:bg>
+    <p:spTree>
+      <p:nvGrpSpPr>
+        <p:cNvPr id="1" name=""/>
+        <p:cNvGrpSpPr/>
+        <p:nvPr/>
+      </p:nvGrpSpPr>
+      <p:grpSpPr>
+        <a:xfrm>
+          <a:off x="0" y="0"/>
+          <a:ext cx="0" cy="0"/>
+          <a:chOff x="0" y="0"/>
+          <a:chExt cx="0" cy="0"/>
+        </a:xfrm>
+      </p:grpSpPr>
+      <p:sp>
+        <p:nvSpPr>
+          <p:cNvPr id="7" name="Title 6">
+            <a:extLst>
+              <a:ext uri="{FF2B5EF4-FFF2-40B4-BE49-F238E27FC236}">
+                <a16:creationId xmlns:a16="http://schemas.microsoft.com/office/drawing/2014/main" id="{83627228-CAC1-4199-B531-085AF04004F8}"/>
+              </a:ext>
+            </a:extLst>
+          </p:cNvPr>
+          <p:cNvSpPr>
+            <a:spLocks noGrp="1"/>
+          </p:cNvSpPr>
+          <p:nvPr>
+            <p:ph type="ctrTitle"/>
+          </p:nvPr>
+        </p:nvSpPr>
+        <p:spPr>
+          <a:xfrm>
+            <a:off x="4365356" y="810275"/>
+            <a:ext cx="7020747" cy="5229630"/>
+          </a:xfrm>
+        </p:spPr>
+        <p:txBody>
+          <a:bodyPr>
+            <a:normAutofit/>
+          </a:bodyPr>
+          <a:lstStyle/>
+          <a:p>
+            <a:pPr algn="l"/>
+            <a:r>
+              <a:rPr lang="en-US" sz="9600" dirty="0">
+                <a:solidFill>
+                  <a:srgbClr val="FFFFFF"/>
+                </a:solidFill>
+              </a:rPr>
+              <a:t>Thank you </a:t>
+            </a:r>
+            <a:br>
+              <a:rPr lang="en-US" sz="9600" dirty="0">
+                <a:solidFill>
+                  <a:srgbClr val="FFFFFF"/>
+                </a:solidFill>
+              </a:rPr>
+            </a:br>
+            <a:r>
+              <a:rPr lang="en-US" sz="9600" dirty="0">
+                <a:solidFill>
+                  <a:srgbClr val="FFFFFF"/>
+                </a:solidFill>
+              </a:rPr>
+              <a:t>for listening</a:t>
+            </a:r>
+          </a:p>
+        </p:txBody>
+      </p:sp>
+      <p:sp>
+        <p:nvSpPr>
+          <p:cNvPr id="8" name="Subtitle 7">
+            <a:extLst>
+              <a:ext uri="{FF2B5EF4-FFF2-40B4-BE49-F238E27FC236}">
+                <a16:creationId xmlns:a16="http://schemas.microsoft.com/office/drawing/2014/main" id="{301231AF-997F-4561-9663-070389012462}"/>
+              </a:ext>
+            </a:extLst>
+          </p:cNvPr>
+          <p:cNvSpPr>
+            <a:spLocks noGrp="1"/>
+          </p:cNvSpPr>
+          <p:nvPr>
+            <p:ph type="subTitle" idx="1"/>
+          </p:nvPr>
+        </p:nvSpPr>
+        <p:spPr>
+          <a:xfrm>
+            <a:off x="788661" y="810275"/>
+            <a:ext cx="2949542" cy="5229630"/>
+          </a:xfrm>
+        </p:spPr>
+        <p:txBody>
+          <a:bodyPr>
+            <a:normAutofit/>
+          </a:bodyPr>
+          <a:lstStyle/>
+          <a:p>
+            <a:pPr algn="r"/>
+            <a:r>
+              <a:rPr lang="en-US" sz="2400" dirty="0">
+                <a:solidFill>
+                  <a:srgbClr val="FFFFFF"/>
+                </a:solidFill>
+              </a:rPr>
+              <a:t>Group 04</a:t>
+            </a:r>
+          </a:p>
+        </p:txBody>
+      </p:sp>
+    </p:spTree>
+    <p:extLst>
+      <p:ext uri="{BB962C8B-B14F-4D97-AF65-F5344CB8AC3E}">
+        <p14:creationId xmlns:p14="http://schemas.microsoft.com/office/powerpoint/2010/main" val="3374494012"/>
+      </p:ext>
+    </p:extLst>
+  </p:cSld>
+  <p:clrMapOvr>
+    <a:masterClrMapping/>
+  </p:clrMapOvr>
+</p:sld>
+</file>
+
 <file path=ppt/slides/slide3.xml><?xml version="1.0" encoding="utf-8"?>
 <p:sld xmlns:a="http://schemas.openxmlformats.org/drawingml/2006/main" xmlns:r="http://schemas.openxmlformats.org/officeDocument/2006/relationships" xmlns:p="http://schemas.openxmlformats.org/presentationml/2006/main" showMasterSp="0">
   <p:cSld>
@@ -9174,9 +9925,9 @@
           <p:nvPr/>
         </p:nvCxnSpPr>
         <p:spPr>
-          <a:xfrm>
-            <a:off x="6096000" y="2649068"/>
-            <a:ext cx="7376" cy="1214283"/>
+          <a:xfrm flipH="1">
+            <a:off x="6094221" y="2649068"/>
+            <a:ext cx="1779" cy="1528579"/>
           </a:xfrm>
           <a:prstGeom prst="straightConnector1">
             <a:avLst/>
@@ -9221,8 +9972,8 @@
         </p:nvCxnSpPr>
         <p:spPr>
           <a:xfrm flipH="1">
-            <a:off x="3500282" y="2649068"/>
-            <a:ext cx="2595718" cy="1214283"/>
+            <a:off x="3491127" y="2649068"/>
+            <a:ext cx="2604873" cy="1528579"/>
           </a:xfrm>
           <a:prstGeom prst="straightConnector1">
             <a:avLst/>
@@ -9268,7 +10019,7 @@
         <p:spPr>
           <a:xfrm>
             <a:off x="6096000" y="2649068"/>
-            <a:ext cx="2615383" cy="1214283"/>
+            <a:ext cx="2606228" cy="1528579"/>
           </a:xfrm>
           <a:prstGeom prst="straightConnector1">
             <a:avLst/>
@@ -9309,7 +10060,7 @@
         </p:nvSpPr>
         <p:spPr>
           <a:xfrm>
-            <a:off x="2694039" y="3863351"/>
+            <a:off x="2684884" y="4177647"/>
             <a:ext cx="1612485" cy="1081548"/>
           </a:xfrm>
           <a:prstGeom prst="roundRect">
@@ -9379,7 +10130,7 @@
         </p:nvSpPr>
         <p:spPr>
           <a:xfrm>
-            <a:off x="7905140" y="3863351"/>
+            <a:off x="7895985" y="4177647"/>
             <a:ext cx="1612485" cy="1081548"/>
           </a:xfrm>
           <a:prstGeom prst="roundRect">
@@ -9482,7 +10233,7 @@
         </p:nvSpPr>
         <p:spPr>
           <a:xfrm>
-            <a:off x="5297133" y="3863351"/>
+            <a:off x="5287978" y="4177647"/>
             <a:ext cx="1612485" cy="1081548"/>
           </a:xfrm>
           <a:prstGeom prst="roundRect">
@@ -9534,138 +10285,6 @@
                 <a:latin typeface="Keep Calm Med" pitchFamily="2" charset="0"/>
               </a:rPr>
               <a:t>Structural pattern</a:t>
-            </a:r>
-          </a:p>
-        </p:txBody>
-      </p:sp>
-      <p:sp>
-        <p:nvSpPr>
-          <p:cNvPr id="21" name="TextBox 20">
-            <a:extLst>
-              <a:ext uri="{FF2B5EF4-FFF2-40B4-BE49-F238E27FC236}">
-                <a16:creationId xmlns:a16="http://schemas.microsoft.com/office/drawing/2014/main" id="{7ACB2E50-FA1C-4EA4-9DD0-4A310956006A}"/>
-              </a:ext>
-            </a:extLst>
-          </p:cNvPr>
-          <p:cNvSpPr txBox="1"/>
-          <p:nvPr/>
-        </p:nvSpPr>
-        <p:spPr>
-          <a:xfrm>
-            <a:off x="2448232" y="5057527"/>
-            <a:ext cx="2104098" cy="738664"/>
-          </a:xfrm>
-          <a:prstGeom prst="rect">
-            <a:avLst/>
-          </a:prstGeom>
-          <a:noFill/>
-        </p:spPr>
-        <p:txBody>
-          <a:bodyPr wrap="square" rtlCol="0">
-            <a:spAutoFit/>
-          </a:bodyPr>
-          <a:lstStyle/>
-          <a:p>
-            <a:pPr algn="ctr"/>
-            <a:r>
-              <a:rPr lang="en-US" sz="1400" dirty="0" err="1">
-                <a:latin typeface="Indie Flower" panose="02000000000000000000" pitchFamily="2" charset="0"/>
-              </a:rPr>
-              <a:t>E.g</a:t>
-            </a:r>
-            <a:r>
-              <a:rPr lang="en-US" sz="1400" dirty="0">
-                <a:latin typeface="Indie Flower" panose="02000000000000000000" pitchFamily="2" charset="0"/>
-              </a:rPr>
-              <a:t>: Abstract Factory, Factory Method, Singleton,.. </a:t>
-            </a:r>
-          </a:p>
-        </p:txBody>
-      </p:sp>
-      <p:sp>
-        <p:nvSpPr>
-          <p:cNvPr id="22" name="TextBox 21">
-            <a:extLst>
-              <a:ext uri="{FF2B5EF4-FFF2-40B4-BE49-F238E27FC236}">
-                <a16:creationId xmlns:a16="http://schemas.microsoft.com/office/drawing/2014/main" id="{E19D2C3C-7133-4BA1-B0F7-46A8CCB08273}"/>
-              </a:ext>
-            </a:extLst>
-          </p:cNvPr>
-          <p:cNvSpPr txBox="1"/>
-          <p:nvPr/>
-        </p:nvSpPr>
-        <p:spPr>
-          <a:xfrm>
-            <a:off x="5397910" y="5043223"/>
-            <a:ext cx="1415845" cy="738664"/>
-          </a:xfrm>
-          <a:prstGeom prst="rect">
-            <a:avLst/>
-          </a:prstGeom>
-          <a:noFill/>
-        </p:spPr>
-        <p:txBody>
-          <a:bodyPr wrap="square" rtlCol="0">
-            <a:spAutoFit/>
-          </a:bodyPr>
-          <a:lstStyle/>
-          <a:p>
-            <a:pPr algn="ctr"/>
-            <a:r>
-              <a:rPr lang="en-US" sz="1400" dirty="0" err="1">
-                <a:latin typeface="Indie Flower" panose="02000000000000000000" pitchFamily="2" charset="0"/>
-              </a:rPr>
-              <a:t>E.g</a:t>
-            </a:r>
-            <a:r>
-              <a:rPr lang="en-US" sz="1400" dirty="0">
-                <a:latin typeface="Indie Flower" panose="02000000000000000000" pitchFamily="2" charset="0"/>
-              </a:rPr>
-              <a:t>: Adapter, Bridge, Composite,..</a:t>
-            </a:r>
-          </a:p>
-        </p:txBody>
-      </p:sp>
-      <p:sp>
-        <p:nvSpPr>
-          <p:cNvPr id="23" name="TextBox 22">
-            <a:extLst>
-              <a:ext uri="{FF2B5EF4-FFF2-40B4-BE49-F238E27FC236}">
-                <a16:creationId xmlns:a16="http://schemas.microsoft.com/office/drawing/2014/main" id="{490BEBF3-D814-4756-BBA9-A26C20498DA4}"/>
-              </a:ext>
-            </a:extLst>
-          </p:cNvPr>
-          <p:cNvSpPr txBox="1"/>
-          <p:nvPr/>
-        </p:nvSpPr>
-        <p:spPr>
-          <a:xfrm>
-            <a:off x="8042787" y="5043223"/>
-            <a:ext cx="1415845" cy="738664"/>
-          </a:xfrm>
-          <a:prstGeom prst="rect">
-            <a:avLst/>
-          </a:prstGeom>
-          <a:noFill/>
-        </p:spPr>
-        <p:txBody>
-          <a:bodyPr wrap="square" rtlCol="0">
-            <a:spAutoFit/>
-          </a:bodyPr>
-          <a:lstStyle/>
-          <a:p>
-            <a:pPr algn="ctr"/>
-            <a:r>
-              <a:rPr lang="en-US" sz="1400" dirty="0" err="1">
-                <a:latin typeface="Indie Flower" panose="02000000000000000000" pitchFamily="2" charset="0"/>
-              </a:rPr>
-              <a:t>E.g</a:t>
-            </a:r>
-            <a:r>
-              <a:rPr lang="en-US" sz="1400" dirty="0">
-                <a:latin typeface="Indie Flower" panose="02000000000000000000" pitchFamily="2" charset="0"/>
-              </a:rPr>
-              <a:t>: Interpreter, Template Method,...</a:t>
             </a:r>
           </a:p>
         </p:txBody>
@@ -9929,7 +10548,7 @@
                             </p:stCondLst>
                             <p:childTnLst>
                               <p:par>
-                                <p:cTn id="18" presetID="10" presetClass="entr" presetSubtype="0" fill="hold" grpId="0" nodeType="clickEffect">
+                                <p:cTn id="18" presetID="10" presetClass="entr" presetSubtype="0" fill="hold" nodeType="clickEffect">
                                   <p:stCondLst>
                                     <p:cond delay="0"/>
                                   </p:stCondLst>
@@ -9937,59 +10556,6 @@
                                     <p:set>
                                       <p:cBhvr>
                                         <p:cTn id="19" dur="1" fill="hold">
-                                          <p:stCondLst>
-                                            <p:cond delay="0"/>
-                                          </p:stCondLst>
-                                        </p:cTn>
-                                        <p:tgtEl>
-                                          <p:spTgt spid="21"/>
-                                        </p:tgtEl>
-                                        <p:attrNameLst>
-                                          <p:attrName>style.visibility</p:attrName>
-                                        </p:attrNameLst>
-                                      </p:cBhvr>
-                                      <p:to>
-                                        <p:strVal val="visible"/>
-                                      </p:to>
-                                    </p:set>
-                                    <p:animEffect transition="in" filter="fade">
-                                      <p:cBhvr>
-                                        <p:cTn id="20" dur="500"/>
-                                        <p:tgtEl>
-                                          <p:spTgt spid="21"/>
-                                        </p:tgtEl>
-                                      </p:cBhvr>
-                                    </p:animEffect>
-                                  </p:childTnLst>
-                                </p:cTn>
-                              </p:par>
-                            </p:childTnLst>
-                          </p:cTn>
-                        </p:par>
-                      </p:childTnLst>
-                    </p:cTn>
-                  </p:par>
-                  <p:par>
-                    <p:cTn id="21" fill="hold">
-                      <p:stCondLst>
-                        <p:cond delay="indefinite"/>
-                      </p:stCondLst>
-                      <p:childTnLst>
-                        <p:par>
-                          <p:cTn id="22" fill="hold">
-                            <p:stCondLst>
-                              <p:cond delay="0"/>
-                            </p:stCondLst>
-                            <p:childTnLst>
-                              <p:par>
-                                <p:cTn id="23" presetID="10" presetClass="entr" presetSubtype="0" fill="hold" nodeType="clickEffect">
-                                  <p:stCondLst>
-                                    <p:cond delay="0"/>
-                                  </p:stCondLst>
-                                  <p:childTnLst>
-                                    <p:set>
-                                      <p:cBhvr>
-                                        <p:cTn id="24" dur="1" fill="hold">
                                           <p:stCondLst>
                                             <p:cond delay="0"/>
                                           </p:stCondLst>
@@ -10007,7 +10573,7 @@
                                     </p:set>
                                     <p:animEffect transition="in" filter="fade">
                                       <p:cBhvr>
-                                        <p:cTn id="25" dur="500"/>
+                                        <p:cTn id="20" dur="500"/>
                                         <p:tgtEl>
                                           <p:spTgt spid="15"/>
                                         </p:tgtEl>
@@ -10017,14 +10583,14 @@
                                 </p:cTn>
                               </p:par>
                               <p:par>
-                                <p:cTn id="26" presetID="10" presetClass="entr" presetSubtype="0" fill="hold" grpId="0" nodeType="withEffect">
+                                <p:cTn id="21" presetID="10" presetClass="entr" presetSubtype="0" fill="hold" grpId="0" nodeType="withEffect">
                                   <p:stCondLst>
                                     <p:cond delay="0"/>
                                   </p:stCondLst>
                                   <p:childTnLst>
                                     <p:set>
                                       <p:cBhvr>
-                                        <p:cTn id="27" dur="1" fill="hold">
+                                        <p:cTn id="22" dur="1" fill="hold">
                                           <p:stCondLst>
                                             <p:cond delay="0"/>
                                           </p:stCondLst>
@@ -10042,7 +10608,7 @@
                                     </p:set>
                                     <p:animEffect transition="in" filter="fade">
                                       <p:cBhvr>
-                                        <p:cTn id="28" dur="500"/>
+                                        <p:cTn id="23" dur="500"/>
                                         <p:tgtEl>
                                           <p:spTgt spid="20"/>
                                         </p:tgtEl>
@@ -10058,79 +10624,26 @@
                     </p:cTn>
                   </p:par>
                   <p:par>
-                    <p:cTn id="29" fill="hold">
+                    <p:cTn id="24" fill="hold">
                       <p:stCondLst>
                         <p:cond delay="indefinite"/>
                       </p:stCondLst>
                       <p:childTnLst>
                         <p:par>
-                          <p:cTn id="30" fill="hold">
+                          <p:cTn id="25" fill="hold">
                             <p:stCondLst>
                               <p:cond delay="0"/>
                             </p:stCondLst>
                             <p:childTnLst>
                               <p:par>
-                                <p:cTn id="31" presetID="10" presetClass="entr" presetSubtype="0" fill="hold" grpId="0" nodeType="clickEffect">
+                                <p:cTn id="26" presetID="10" presetClass="entr" presetSubtype="0" fill="hold" nodeType="clickEffect">
                                   <p:stCondLst>
                                     <p:cond delay="0"/>
                                   </p:stCondLst>
                                   <p:childTnLst>
                                     <p:set>
                                       <p:cBhvr>
-                                        <p:cTn id="32" dur="1" fill="hold">
-                                          <p:stCondLst>
-                                            <p:cond delay="0"/>
-                                          </p:stCondLst>
-                                        </p:cTn>
-                                        <p:tgtEl>
-                                          <p:spTgt spid="22"/>
-                                        </p:tgtEl>
-                                        <p:attrNameLst>
-                                          <p:attrName>style.visibility</p:attrName>
-                                        </p:attrNameLst>
-                                      </p:cBhvr>
-                                      <p:to>
-                                        <p:strVal val="visible"/>
-                                      </p:to>
-                                    </p:set>
-                                    <p:animEffect transition="in" filter="fade">
-                                      <p:cBhvr>
-                                        <p:cTn id="33" dur="500"/>
-                                        <p:tgtEl>
-                                          <p:spTgt spid="22"/>
-                                        </p:tgtEl>
-                                      </p:cBhvr>
-                                    </p:animEffect>
-                                  </p:childTnLst>
-                                </p:cTn>
-                              </p:par>
-                            </p:childTnLst>
-                          </p:cTn>
-                        </p:par>
-                      </p:childTnLst>
-                    </p:cTn>
-                  </p:par>
-                  <p:par>
-                    <p:cTn id="34" fill="hold">
-                      <p:stCondLst>
-                        <p:cond delay="indefinite"/>
-                      </p:stCondLst>
-                      <p:childTnLst>
-                        <p:par>
-                          <p:cTn id="35" fill="hold">
-                            <p:stCondLst>
-                              <p:cond delay="0"/>
-                            </p:stCondLst>
-                            <p:childTnLst>
-                              <p:par>
-                                <p:cTn id="36" presetID="10" presetClass="entr" presetSubtype="0" fill="hold" nodeType="clickEffect">
-                                  <p:stCondLst>
-                                    <p:cond delay="0"/>
-                                  </p:stCondLst>
-                                  <p:childTnLst>
-                                    <p:set>
-                                      <p:cBhvr>
-                                        <p:cTn id="37" dur="1" fill="hold">
+                                        <p:cTn id="27" dur="1" fill="hold">
                                           <p:stCondLst>
                                             <p:cond delay="0"/>
                                           </p:stCondLst>
@@ -10148,7 +10661,7 @@
                                     </p:set>
                                     <p:animEffect transition="in" filter="fade">
                                       <p:cBhvr>
-                                        <p:cTn id="38" dur="500"/>
+                                        <p:cTn id="28" dur="500"/>
                                         <p:tgtEl>
                                           <p:spTgt spid="17"/>
                                         </p:tgtEl>
@@ -10158,14 +10671,14 @@
                                 </p:cTn>
                               </p:par>
                               <p:par>
-                                <p:cTn id="39" presetID="10" presetClass="entr" presetSubtype="0" fill="hold" grpId="0" nodeType="withEffect">
+                                <p:cTn id="29" presetID="10" presetClass="entr" presetSubtype="0" fill="hold" grpId="0" nodeType="withEffect">
                                   <p:stCondLst>
                                     <p:cond delay="0"/>
                                   </p:stCondLst>
                                   <p:childTnLst>
                                     <p:set>
                                       <p:cBhvr>
-                                        <p:cTn id="40" dur="1" fill="hold">
+                                        <p:cTn id="30" dur="1" fill="hold">
                                           <p:stCondLst>
                                             <p:cond delay="0"/>
                                           </p:stCondLst>
@@ -10183,7 +10696,7 @@
                                     </p:set>
                                     <p:animEffect transition="in" filter="fade">
                                       <p:cBhvr>
-                                        <p:cTn id="41" dur="500"/>
+                                        <p:cTn id="31" dur="500"/>
                                         <p:tgtEl>
                                           <p:spTgt spid="19"/>
                                         </p:tgtEl>
@@ -10199,79 +10712,26 @@
                     </p:cTn>
                   </p:par>
                   <p:par>
-                    <p:cTn id="42" fill="hold">
+                    <p:cTn id="32" fill="hold">
                       <p:stCondLst>
                         <p:cond delay="indefinite"/>
                       </p:stCondLst>
                       <p:childTnLst>
                         <p:par>
-                          <p:cTn id="43" fill="hold">
+                          <p:cTn id="33" fill="hold">
                             <p:stCondLst>
                               <p:cond delay="0"/>
                             </p:stCondLst>
                             <p:childTnLst>
                               <p:par>
-                                <p:cTn id="44" presetID="10" presetClass="entr" presetSubtype="0" fill="hold" grpId="0" nodeType="clickEffect">
+                                <p:cTn id="34" presetID="42" presetClass="entr" presetSubtype="0" fill="hold" grpId="0" nodeType="clickEffect">
                                   <p:stCondLst>
                                     <p:cond delay="0"/>
                                   </p:stCondLst>
                                   <p:childTnLst>
                                     <p:set>
                                       <p:cBhvr>
-                                        <p:cTn id="45" dur="1" fill="hold">
-                                          <p:stCondLst>
-                                            <p:cond delay="0"/>
-                                          </p:stCondLst>
-                                        </p:cTn>
-                                        <p:tgtEl>
-                                          <p:spTgt spid="23"/>
-                                        </p:tgtEl>
-                                        <p:attrNameLst>
-                                          <p:attrName>style.visibility</p:attrName>
-                                        </p:attrNameLst>
-                                      </p:cBhvr>
-                                      <p:to>
-                                        <p:strVal val="visible"/>
-                                      </p:to>
-                                    </p:set>
-                                    <p:animEffect transition="in" filter="fade">
-                                      <p:cBhvr>
-                                        <p:cTn id="46" dur="500"/>
-                                        <p:tgtEl>
-                                          <p:spTgt spid="23"/>
-                                        </p:tgtEl>
-                                      </p:cBhvr>
-                                    </p:animEffect>
-                                  </p:childTnLst>
-                                </p:cTn>
-                              </p:par>
-                            </p:childTnLst>
-                          </p:cTn>
-                        </p:par>
-                      </p:childTnLst>
-                    </p:cTn>
-                  </p:par>
-                  <p:par>
-                    <p:cTn id="47" fill="hold">
-                      <p:stCondLst>
-                        <p:cond delay="indefinite"/>
-                      </p:stCondLst>
-                      <p:childTnLst>
-                        <p:par>
-                          <p:cTn id="48" fill="hold">
-                            <p:stCondLst>
-                              <p:cond delay="0"/>
-                            </p:stCondLst>
-                            <p:childTnLst>
-                              <p:par>
-                                <p:cTn id="49" presetID="42" presetClass="entr" presetSubtype="0" fill="hold" grpId="0" nodeType="clickEffect">
-                                  <p:stCondLst>
-                                    <p:cond delay="0"/>
-                                  </p:stCondLst>
-                                  <p:childTnLst>
-                                    <p:set>
-                                      <p:cBhvr>
-                                        <p:cTn id="50" dur="1" fill="hold">
+                                        <p:cTn id="35" dur="1" fill="hold">
                                           <p:stCondLst>
                                             <p:cond delay="0"/>
                                           </p:stCondLst>
@@ -10289,7 +10749,7 @@
                                     </p:set>
                                     <p:animEffect transition="in" filter="fade">
                                       <p:cBhvr>
-                                        <p:cTn id="51" dur="600"/>
+                                        <p:cTn id="36" dur="600"/>
                                         <p:tgtEl>
                                           <p:spTgt spid="24"/>
                                         </p:tgtEl>
@@ -10297,7 +10757,7 @@
                                     </p:animEffect>
                                     <p:anim calcmode="lin" valueType="num">
                                       <p:cBhvr>
-                                        <p:cTn id="52" dur="600" fill="hold"/>
+                                        <p:cTn id="37" dur="600" fill="hold"/>
                                         <p:tgtEl>
                                           <p:spTgt spid="24"/>
                                         </p:tgtEl>
@@ -10320,7 +10780,7 @@
                                     </p:anim>
                                     <p:anim calcmode="lin" valueType="num">
                                       <p:cBhvr>
-                                        <p:cTn id="53" dur="600" fill="hold"/>
+                                        <p:cTn id="38" dur="600" fill="hold"/>
                                         <p:tgtEl>
                                           <p:spTgt spid="24"/>
                                         </p:tgtEl>
@@ -10376,9 +10836,6 @@
       <p:bldP spid="18" grpId="0" animBg="1"/>
       <p:bldP spid="19" grpId="0" animBg="1"/>
       <p:bldP spid="20" grpId="0" animBg="1"/>
-      <p:bldP spid="21" grpId="0"/>
-      <p:bldP spid="22" grpId="0"/>
-      <p:bldP spid="23" grpId="0"/>
       <p:bldP spid="24" grpId="0"/>
     </p:bldLst>
   </p:timing>
@@ -10386,6 +10843,322 @@
 </file>
 
 <file path=ppt/slides/slide4.xml><?xml version="1.0" encoding="utf-8"?>
+<p:sld xmlns:a="http://schemas.openxmlformats.org/drawingml/2006/main" xmlns:r="http://schemas.openxmlformats.org/officeDocument/2006/relationships" xmlns:p="http://schemas.openxmlformats.org/presentationml/2006/main" showMasterSp="0">
+  <p:cSld>
+    <p:spTree>
+      <p:nvGrpSpPr>
+        <p:cNvPr id="1" name=""/>
+        <p:cNvGrpSpPr/>
+        <p:nvPr/>
+      </p:nvGrpSpPr>
+      <p:grpSpPr>
+        <a:xfrm>
+          <a:off x="0" y="0"/>
+          <a:ext cx="0" cy="0"/>
+          <a:chOff x="0" y="0"/>
+          <a:chExt cx="0" cy="0"/>
+        </a:xfrm>
+      </p:grpSpPr>
+      <p:sp>
+        <p:nvSpPr>
+          <p:cNvPr id="6" name="Title 5">
+            <a:extLst>
+              <a:ext uri="{FF2B5EF4-FFF2-40B4-BE49-F238E27FC236}">
+                <a16:creationId xmlns:a16="http://schemas.microsoft.com/office/drawing/2014/main" id="{5DB504B7-A9DA-42C6-8EFE-9C90D39C86B7}"/>
+              </a:ext>
+            </a:extLst>
+          </p:cNvPr>
+          <p:cNvSpPr>
+            <a:spLocks noGrp="1"/>
+          </p:cNvSpPr>
+          <p:nvPr>
+            <p:ph type="title"/>
+          </p:nvPr>
+        </p:nvSpPr>
+        <p:spPr>
+          <a:xfrm>
+            <a:off x="1024128" y="342621"/>
+            <a:ext cx="9720072" cy="1499616"/>
+          </a:xfrm>
+        </p:spPr>
+        <p:txBody>
+          <a:bodyPr>
+            <a:normAutofit/>
+          </a:bodyPr>
+          <a:lstStyle/>
+          <a:p>
+            <a:pPr algn="ctr"/>
+            <a:r>
+              <a:rPr lang="en-US" sz="6000" dirty="0">
+                <a:latin typeface="Aharoni" panose="02010803020104030203" pitchFamily="2" charset="-79"/>
+                <a:cs typeface="Aharoni" panose="02010803020104030203" pitchFamily="2" charset="-79"/>
+              </a:rPr>
+              <a:t>Strategy pattern</a:t>
+            </a:r>
+          </a:p>
+        </p:txBody>
+      </p:sp>
+      <p:sp>
+        <p:nvSpPr>
+          <p:cNvPr id="4" name="TextBox 3">
+            <a:extLst>
+              <a:ext uri="{FF2B5EF4-FFF2-40B4-BE49-F238E27FC236}">
+                <a16:creationId xmlns:a16="http://schemas.microsoft.com/office/drawing/2014/main" id="{4F618712-6F1B-4CFC-A1DE-B3C1736A1042}"/>
+              </a:ext>
+            </a:extLst>
+          </p:cNvPr>
+          <p:cNvSpPr txBox="1"/>
+          <p:nvPr/>
+        </p:nvSpPr>
+        <p:spPr>
+          <a:xfrm>
+            <a:off x="1788603" y="2243474"/>
+            <a:ext cx="8442075" cy="3131627"/>
+          </a:xfrm>
+          <a:prstGeom prst="rect">
+            <a:avLst/>
+          </a:prstGeom>
+          <a:noFill/>
+        </p:spPr>
+        <p:txBody>
+          <a:bodyPr wrap="square" rtlCol="0">
+            <a:spAutoFit/>
+          </a:bodyPr>
+          <a:lstStyle/>
+          <a:p>
+            <a:pPr algn="just">
+              <a:spcBef>
+                <a:spcPts val="300"/>
+              </a:spcBef>
+            </a:pPr>
+            <a:r>
+              <a:rPr lang="en-US" sz="3500" dirty="0">
+                <a:solidFill>
+                  <a:schemeClr val="accent2"/>
+                </a:solidFill>
+                <a:latin typeface="Aharoni" panose="02010803020104030203" pitchFamily="2" charset="-79"/>
+                <a:ea typeface="Verdana" panose="020B0604030504040204" pitchFamily="34" charset="0"/>
+                <a:cs typeface="Aharoni" panose="02010803020104030203" pitchFamily="2" charset="-79"/>
+              </a:rPr>
+              <a:t>Origin:</a:t>
+            </a:r>
+            <a:r>
+              <a:rPr lang="en-US" sz="3500" dirty="0">
+                <a:solidFill>
+                  <a:schemeClr val="accent2"/>
+                </a:solidFill>
+                <a:latin typeface="Bahnschrift SemiLight" panose="020B0502040204020203" pitchFamily="34" charset="0"/>
+                <a:ea typeface="Verdana" panose="020B0604030504040204" pitchFamily="34" charset="0"/>
+                <a:cs typeface="Helvetica" panose="020B0604020202020204" pitchFamily="34" charset="0"/>
+              </a:rPr>
+              <a:t>  </a:t>
+            </a:r>
+            <a:r>
+              <a:rPr lang="en-US" sz="4000" dirty="0">
+                <a:solidFill>
+                  <a:schemeClr val="accent2"/>
+                </a:solidFill>
+                <a:latin typeface="Bahnschrift SemiLight" panose="020B0502040204020203" pitchFamily="34" charset="0"/>
+                <a:ea typeface="Verdana" panose="020B0604030504040204" pitchFamily="34" charset="0"/>
+                <a:cs typeface="Helvetica" panose="020B0604020202020204" pitchFamily="34" charset="0"/>
+              </a:rPr>
+              <a:t>	</a:t>
+            </a:r>
+            <a:r>
+              <a:rPr lang="en-US" sz="2200" dirty="0">
+                <a:latin typeface="Bahnschrift SemiLight" panose="020B0502040204020203" pitchFamily="34" charset="0"/>
+                <a:ea typeface="Verdana" panose="020B0604030504040204" pitchFamily="34" charset="0"/>
+                <a:cs typeface="Helvetica" panose="020B0604020202020204" pitchFamily="34" charset="0"/>
+              </a:rPr>
+              <a:t>the Strategy Pattern is known as a </a:t>
+            </a:r>
+            <a:r>
+              <a:rPr lang="en-US" sz="2200" b="1" dirty="0">
+                <a:solidFill>
+                  <a:schemeClr val="accent2">
+                    <a:lumMod val="75000"/>
+                  </a:schemeClr>
+                </a:solidFill>
+                <a:latin typeface="Bahnschrift SemiLight" panose="020B0502040204020203" pitchFamily="34" charset="0"/>
+                <a:ea typeface="Verdana" panose="020B0604030504040204" pitchFamily="34" charset="0"/>
+                <a:cs typeface="Helvetica" panose="020B0604020202020204" pitchFamily="34" charset="0"/>
+              </a:rPr>
+              <a:t>behavioral</a:t>
+            </a:r>
+            <a:r>
+              <a:rPr lang="en-US" sz="2200" dirty="0">
+                <a:latin typeface="Bahnschrift SemiLight" panose="020B0502040204020203" pitchFamily="34" charset="0"/>
+                <a:ea typeface="Verdana" panose="020B0604030504040204" pitchFamily="34" charset="0"/>
+                <a:cs typeface="Helvetica" panose="020B0604020202020204" pitchFamily="34" charset="0"/>
+              </a:rPr>
+              <a:t> 						pattern and is used to manage algorithms, 							relationships and responsibilities between objects</a:t>
+            </a:r>
+            <a:endParaRPr lang="en-US" sz="2200" dirty="0">
+              <a:solidFill>
+                <a:schemeClr val="accent2"/>
+              </a:solidFill>
+              <a:latin typeface="Aharoni" panose="02010803020104030203" pitchFamily="2" charset="-79"/>
+              <a:ea typeface="Verdana" panose="020B0604030504040204" pitchFamily="34" charset="0"/>
+              <a:cs typeface="Aharoni" panose="02010803020104030203" pitchFamily="2" charset="-79"/>
+            </a:endParaRPr>
+          </a:p>
+          <a:p>
+            <a:pPr algn="just">
+              <a:spcBef>
+                <a:spcPts val="300"/>
+              </a:spcBef>
+            </a:pPr>
+            <a:endParaRPr lang="en-US" sz="500" dirty="0">
+              <a:solidFill>
+                <a:schemeClr val="accent2"/>
+              </a:solidFill>
+              <a:latin typeface="Aharoni" panose="02010803020104030203" pitchFamily="2" charset="-79"/>
+              <a:ea typeface="Verdana" panose="020B0604030504040204" pitchFamily="34" charset="0"/>
+              <a:cs typeface="Aharoni" panose="02010803020104030203" pitchFamily="2" charset="-79"/>
+            </a:endParaRPr>
+          </a:p>
+          <a:p>
+            <a:pPr algn="just">
+              <a:spcBef>
+                <a:spcPts val="300"/>
+              </a:spcBef>
+            </a:pPr>
+            <a:r>
+              <a:rPr lang="en-US" sz="2500" dirty="0">
+                <a:solidFill>
+                  <a:schemeClr val="accent2"/>
+                </a:solidFill>
+                <a:latin typeface="Aharoni" panose="02010803020104030203" pitchFamily="2" charset="-79"/>
+                <a:ea typeface="Verdana" panose="020B0604030504040204" pitchFamily="34" charset="0"/>
+                <a:cs typeface="Aharoni" panose="02010803020104030203" pitchFamily="2" charset="-79"/>
+              </a:rPr>
+              <a:t>Definition</a:t>
+            </a:r>
+            <a:r>
+              <a:rPr lang="en-US" sz="3500" dirty="0">
+                <a:solidFill>
+                  <a:schemeClr val="accent2"/>
+                </a:solidFill>
+                <a:latin typeface="Aharoni" panose="02010803020104030203" pitchFamily="2" charset="-79"/>
+                <a:ea typeface="Verdana" panose="020B0604030504040204" pitchFamily="34" charset="0"/>
+                <a:cs typeface="Aharoni" panose="02010803020104030203" pitchFamily="2" charset="-79"/>
+              </a:rPr>
+              <a:t>:</a:t>
+            </a:r>
+            <a:r>
+              <a:rPr lang="en-US" sz="3500" dirty="0">
+                <a:solidFill>
+                  <a:schemeClr val="accent2"/>
+                </a:solidFill>
+                <a:latin typeface="Bahnschrift SemiLight" panose="020B0502040204020203" pitchFamily="34" charset="0"/>
+                <a:ea typeface="Verdana" panose="020B0604030504040204" pitchFamily="34" charset="0"/>
+                <a:cs typeface="Helvetica" panose="020B0604020202020204" pitchFamily="34" charset="0"/>
+              </a:rPr>
+              <a:t> </a:t>
+            </a:r>
+            <a:r>
+              <a:rPr lang="en-US" sz="2200" dirty="0">
+                <a:latin typeface="Bahnschrift SemiLight" panose="020B0502040204020203" pitchFamily="34" charset="0"/>
+                <a:ea typeface="Verdana" panose="020B0604030504040204" pitchFamily="34" charset="0"/>
+                <a:cs typeface="Helvetica" panose="020B0604020202020204" pitchFamily="34" charset="0"/>
+              </a:rPr>
+              <a:t> A family of algorithms, encapsulates each one, and 					makes them interchangeable.</a:t>
+            </a:r>
+          </a:p>
+          <a:p>
+            <a:pPr algn="just">
+              <a:spcBef>
+                <a:spcPts val="300"/>
+              </a:spcBef>
+            </a:pPr>
+            <a:r>
+              <a:rPr lang="en-US" sz="2200" dirty="0">
+                <a:latin typeface="Bahnschrift SemiLight" panose="020B0502040204020203" pitchFamily="34" charset="0"/>
+                <a:ea typeface="Verdana" panose="020B0604030504040204" pitchFamily="34" charset="0"/>
+                <a:cs typeface="Helvetica" panose="020B0604020202020204" pitchFamily="34" charset="0"/>
+              </a:rPr>
+              <a:t>				Strategy lets the algorithm vary independently 						from clients that use it.</a:t>
+            </a:r>
+          </a:p>
+        </p:txBody>
+      </p:sp>
+      <p:sp>
+        <p:nvSpPr>
+          <p:cNvPr id="5" name="TextBox 4">
+            <a:extLst>
+              <a:ext uri="{FF2B5EF4-FFF2-40B4-BE49-F238E27FC236}">
+                <a16:creationId xmlns:a16="http://schemas.microsoft.com/office/drawing/2014/main" id="{1EBF2545-6B9D-4EF2-B0FE-99E0D6D3A927}"/>
+              </a:ext>
+            </a:extLst>
+          </p:cNvPr>
+          <p:cNvSpPr txBox="1"/>
+          <p:nvPr/>
+        </p:nvSpPr>
+        <p:spPr>
+          <a:xfrm>
+            <a:off x="1675002" y="1381700"/>
+            <a:ext cx="8841996" cy="861774"/>
+          </a:xfrm>
+          <a:prstGeom prst="rect">
+            <a:avLst/>
+          </a:prstGeom>
+          <a:noFill/>
+        </p:spPr>
+        <p:txBody>
+          <a:bodyPr wrap="square" rtlCol="0">
+            <a:spAutoFit/>
+          </a:bodyPr>
+          <a:lstStyle/>
+          <a:p>
+            <a:pPr algn="ctr">
+              <a:spcBef>
+                <a:spcPts val="300"/>
+              </a:spcBef>
+            </a:pPr>
+            <a:r>
+              <a:rPr lang="en-US" sz="5000">
+                <a:solidFill>
+                  <a:schemeClr val="accent2"/>
+                </a:solidFill>
+                <a:latin typeface="Aharoni" panose="02010803020104030203" pitchFamily="2" charset="-79"/>
+                <a:ea typeface="Verdana" panose="020B0604030504040204" pitchFamily="34" charset="0"/>
+                <a:cs typeface="Aharoni" panose="02010803020104030203" pitchFamily="2" charset="-79"/>
+              </a:rPr>
+              <a:t>•</a:t>
+            </a:r>
+            <a:r>
+              <a:rPr lang="en-US" sz="4000">
+                <a:solidFill>
+                  <a:schemeClr val="accent2"/>
+                </a:solidFill>
+                <a:latin typeface="Bahnschrift SemiLight" panose="020B0502040204020203" pitchFamily="34" charset="0"/>
+                <a:ea typeface="Verdana" panose="020B0604030504040204" pitchFamily="34" charset="0"/>
+                <a:cs typeface="Helvetica" panose="020B0604020202020204" pitchFamily="34" charset="0"/>
+              </a:rPr>
+              <a:t>	</a:t>
+            </a:r>
+            <a:endParaRPr lang="en-US" sz="2200">
+              <a:latin typeface="Bahnschrift SemiLight" panose="020B0502040204020203" pitchFamily="34" charset="0"/>
+              <a:ea typeface="Verdana" panose="020B0604030504040204" pitchFamily="34" charset="0"/>
+              <a:cs typeface="Helvetica" panose="020B0604020202020204" pitchFamily="34" charset="0"/>
+            </a:endParaRPr>
+          </a:p>
+        </p:txBody>
+      </p:sp>
+    </p:spTree>
+    <p:extLst>
+      <p:ext uri="{BB962C8B-B14F-4D97-AF65-F5344CB8AC3E}">
+        <p14:creationId xmlns:p14="http://schemas.microsoft.com/office/powerpoint/2010/main" val="2088408451"/>
+      </p:ext>
+    </p:extLst>
+  </p:cSld>
+  <p:clrMapOvr>
+    <a:masterClrMapping/>
+  </p:clrMapOvr>
+</p:sld>
+</file>
+
+<file path=ppt/slides/slide5.xml><?xml version="1.0" encoding="utf-8"?>
 <p:sld xmlns:a="http://schemas.openxmlformats.org/drawingml/2006/main" xmlns:r="http://schemas.openxmlformats.org/officeDocument/2006/relationships" xmlns:p="http://schemas.openxmlformats.org/presentationml/2006/main" showMasterSp="0">
   <p:cSld>
     <p:spTree>
@@ -10600,7 +11373,7 @@
 </p:sld>
 </file>
 
-<file path=ppt/slides/slide5.xml><?xml version="1.0" encoding="utf-8"?>
+<file path=ppt/slides/slide6.xml><?xml version="1.0" encoding="utf-8"?>
 <p:sld xmlns:a="http://schemas.openxmlformats.org/drawingml/2006/main" xmlns:r="http://schemas.openxmlformats.org/officeDocument/2006/relationships" xmlns:p="http://schemas.openxmlformats.org/presentationml/2006/main" showMasterSp="0">
   <p:cSld>
     <p:bg>
@@ -10686,7 +11459,7 @@
             <a:pPr algn="ctr"/>
             <a:r>
               <a:rPr lang="en-US">
-                <a:latin typeface="Indie Flower" panose="02000000000000000000" pitchFamily="2" charset="0"/>
+                <a:latin typeface="Indie Flower" panose="02000000000000000000"/>
                 <a:cs typeface="Helvetica" panose="020B0604020202020204" pitchFamily="34" charset="0"/>
               </a:rPr>
               <a:t>Lots of other types</a:t>
@@ -10696,7 +11469,7 @@
             <a:pPr algn="ctr"/>
             <a:r>
               <a:rPr lang="en-US">
-                <a:latin typeface="Indie Flower" panose="02000000000000000000" pitchFamily="2" charset="0"/>
+                <a:latin typeface="Indie Flower" panose="02000000000000000000"/>
                 <a:cs typeface="Helvetica" panose="020B0604020202020204" pitchFamily="34" charset="0"/>
               </a:rPr>
               <a:t>of duck inherit from</a:t>
@@ -10706,7 +11479,7 @@
             <a:pPr algn="ctr"/>
             <a:r>
               <a:rPr lang="en-US">
-                <a:latin typeface="Indie Flower" panose="02000000000000000000" pitchFamily="2" charset="0"/>
+                <a:latin typeface="Indie Flower" panose="02000000000000000000"/>
                 <a:cs typeface="Helvetica" panose="020B0604020202020204" pitchFamily="34" charset="0"/>
               </a:rPr>
               <a:t>the Duck class</a:t>
@@ -10776,7 +11549,7 @@
 </p:sld>
 </file>
 
-<file path=ppt/slides/slide6.xml><?xml version="1.0" encoding="utf-8"?>
+<file path=ppt/slides/slide7.xml><?xml version="1.0" encoding="utf-8"?>
 <p:sld xmlns:a="http://schemas.openxmlformats.org/drawingml/2006/main" xmlns:r="http://schemas.openxmlformats.org/officeDocument/2006/relationships" xmlns:p="http://schemas.openxmlformats.org/presentationml/2006/main" showMasterSp="0">
   <p:cSld>
     <p:bg>
@@ -11011,7 +11784,7 @@
 </p:sld>
 </file>
 
-<file path=ppt/slides/slide7.xml><?xml version="1.0" encoding="utf-8"?>
+<file path=ppt/slides/slide8.xml><?xml version="1.0" encoding="utf-8"?>
 <p:sld xmlns:a="http://schemas.openxmlformats.org/drawingml/2006/main" xmlns:r="http://schemas.openxmlformats.org/officeDocument/2006/relationships" xmlns:p="http://schemas.openxmlformats.org/presentationml/2006/main" showMasterSp="0">
   <p:cSld>
     <p:bg>
@@ -11315,7 +12088,7 @@
 </p:sld>
 </file>
 
-<file path=ppt/slides/slide8.xml><?xml version="1.0" encoding="utf-8"?>
+<file path=ppt/slides/slide9.xml><?xml version="1.0" encoding="utf-8"?>
 <p:sld xmlns:a="http://schemas.openxmlformats.org/drawingml/2006/main" xmlns:r="http://schemas.openxmlformats.org/officeDocument/2006/relationships" xmlns:p="http://schemas.openxmlformats.org/presentationml/2006/main" showMasterSp="0">
   <p:cSld>
     <p:bg>
@@ -11549,123 +12322,6 @@
     <p:extLst>
       <p:ext uri="{BB962C8B-B14F-4D97-AF65-F5344CB8AC3E}">
         <p14:creationId xmlns:p14="http://schemas.microsoft.com/office/powerpoint/2010/main" val="112266801"/>
-      </p:ext>
-    </p:extLst>
-  </p:cSld>
-  <p:clrMapOvr>
-    <a:masterClrMapping/>
-  </p:clrMapOvr>
-</p:sld>
-</file>
-
-<file path=ppt/slides/slide9.xml><?xml version="1.0" encoding="utf-8"?>
-<p:sld xmlns:a="http://schemas.openxmlformats.org/drawingml/2006/main" xmlns:r="http://schemas.openxmlformats.org/officeDocument/2006/relationships" xmlns:p="http://schemas.openxmlformats.org/presentationml/2006/main" showMasterSp="0">
-  <p:cSld>
-    <p:bg>
-      <p:bgPr>
-        <a:solidFill>
-          <a:schemeClr val="bg1"/>
-        </a:solidFill>
-        <a:effectLst/>
-      </p:bgPr>
-    </p:bg>
-    <p:spTree>
-      <p:nvGrpSpPr>
-        <p:cNvPr id="1" name=""/>
-        <p:cNvGrpSpPr/>
-        <p:nvPr/>
-      </p:nvGrpSpPr>
-      <p:grpSpPr>
-        <a:xfrm>
-          <a:off x="0" y="0"/>
-          <a:ext cx="0" cy="0"/>
-          <a:chOff x="0" y="0"/>
-          <a:chExt cx="0" cy="0"/>
-        </a:xfrm>
-      </p:grpSpPr>
-      <p:sp>
-        <p:nvSpPr>
-          <p:cNvPr id="8" name="TextBox 7">
-            <a:extLst>
-              <a:ext uri="{FF2B5EF4-FFF2-40B4-BE49-F238E27FC236}">
-                <a16:creationId xmlns:a16="http://schemas.microsoft.com/office/drawing/2014/main" id="{27D439ED-754F-41BB-B4DE-AB32597D52D0}"/>
-              </a:ext>
-            </a:extLst>
-          </p:cNvPr>
-          <p:cNvSpPr txBox="1"/>
-          <p:nvPr/>
-        </p:nvSpPr>
-        <p:spPr>
-          <a:xfrm>
-            <a:off x="913001" y="383563"/>
-            <a:ext cx="9883585" cy="784830"/>
-          </a:xfrm>
-          <a:prstGeom prst="rect">
-            <a:avLst/>
-          </a:prstGeom>
-          <a:noFill/>
-        </p:spPr>
-        <p:txBody>
-          <a:bodyPr wrap="square" rtlCol="0">
-            <a:spAutoFit/>
-          </a:bodyPr>
-          <a:lstStyle/>
-          <a:p>
-            <a:pPr algn="ctr">
-              <a:spcBef>
-                <a:spcPts val="300"/>
-              </a:spcBef>
-            </a:pPr>
-            <a:r>
-              <a:rPr lang="en-US" sz="4500">
-                <a:solidFill>
-                  <a:schemeClr val="accent4">
-                    <a:lumMod val="50000"/>
-                  </a:schemeClr>
-                </a:solidFill>
-                <a:latin typeface="Aharoni" panose="02010803020104030203" pitchFamily="2" charset="-79"/>
-                <a:ea typeface="Verdana" panose="020B0604030504040204" pitchFamily="34" charset="0"/>
-                <a:cs typeface="Aharoni" panose="02010803020104030203" pitchFamily="2" charset="-79"/>
-              </a:rPr>
-              <a:t>what about an interface?</a:t>
-            </a:r>
-          </a:p>
-        </p:txBody>
-      </p:sp>
-      <p:pic>
-        <p:nvPicPr>
-          <p:cNvPr id="7" name="Picture 6">
-            <a:extLst>
-              <a:ext uri="{FF2B5EF4-FFF2-40B4-BE49-F238E27FC236}">
-                <a16:creationId xmlns:a16="http://schemas.microsoft.com/office/drawing/2014/main" id="{6F580011-23E0-4AB8-B47A-D91E58A0418F}"/>
-              </a:ext>
-            </a:extLst>
-          </p:cNvPr>
-          <p:cNvPicPr>
-            <a:picLocks noChangeAspect="1"/>
-          </p:cNvPicPr>
-          <p:nvPr/>
-        </p:nvPicPr>
-        <p:blipFill>
-          <a:blip r:embed="rId2"/>
-          <a:stretch>
-            <a:fillRect/>
-          </a:stretch>
-        </p:blipFill>
-        <p:spPr>
-          <a:xfrm>
-            <a:off x="2408075" y="1391585"/>
-            <a:ext cx="7375849" cy="4477078"/>
-          </a:xfrm>
-          <a:prstGeom prst="rect">
-            <a:avLst/>
-          </a:prstGeom>
-        </p:spPr>
-      </p:pic>
-    </p:spTree>
-    <p:extLst>
-      <p:ext uri="{BB962C8B-B14F-4D97-AF65-F5344CB8AC3E}">
-        <p14:creationId xmlns:p14="http://schemas.microsoft.com/office/powerpoint/2010/main" val="3156013238"/>
       </p:ext>
     </p:extLst>
   </p:cSld>

</xml_diff>

<commit_message>
Sửa lại pros and cons
</commit_message>
<xml_diff>
--- a/seminar/StrategyPattern.pptx
+++ b/seminar/StrategyPattern.pptx
@@ -24,13 +24,14 @@
     <p:sldId id="285" r:id="rId18"/>
     <p:sldId id="272" r:id="rId19"/>
     <p:sldId id="273" r:id="rId20"/>
-    <p:sldId id="274" r:id="rId21"/>
-    <p:sldId id="284" r:id="rId22"/>
-    <p:sldId id="289" r:id="rId23"/>
-    <p:sldId id="283" r:id="rId24"/>
-    <p:sldId id="275" r:id="rId25"/>
-    <p:sldId id="288" r:id="rId26"/>
-    <p:sldId id="286" r:id="rId27"/>
+    <p:sldId id="290" r:id="rId21"/>
+    <p:sldId id="274" r:id="rId22"/>
+    <p:sldId id="284" r:id="rId23"/>
+    <p:sldId id="289" r:id="rId24"/>
+    <p:sldId id="283" r:id="rId25"/>
+    <p:sldId id="275" r:id="rId26"/>
+    <p:sldId id="288" r:id="rId27"/>
+    <p:sldId id="286" r:id="rId28"/>
   </p:sldIdLst>
   <p:sldSz cx="12192000" cy="6858000"/>
   <p:notesSz cx="6858000" cy="9144000"/>
@@ -5628,8 +5629,8 @@
         </p:nvSpPr>
         <p:spPr>
           <a:xfrm>
-            <a:off x="1235964" y="2493479"/>
-            <a:ext cx="7764400" cy="2462213"/>
+            <a:off x="1517836" y="2619604"/>
+            <a:ext cx="7764400" cy="3570208"/>
           </a:xfrm>
           <a:prstGeom prst="rect">
             <a:avLst/>
@@ -5643,6 +5644,9 @@
           <a:lstStyle/>
           <a:p>
             <a:pPr marL="285750" indent="-285750" fontAlgn="base">
+              <a:lnSpc>
+                <a:spcPct val="150000"/>
+              </a:lnSpc>
               <a:buFont typeface="Wingdings" panose="05000000000000000000" pitchFamily="2" charset="2"/>
               <a:buChar char="§"/>
             </a:pPr>
@@ -5658,7 +5662,76 @@
                 <a:latin typeface="Bahnschrift SemiLight" panose="020B0502040204020203" pitchFamily="34" charset="0"/>
                 <a:cs typeface="Times New Roman" panose="02020603050405020304" pitchFamily="18" charset="0"/>
               </a:rPr>
-              <a:t>Easy to switch between different algorithms (strategies) at run-time </a:t>
+              <a:t>Encapsulating the algorithm make it easier to switch, understand and extend.</a:t>
+            </a:r>
+          </a:p>
+          <a:p>
+            <a:pPr marL="285750" indent="-285750" fontAlgn="base">
+              <a:lnSpc>
+                <a:spcPct val="150000"/>
+              </a:lnSpc>
+              <a:buFont typeface="Wingdings" panose="05000000000000000000" pitchFamily="2" charset="2"/>
+              <a:buChar char="§"/>
+            </a:pPr>
+            <a:r>
+              <a:rPr lang="en-US" sz="2400" dirty="0">
+                <a:ln w="0" cmpd="thinThick">
+                  <a:solidFill>
+                    <a:schemeClr val="tx1">
+                      <a:alpha val="6000"/>
+                    </a:schemeClr>
+                  </a:solidFill>
+                </a:ln>
+                <a:latin typeface="Bahnschrift SemiLight" panose="020B0502040204020203" pitchFamily="34" charset="0"/>
+                <a:cs typeface="Times New Roman" panose="02020603050405020304" pitchFamily="18" charset="0"/>
+              </a:rPr>
+              <a:t>Reduces long lists of conditionals.</a:t>
+            </a:r>
+          </a:p>
+          <a:p>
+            <a:pPr marL="285750" indent="-285750" fontAlgn="base">
+              <a:lnSpc>
+                <a:spcPct val="150000"/>
+              </a:lnSpc>
+              <a:buFont typeface="Wingdings" panose="05000000000000000000" pitchFamily="2" charset="2"/>
+              <a:buChar char="§"/>
+            </a:pPr>
+            <a:r>
+              <a:rPr lang="en-US" sz="2400" dirty="0">
+                <a:ln w="0" cmpd="thinThick">
+                  <a:solidFill>
+                    <a:schemeClr val="tx1">
+                      <a:alpha val="6000"/>
+                    </a:schemeClr>
+                  </a:solidFill>
+                </a:ln>
+                <a:latin typeface="Bahnschrift SemiLight" panose="020B0502040204020203" pitchFamily="34" charset="0"/>
+                <a:cs typeface="Times New Roman" panose="02020603050405020304" pitchFamily="18" charset="0"/>
+              </a:rPr>
+              <a:t>Avoid duplicate code.</a:t>
+            </a:r>
+          </a:p>
+          <a:p>
+            <a:pPr marL="285750" indent="-285750" fontAlgn="base">
+              <a:lnSpc>
+                <a:spcPct val="150000"/>
+              </a:lnSpc>
+              <a:buFont typeface="Wingdings" panose="05000000000000000000" pitchFamily="2" charset="2"/>
+              <a:buChar char="§"/>
+            </a:pPr>
+            <a:r>
+              <a:rPr lang="en-US" sz="2400" dirty="0">
+                <a:ln w="0" cmpd="thinThick">
+                  <a:solidFill>
+                    <a:schemeClr val="tx1">
+                      <a:alpha val="6000"/>
+                    </a:schemeClr>
+                  </a:solidFill>
+                </a:ln>
+                <a:latin typeface="Bahnschrift SemiLight" panose="020B0502040204020203" pitchFamily="34" charset="0"/>
+                <a:cs typeface="Times New Roman" panose="02020603050405020304" pitchFamily="18" charset="0"/>
+              </a:rPr>
+              <a:t>Encapsulate/hide complicate/secret code from users.</a:t>
             </a:r>
           </a:p>
           <a:p>
@@ -5676,26 +5749,6 @@
             </a:endParaRPr>
           </a:p>
           <a:p>
-            <a:pPr marL="285750" indent="-285750" fontAlgn="base">
-              <a:buFont typeface="Wingdings" panose="05000000000000000000" pitchFamily="2" charset="2"/>
-              <a:buChar char="§"/>
-            </a:pPr>
-            <a:r>
-              <a:rPr lang="en-US" sz="2400" dirty="0">
-                <a:ln w="0" cmpd="thinThick">
-                  <a:solidFill>
-                    <a:schemeClr val="tx1">
-                      <a:alpha val="6000"/>
-                    </a:schemeClr>
-                  </a:solidFill>
-                </a:ln>
-                <a:latin typeface="Bahnschrift SemiLight" panose="020B0502040204020203" pitchFamily="34" charset="0"/>
-                <a:cs typeface="Times New Roman" panose="02020603050405020304" pitchFamily="18" charset="0"/>
-              </a:rPr>
-              <a:t>Cleaner code because conditional-infested code is avoided </a:t>
-            </a:r>
-          </a:p>
-          <a:p>
             <a:pPr fontAlgn="base"/>
             <a:endParaRPr lang="en-US" sz="500" dirty="0">
               <a:ln w="0" cmpd="thinThick">
@@ -5705,40 +5758,6 @@
                   </a:schemeClr>
                 </a:solidFill>
               </a:ln>
-              <a:latin typeface="Bahnschrift SemiLight" panose="020B0502040204020203" pitchFamily="34" charset="0"/>
-              <a:cs typeface="Times New Roman" panose="02020603050405020304" pitchFamily="18" charset="0"/>
-            </a:endParaRPr>
-          </a:p>
-          <a:p>
-            <a:pPr marL="285750" indent="-285750" fontAlgn="base">
-              <a:buFont typeface="Wingdings" panose="05000000000000000000" pitchFamily="2" charset="2"/>
-              <a:buChar char="§"/>
-            </a:pPr>
-            <a:r>
-              <a:rPr lang="en-US" sz="2400" dirty="0">
-                <a:ln w="0" cmpd="thinThick">
-                  <a:solidFill>
-                    <a:schemeClr val="tx1">
-                      <a:alpha val="6000"/>
-                    </a:schemeClr>
-                  </a:solidFill>
-                </a:ln>
-                <a:latin typeface="Bahnschrift SemiLight" panose="020B0502040204020203" pitchFamily="34" charset="0"/>
-                <a:cs typeface="Times New Roman" panose="02020603050405020304" pitchFamily="18" charset="0"/>
-              </a:rPr>
-              <a:t>Even cleaner code since the concerns are separated into classes (a class to each strategy)</a:t>
-            </a:r>
-            <a:endParaRPr lang="en-US" sz="1600" dirty="0">
-              <a:ln w="0" cmpd="thinThick">
-                <a:solidFill>
-                  <a:schemeClr val="tx1">
-                    <a:alpha val="6000"/>
-                  </a:schemeClr>
-                </a:solidFill>
-              </a:ln>
-              <a:solidFill>
-                <a:schemeClr val="bg1"/>
-              </a:solidFill>
               <a:latin typeface="Bahnschrift SemiLight" panose="020B0502040204020203" pitchFamily="34" charset="0"/>
               <a:cs typeface="Times New Roman" panose="02020603050405020304" pitchFamily="18" charset="0"/>
             </a:endParaRPr>
@@ -6000,7 +6019,7 @@
                                         <p:tgtEl>
                                           <p:spTgt spid="11">
                                             <p:txEl>
-                                              <p:pRg st="2" end="2"/>
+                                              <p:pRg st="1" end="1"/>
                                             </p:txEl>
                                           </p:spTgt>
                                         </p:tgtEl>
@@ -6018,7 +6037,7 @@
                                         <p:tgtEl>
                                           <p:spTgt spid="11">
                                             <p:txEl>
-                                              <p:pRg st="2" end="2"/>
+                                              <p:pRg st="1" end="1"/>
                                             </p:txEl>
                                           </p:spTgt>
                                         </p:tgtEl>
@@ -6061,7 +6080,7 @@
                                         <p:tgtEl>
                                           <p:spTgt spid="11">
                                             <p:txEl>
-                                              <p:pRg st="4" end="4"/>
+                                              <p:pRg st="2" end="2"/>
                                             </p:txEl>
                                           </p:spTgt>
                                         </p:tgtEl>
@@ -6079,7 +6098,7 @@
                                         <p:tgtEl>
                                           <p:spTgt spid="11">
                                             <p:txEl>
-                                              <p:pRg st="4" end="4"/>
+                                              <p:pRg st="2" end="2"/>
                                             </p:txEl>
                                           </p:spTgt>
                                         </p:tgtEl>
@@ -6107,7 +6126,7 @@
                             </p:stCondLst>
                             <p:childTnLst>
                               <p:par>
-                                <p:cTn id="20" presetID="10" presetClass="entr" presetSubtype="0" fill="hold" nodeType="clickEffect">
+                                <p:cTn id="20" presetID="22" presetClass="entr" presetSubtype="8" fill="hold" grpId="0" nodeType="clickEffect">
                                   <p:stCondLst>
                                     <p:cond delay="0"/>
                                   </p:stCondLst>
@@ -6115,6 +6134,67 @@
                                     <p:set>
                                       <p:cBhvr>
                                         <p:cTn id="21" dur="1" fill="hold">
+                                          <p:stCondLst>
+                                            <p:cond delay="0"/>
+                                          </p:stCondLst>
+                                        </p:cTn>
+                                        <p:tgtEl>
+                                          <p:spTgt spid="11">
+                                            <p:txEl>
+                                              <p:pRg st="3" end="3"/>
+                                            </p:txEl>
+                                          </p:spTgt>
+                                        </p:tgtEl>
+                                        <p:attrNameLst>
+                                          <p:attrName>style.visibility</p:attrName>
+                                        </p:attrNameLst>
+                                      </p:cBhvr>
+                                      <p:to>
+                                        <p:strVal val="visible"/>
+                                      </p:to>
+                                    </p:set>
+                                    <p:animEffect transition="in" filter="wipe(left)">
+                                      <p:cBhvr>
+                                        <p:cTn id="22" dur="500"/>
+                                        <p:tgtEl>
+                                          <p:spTgt spid="11">
+                                            <p:txEl>
+                                              <p:pRg st="3" end="3"/>
+                                            </p:txEl>
+                                          </p:spTgt>
+                                        </p:tgtEl>
+                                      </p:cBhvr>
+                                    </p:animEffect>
+                                  </p:childTnLst>
+                                </p:cTn>
+                              </p:par>
+                            </p:childTnLst>
+                          </p:cTn>
+                        </p:par>
+                      </p:childTnLst>
+                    </p:cTn>
+                  </p:par>
+                  <p:par>
+                    <p:cTn id="23" fill="hold">
+                      <p:stCondLst>
+                        <p:cond delay="indefinite"/>
+                      </p:stCondLst>
+                      <p:childTnLst>
+                        <p:par>
+                          <p:cTn id="24" fill="hold">
+                            <p:stCondLst>
+                              <p:cond delay="0"/>
+                            </p:stCondLst>
+                            <p:childTnLst>
+                              <p:par>
+                                <p:cTn id="25" presetID="10" presetClass="entr" presetSubtype="0" fill="hold" nodeType="clickEffect">
+                                  <p:stCondLst>
+                                    <p:cond delay="0"/>
+                                  </p:stCondLst>
+                                  <p:childTnLst>
+                                    <p:set>
+                                      <p:cBhvr>
+                                        <p:cTn id="26" dur="1" fill="hold">
                                           <p:stCondLst>
                                             <p:cond delay="0"/>
                                           </p:stCondLst>
@@ -6132,7 +6212,7 @@
                                     </p:set>
                                     <p:animEffect transition="in" filter="fade">
                                       <p:cBhvr>
-                                        <p:cTn id="22" dur="500"/>
+                                        <p:cTn id="27" dur="500"/>
                                         <p:tgtEl>
                                           <p:spTgt spid="2"/>
                                         </p:tgtEl>
@@ -6206,8 +6286,8 @@
         </p:nvSpPr>
         <p:spPr>
           <a:xfrm>
-            <a:off x="2452647" y="2249640"/>
-            <a:ext cx="8503389" cy="3200876"/>
+            <a:off x="2452647" y="1738370"/>
+            <a:ext cx="8503389" cy="4601260"/>
           </a:xfrm>
           <a:prstGeom prst="rect">
             <a:avLst/>
@@ -6221,6 +6301,55 @@
           <a:lstStyle/>
           <a:p>
             <a:pPr marL="285750" indent="-285750" fontAlgn="base">
+              <a:lnSpc>
+                <a:spcPct val="150000"/>
+              </a:lnSpc>
+              <a:buFont typeface="Wingdings" panose="05000000000000000000" pitchFamily="2" charset="2"/>
+              <a:buChar char="§"/>
+            </a:pPr>
+            <a:r>
+              <a:rPr lang="en-US" sz="2400" dirty="0">
+                <a:ln cmpd="thinThick">
+                  <a:solidFill>
+                    <a:schemeClr val="tx1">
+                      <a:alpha val="6000"/>
+                    </a:schemeClr>
+                  </a:solidFill>
+                </a:ln>
+                <a:latin typeface="Bahnschrift SemiLight" panose="020B0502040204020203" pitchFamily="34" charset="0"/>
+                <a:cs typeface="Times New Roman" panose="02020603050405020304" pitchFamily="18" charset="0"/>
+              </a:rPr>
+              <a:t>Increased number of objects/classes.</a:t>
+            </a:r>
+          </a:p>
+          <a:p>
+            <a:pPr marL="285750" indent="-285750" fontAlgn="base">
+              <a:lnSpc>
+                <a:spcPct val="150000"/>
+              </a:lnSpc>
+              <a:buFont typeface="Wingdings" panose="05000000000000000000" pitchFamily="2" charset="2"/>
+              <a:buChar char="§"/>
+            </a:pPr>
+            <a:r>
+              <a:rPr lang="en-US" sz="2400" dirty="0">
+                <a:ln cmpd="thinThick">
+                  <a:solidFill>
+                    <a:schemeClr val="tx1">
+                      <a:alpha val="6000"/>
+                    </a:schemeClr>
+                  </a:solidFill>
+                </a:ln>
+                <a:latin typeface="Bahnschrift SemiLight" panose="020B0502040204020203" pitchFamily="34" charset="0"/>
+                <a:cs typeface="Times New Roman" panose="02020603050405020304" pitchFamily="18" charset="0"/>
+              </a:rPr>
+              <a:t>Change the structure of program easily to confuse if you don’t know the structure well.</a:t>
+            </a:r>
+          </a:p>
+          <a:p>
+            <a:pPr marL="285750" indent="-285750" fontAlgn="base">
+              <a:lnSpc>
+                <a:spcPct val="150000"/>
+              </a:lnSpc>
               <a:buFont typeface="Wingdings" panose="05000000000000000000" pitchFamily="2" charset="2"/>
               <a:buChar char="§"/>
             </a:pPr>
@@ -6237,6 +6366,29 @@
                 <a:cs typeface="Times New Roman" panose="02020603050405020304" pitchFamily="18" charset="0"/>
               </a:rPr>
               <a:t>The user must be aware of all the strategies to select the right one for the right situation.</a:t>
+            </a:r>
+          </a:p>
+          <a:p>
+            <a:pPr marL="285750" indent="-285750" fontAlgn="base">
+              <a:lnSpc>
+                <a:spcPct val="150000"/>
+              </a:lnSpc>
+              <a:buFont typeface="Wingdings" panose="05000000000000000000" pitchFamily="2" charset="2"/>
+              <a:buChar char="§"/>
+            </a:pPr>
+            <a:r>
+              <a:rPr lang="en-US" sz="2400" dirty="0">
+                <a:ln cmpd="thinThick">
+                  <a:solidFill>
+                    <a:schemeClr val="tx1">
+                      <a:alpha val="6000"/>
+                    </a:schemeClr>
+                  </a:solidFill>
+                </a:ln>
+                <a:latin typeface="Bahnschrift SemiLight" panose="020B0502040204020203" pitchFamily="34" charset="0"/>
+                <a:cs typeface="Times New Roman" panose="02020603050405020304" pitchFamily="18" charset="0"/>
+              </a:rPr>
+              <a:t>There will be times when the context creates and initializes parameters that never get used (Communication overhead between Strategy and Context).</a:t>
             </a:r>
           </a:p>
           <a:p>
@@ -6255,91 +6407,6 @@
               <a:latin typeface="Bahnschrift SemiLight" panose="020B0502040204020203" pitchFamily="34" charset="0"/>
               <a:cs typeface="Times New Roman" panose="02020603050405020304" pitchFamily="18" charset="0"/>
             </a:endParaRPr>
-          </a:p>
-          <a:p>
-            <a:pPr marL="285750" indent="-285750" fontAlgn="base">
-              <a:buFont typeface="Wingdings" panose="05000000000000000000" pitchFamily="2" charset="2"/>
-              <a:buChar char="§"/>
-            </a:pPr>
-            <a:r>
-              <a:rPr lang="en-US" sz="2400" dirty="0">
-                <a:ln cmpd="thinThick">
-                  <a:solidFill>
-                    <a:schemeClr val="tx1">
-                      <a:alpha val="6000"/>
-                    </a:schemeClr>
-                  </a:solidFill>
-                </a:ln>
-                <a:latin typeface="Bahnschrift SemiLight" panose="020B0502040204020203" pitchFamily="34" charset="0"/>
-                <a:cs typeface="Times New Roman" panose="02020603050405020304" pitchFamily="18" charset="0"/>
-              </a:rPr>
-              <a:t>Strategy base class must expose interface for all the required behaviors, which some concrete Strategy </a:t>
-            </a:r>
-            <a:r>
-              <a:rPr lang="en-US" sz="2400" dirty="0">
-                <a:ln w="0" cmpd="thinThick">
-                  <a:solidFill>
-                    <a:schemeClr val="tx1">
-                      <a:alpha val="6000"/>
-                    </a:schemeClr>
-                  </a:solidFill>
-                </a:ln>
-                <a:latin typeface="Bahnschrift SemiLight" panose="020B0502040204020203" pitchFamily="34" charset="0"/>
-                <a:cs typeface="Times New Roman" panose="02020603050405020304" pitchFamily="18" charset="0"/>
-              </a:rPr>
-              <a:t>classes</a:t>
-            </a:r>
-            <a:r>
-              <a:rPr lang="en-US" sz="2400" dirty="0">
-                <a:ln cmpd="thinThick">
-                  <a:solidFill>
-                    <a:schemeClr val="tx1">
-                      <a:alpha val="6000"/>
-                    </a:schemeClr>
-                  </a:solidFill>
-                </a:ln>
-                <a:latin typeface="Bahnschrift SemiLight" panose="020B0502040204020203" pitchFamily="34" charset="0"/>
-                <a:cs typeface="Times New Roman" panose="02020603050405020304" pitchFamily="18" charset="0"/>
-              </a:rPr>
-              <a:t> might not implement.</a:t>
-            </a:r>
-          </a:p>
-          <a:p>
-            <a:pPr marL="285750" indent="-285750" fontAlgn="base">
-              <a:buFont typeface="Wingdings" panose="05000000000000000000" pitchFamily="2" charset="2"/>
-              <a:buChar char="§"/>
-            </a:pPr>
-            <a:endParaRPr lang="en-US" sz="500" dirty="0">
-              <a:ln cmpd="thinThick">
-                <a:solidFill>
-                  <a:schemeClr val="tx1">
-                    <a:alpha val="6000"/>
-                  </a:schemeClr>
-                </a:solidFill>
-              </a:ln>
-              <a:latin typeface="Bahnschrift SemiLight" panose="020B0502040204020203" pitchFamily="34" charset="0"/>
-              <a:cs typeface="Times New Roman" panose="02020603050405020304" pitchFamily="18" charset="0"/>
-            </a:endParaRPr>
-          </a:p>
-          <a:p>
-            <a:pPr marL="285750" indent="-285750" fontAlgn="base">
-              <a:buFont typeface="Wingdings" panose="05000000000000000000" pitchFamily="2" charset="2"/>
-              <a:buChar char="§"/>
-            </a:pPr>
-            <a:r>
-              <a:rPr lang="en-US" sz="2400" dirty="0">
-                <a:ln cmpd="thinThick">
-                  <a:solidFill>
-                    <a:schemeClr val="tx1">
-                      <a:alpha val="6000"/>
-                    </a:schemeClr>
-                  </a:solidFill>
-                </a:ln>
-                <a:latin typeface="Bahnschrift SemiLight" panose="020B0502040204020203" pitchFamily="34" charset="0"/>
-                <a:cs typeface="Times New Roman" panose="02020603050405020304" pitchFamily="18" charset="0"/>
-              </a:rPr>
-              <a:t>In most cases, the application configures the Context with the required Strategy object. Therefore, the application needs to create and maintain two objects instead of one.</a:t>
-            </a:r>
           </a:p>
         </p:txBody>
       </p:sp>
@@ -6470,7 +6537,7 @@
         </p:nvSpPr>
         <p:spPr>
           <a:xfrm>
-            <a:off x="1235964" y="750024"/>
+            <a:off x="1235964" y="518784"/>
             <a:ext cx="9720072" cy="1499616"/>
           </a:xfrm>
         </p:spPr>
@@ -6583,7 +6650,7 @@
                             </p:stCondLst>
                             <p:childTnLst>
                               <p:par>
-                                <p:cTn id="10" presetID="21" presetClass="entr" presetSubtype="1" fill="hold" nodeType="clickEffect">
+                                <p:cTn id="10" presetID="16" presetClass="entr" presetSubtype="21" fill="hold" nodeType="clickEffect">
                                   <p:stCondLst>
                                     <p:cond delay="0"/>
                                   </p:stCondLst>
@@ -6598,7 +6665,7 @@
                                         <p:tgtEl>
                                           <p:spTgt spid="11">
                                             <p:txEl>
-                                              <p:pRg st="2" end="2"/>
+                                              <p:pRg st="1" end="1"/>
                                             </p:txEl>
                                           </p:spTgt>
                                         </p:tgtEl>
@@ -6610,13 +6677,13 @@
                                         <p:strVal val="visible"/>
                                       </p:to>
                                     </p:set>
-                                    <p:animEffect transition="in" filter="wheel(1)">
+                                    <p:animEffect transition="in" filter="barn(inVertical)">
                                       <p:cBhvr>
-                                        <p:cTn id="12" dur="2000"/>
+                                        <p:cTn id="12" dur="500"/>
                                         <p:tgtEl>
                                           <p:spTgt spid="11">
                                             <p:txEl>
-                                              <p:pRg st="2" end="2"/>
+                                              <p:pRg st="1" end="1"/>
                                             </p:txEl>
                                           </p:spTgt>
                                         </p:tgtEl>
@@ -6644,7 +6711,7 @@
                             </p:stCondLst>
                             <p:childTnLst>
                               <p:par>
-                                <p:cTn id="15" presetID="2" presetClass="entr" presetSubtype="4" fill="hold" nodeType="clickEffect">
+                                <p:cTn id="15" presetID="16" presetClass="entr" presetSubtype="21" fill="hold" nodeType="clickEffect">
                                   <p:stCondLst>
                                     <p:cond delay="0"/>
                                   </p:stCondLst>
@@ -6659,7 +6726,7 @@
                                         <p:tgtEl>
                                           <p:spTgt spid="11">
                                             <p:txEl>
-                                              <p:pRg st="4" end="4"/>
+                                              <p:pRg st="2" end="2"/>
                                             </p:txEl>
                                           </p:spTgt>
                                         </p:tgtEl>
@@ -6671,60 +6738,18 @@
                                         <p:strVal val="visible"/>
                                       </p:to>
                                     </p:set>
-                                    <p:anim calcmode="lin" valueType="num">
-                                      <p:cBhvr additive="base">
-                                        <p:cTn id="17" dur="500" fill="hold"/>
+                                    <p:animEffect transition="in" filter="barn(inVertical)">
+                                      <p:cBhvr>
+                                        <p:cTn id="17" dur="500"/>
                                         <p:tgtEl>
                                           <p:spTgt spid="11">
                                             <p:txEl>
-                                              <p:pRg st="4" end="4"/>
+                                              <p:pRg st="2" end="2"/>
                                             </p:txEl>
                                           </p:spTgt>
                                         </p:tgtEl>
-                                        <p:attrNameLst>
-                                          <p:attrName>ppt_x</p:attrName>
-                                        </p:attrNameLst>
                                       </p:cBhvr>
-                                      <p:tavLst>
-                                        <p:tav tm="0">
-                                          <p:val>
-                                            <p:strVal val="#ppt_x"/>
-                                          </p:val>
-                                        </p:tav>
-                                        <p:tav tm="100000">
-                                          <p:val>
-                                            <p:strVal val="#ppt_x"/>
-                                          </p:val>
-                                        </p:tav>
-                                      </p:tavLst>
-                                    </p:anim>
-                                    <p:anim calcmode="lin" valueType="num">
-                                      <p:cBhvr additive="base">
-                                        <p:cTn id="18" dur="500" fill="hold"/>
-                                        <p:tgtEl>
-                                          <p:spTgt spid="11">
-                                            <p:txEl>
-                                              <p:pRg st="4" end="4"/>
-                                            </p:txEl>
-                                          </p:spTgt>
-                                        </p:tgtEl>
-                                        <p:attrNameLst>
-                                          <p:attrName>ppt_y</p:attrName>
-                                        </p:attrNameLst>
-                                      </p:cBhvr>
-                                      <p:tavLst>
-                                        <p:tav tm="0">
-                                          <p:val>
-                                            <p:strVal val="1+#ppt_h/2"/>
-                                          </p:val>
-                                        </p:tav>
-                                        <p:tav tm="100000">
-                                          <p:val>
-                                            <p:strVal val="#ppt_y"/>
-                                          </p:val>
-                                        </p:tav>
-                                      </p:tavLst>
-                                    </p:anim>
+                                    </p:animEffect>
                                   </p:childTnLst>
                                 </p:cTn>
                               </p:par>
@@ -6735,26 +6760,87 @@
                     </p:cTn>
                   </p:par>
                   <p:par>
-                    <p:cTn id="19" fill="hold">
+                    <p:cTn id="18" fill="hold">
                       <p:stCondLst>
                         <p:cond delay="indefinite"/>
                       </p:stCondLst>
                       <p:childTnLst>
                         <p:par>
-                          <p:cTn id="20" fill="hold">
+                          <p:cTn id="19" fill="hold">
                             <p:stCondLst>
                               <p:cond delay="0"/>
                             </p:stCondLst>
                             <p:childTnLst>
                               <p:par>
-                                <p:cTn id="21" presetID="10" presetClass="entr" presetSubtype="0" fill="hold" nodeType="clickEffect">
+                                <p:cTn id="20" presetID="21" presetClass="entr" presetSubtype="1" fill="hold" nodeType="clickEffect">
                                   <p:stCondLst>
                                     <p:cond delay="0"/>
                                   </p:stCondLst>
                                   <p:childTnLst>
                                     <p:set>
                                       <p:cBhvr>
-                                        <p:cTn id="22" dur="1" fill="hold">
+                                        <p:cTn id="21" dur="1" fill="hold">
+                                          <p:stCondLst>
+                                            <p:cond delay="0"/>
+                                          </p:stCondLst>
+                                        </p:cTn>
+                                        <p:tgtEl>
+                                          <p:spTgt spid="11">
+                                            <p:txEl>
+                                              <p:pRg st="3" end="3"/>
+                                            </p:txEl>
+                                          </p:spTgt>
+                                        </p:tgtEl>
+                                        <p:attrNameLst>
+                                          <p:attrName>style.visibility</p:attrName>
+                                        </p:attrNameLst>
+                                      </p:cBhvr>
+                                      <p:to>
+                                        <p:strVal val="visible"/>
+                                      </p:to>
+                                    </p:set>
+                                    <p:animEffect transition="in" filter="wheel(1)">
+                                      <p:cBhvr>
+                                        <p:cTn id="22" dur="2000"/>
+                                        <p:tgtEl>
+                                          <p:spTgt spid="11">
+                                            <p:txEl>
+                                              <p:pRg st="3" end="3"/>
+                                            </p:txEl>
+                                          </p:spTgt>
+                                        </p:tgtEl>
+                                      </p:cBhvr>
+                                    </p:animEffect>
+                                  </p:childTnLst>
+                                </p:cTn>
+                              </p:par>
+                            </p:childTnLst>
+                          </p:cTn>
+                        </p:par>
+                      </p:childTnLst>
+                    </p:cTn>
+                  </p:par>
+                  <p:par>
+                    <p:cTn id="23" fill="hold">
+                      <p:stCondLst>
+                        <p:cond delay="indefinite"/>
+                      </p:stCondLst>
+                      <p:childTnLst>
+                        <p:par>
+                          <p:cTn id="24" fill="hold">
+                            <p:stCondLst>
+                              <p:cond delay="0"/>
+                            </p:stCondLst>
+                            <p:childTnLst>
+                              <p:par>
+                                <p:cTn id="25" presetID="10" presetClass="entr" presetSubtype="0" fill="hold" nodeType="clickEffect">
+                                  <p:stCondLst>
+                                    <p:cond delay="0"/>
+                                  </p:stCondLst>
+                                  <p:childTnLst>
+                                    <p:set>
+                                      <p:cBhvr>
+                                        <p:cTn id="26" dur="1" fill="hold">
                                           <p:stCondLst>
                                             <p:cond delay="0"/>
                                           </p:stCondLst>
@@ -6772,7 +6858,7 @@
                                     </p:set>
                                     <p:animEffect transition="in" filter="fade">
                                       <p:cBhvr>
-                                        <p:cTn id="23" dur="500"/>
+                                        <p:cTn id="27" dur="500"/>
                                         <p:tgtEl>
                                           <p:spTgt spid="15"/>
                                         </p:tgtEl>
@@ -6947,6 +7033,423 @@
 </file>
 
 <file path=ppt/slides/slide20.xml><?xml version="1.0" encoding="utf-8"?>
+<p:sld xmlns:a="http://schemas.openxmlformats.org/drawingml/2006/main" xmlns:r="http://schemas.openxmlformats.org/officeDocument/2006/relationships" xmlns:p="http://schemas.openxmlformats.org/presentationml/2006/main">
+  <p:cSld>
+    <p:bg>
+      <p:bgPr>
+        <a:solidFill>
+          <a:schemeClr val="bg1"/>
+        </a:solidFill>
+        <a:effectLst/>
+      </p:bgPr>
+    </p:bg>
+    <p:spTree>
+      <p:nvGrpSpPr>
+        <p:cNvPr id="1" name=""/>
+        <p:cNvGrpSpPr/>
+        <p:nvPr/>
+      </p:nvGrpSpPr>
+      <p:grpSpPr>
+        <a:xfrm>
+          <a:off x="0" y="0"/>
+          <a:ext cx="0" cy="0"/>
+          <a:chOff x="0" y="0"/>
+          <a:chExt cx="0" cy="0"/>
+        </a:xfrm>
+      </p:grpSpPr>
+      <p:sp>
+        <p:nvSpPr>
+          <p:cNvPr id="14" name="Rectangle 13">
+            <a:extLst>
+              <a:ext uri="{FF2B5EF4-FFF2-40B4-BE49-F238E27FC236}">
+                <a16:creationId xmlns:a16="http://schemas.microsoft.com/office/drawing/2014/main" id="{FD12A5BA-B063-4B33-AB08-86CF7D23F625}"/>
+              </a:ext>
+              <a:ext uri="{C183D7F6-B498-43B3-948B-1728B52AA6E4}">
+                <adec:decorative xmlns:adec="http://schemas.microsoft.com/office/drawing/2017/decorative" val="1"/>
+              </a:ext>
+            </a:extLst>
+          </p:cNvPr>
+          <p:cNvSpPr>
+            <a:spLocks noGrp="1" noRot="1" noChangeAspect="1" noMove="1" noResize="1" noEditPoints="1" noAdjustHandles="1" noChangeArrowheads="1" noChangeShapeType="1" noTextEdit="1"/>
+          </p:cNvSpPr>
+          <p:nvPr>
+            <p:extLst>
+              <p:ext uri="{386F3935-93C4-4BCD-93E2-E3B085C9AB24}">
+                <p16:designElem xmlns:p16="http://schemas.microsoft.com/office/powerpoint/2015/main" val="1"/>
+              </p:ext>
+            </p:extLst>
+          </p:nvPr>
+        </p:nvSpPr>
+        <p:spPr>
+          <a:xfrm>
+            <a:off x="0" y="-1"/>
+            <a:ext cx="12192000" cy="4572001"/>
+          </a:xfrm>
+          <a:prstGeom prst="rect">
+            <a:avLst/>
+          </a:prstGeom>
+          <a:solidFill>
+            <a:schemeClr val="accent2"/>
+          </a:solidFill>
+          <a:ln>
+            <a:noFill/>
+          </a:ln>
+        </p:spPr>
+        <p:style>
+          <a:lnRef idx="2">
+            <a:schemeClr val="accent1">
+              <a:shade val="50000"/>
+            </a:schemeClr>
+          </a:lnRef>
+          <a:fillRef idx="1">
+            <a:schemeClr val="accent1"/>
+          </a:fillRef>
+          <a:effectRef idx="0">
+            <a:schemeClr val="accent1"/>
+          </a:effectRef>
+          <a:fontRef idx="minor">
+            <a:schemeClr val="lt1"/>
+          </a:fontRef>
+        </p:style>
+      </p:sp>
+      <p:cxnSp>
+        <p:nvCxnSpPr>
+          <p:cNvPr id="16" name="Straight Connector 15">
+            <a:extLst>
+              <a:ext uri="{FF2B5EF4-FFF2-40B4-BE49-F238E27FC236}">
+                <a16:creationId xmlns:a16="http://schemas.microsoft.com/office/drawing/2014/main" id="{07DFAF29-6BD8-4A93-A292-D6A8C6EFB5DC}"/>
+              </a:ext>
+              <a:ext uri="{C183D7F6-B498-43B3-948B-1728B52AA6E4}">
+                <adec:decorative xmlns:adec="http://schemas.microsoft.com/office/drawing/2017/decorative" val="1"/>
+              </a:ext>
+            </a:extLst>
+          </p:cNvPr>
+          <p:cNvCxnSpPr>
+            <a:cxnSpLocks noGrp="1" noRot="1" noChangeAspect="1" noMove="1" noResize="1" noEditPoints="1" noAdjustHandles="1" noChangeArrowheads="1" noChangeShapeType="1"/>
+          </p:cNvCxnSpPr>
+          <p:nvPr>
+            <p:extLst>
+              <p:ext uri="{386F3935-93C4-4BCD-93E2-E3B085C9AB24}">
+                <p16:designElem xmlns:p16="http://schemas.microsoft.com/office/powerpoint/2015/main" val="1"/>
+              </p:ext>
+            </p:extLst>
+          </p:nvPr>
+        </p:nvCxnSpPr>
+        <p:spPr>
+          <a:xfrm flipV="1">
+            <a:off x="8386842" y="5264106"/>
+            <a:ext cx="0" cy="914400"/>
+          </a:xfrm>
+          <a:prstGeom prst="line">
+            <a:avLst/>
+          </a:prstGeom>
+          <a:ln w="19050">
+            <a:solidFill>
+              <a:schemeClr val="accent2"/>
+            </a:solidFill>
+          </a:ln>
+        </p:spPr>
+        <p:style>
+          <a:lnRef idx="1">
+            <a:schemeClr val="accent1"/>
+          </a:lnRef>
+          <a:fillRef idx="0">
+            <a:schemeClr val="accent1"/>
+          </a:fillRef>
+          <a:effectRef idx="0">
+            <a:schemeClr val="accent1"/>
+          </a:effectRef>
+          <a:fontRef idx="minor">
+            <a:schemeClr val="tx1"/>
+          </a:fontRef>
+        </p:style>
+      </p:cxnSp>
+      <p:sp>
+        <p:nvSpPr>
+          <p:cNvPr id="18" name="Rectangle 17">
+            <a:extLst>
+              <a:ext uri="{FF2B5EF4-FFF2-40B4-BE49-F238E27FC236}">
+                <a16:creationId xmlns:a16="http://schemas.microsoft.com/office/drawing/2014/main" id="{55F40173-F096-49CC-A730-A2DF1F04EC3B}"/>
+              </a:ext>
+              <a:ext uri="{C183D7F6-B498-43B3-948B-1728B52AA6E4}">
+                <adec:decorative xmlns:adec="http://schemas.microsoft.com/office/drawing/2017/decorative" val="1"/>
+              </a:ext>
+            </a:extLst>
+          </p:cNvPr>
+          <p:cNvSpPr>
+            <a:spLocks noGrp="1" noRot="1" noChangeAspect="1" noMove="1" noResize="1" noEditPoints="1" noAdjustHandles="1" noChangeArrowheads="1" noChangeShapeType="1" noTextEdit="1"/>
+          </p:cNvSpPr>
+          <p:nvPr>
+            <p:extLst>
+              <p:ext uri="{386F3935-93C4-4BCD-93E2-E3B085C9AB24}">
+                <p16:designElem xmlns:p16="http://schemas.microsoft.com/office/powerpoint/2015/main" val="1"/>
+              </p:ext>
+            </p:extLst>
+          </p:nvPr>
+        </p:nvSpPr>
+        <p:spPr>
+          <a:xfrm>
+            <a:off x="0" y="0"/>
+            <a:ext cx="12188726" cy="6858975"/>
+          </a:xfrm>
+          <a:prstGeom prst="rect">
+            <a:avLst/>
+          </a:prstGeom>
+          <a:solidFill>
+            <a:schemeClr val="bg1"/>
+          </a:solidFill>
+          <a:ln>
+            <a:noFill/>
+          </a:ln>
+        </p:spPr>
+        <p:style>
+          <a:lnRef idx="2">
+            <a:schemeClr val="accent1">
+              <a:shade val="50000"/>
+            </a:schemeClr>
+          </a:lnRef>
+          <a:fillRef idx="1">
+            <a:schemeClr val="accent1"/>
+          </a:fillRef>
+          <a:effectRef idx="0">
+            <a:schemeClr val="accent1"/>
+          </a:effectRef>
+          <a:fontRef idx="minor">
+            <a:schemeClr val="lt1"/>
+          </a:fontRef>
+        </p:style>
+        <p:txBody>
+          <a:bodyPr rtlCol="0" anchor="ctr"/>
+          <a:lstStyle/>
+          <a:p>
+            <a:pPr algn="ctr"/>
+            <a:endParaRPr lang="en-US"/>
+          </a:p>
+        </p:txBody>
+      </p:sp>
+      <p:sp>
+        <p:nvSpPr>
+          <p:cNvPr id="20" name="Rectangle 19">
+            <a:extLst>
+              <a:ext uri="{FF2B5EF4-FFF2-40B4-BE49-F238E27FC236}">
+                <a16:creationId xmlns:a16="http://schemas.microsoft.com/office/drawing/2014/main" id="{806CEF0B-5733-482C-9868-4C57AF79DA3E}"/>
+              </a:ext>
+              <a:ext uri="{C183D7F6-B498-43B3-948B-1728B52AA6E4}">
+                <adec:decorative xmlns:adec="http://schemas.microsoft.com/office/drawing/2017/decorative" val="1"/>
+              </a:ext>
+            </a:extLst>
+          </p:cNvPr>
+          <p:cNvSpPr>
+            <a:spLocks noGrp="1" noRot="1" noChangeAspect="1" noMove="1" noResize="1" noEditPoints="1" noAdjustHandles="1" noChangeArrowheads="1" noChangeShapeType="1" noTextEdit="1"/>
+          </p:cNvSpPr>
+          <p:nvPr>
+            <p:extLst>
+              <p:ext uri="{386F3935-93C4-4BCD-93E2-E3B085C9AB24}">
+                <p16:designElem xmlns:p16="http://schemas.microsoft.com/office/powerpoint/2015/main" val="1"/>
+              </p:ext>
+            </p:extLst>
+          </p:nvPr>
+        </p:nvSpPr>
+        <p:spPr>
+          <a:xfrm>
+            <a:off x="0" y="0"/>
+            <a:ext cx="5468548" cy="6858000"/>
+          </a:xfrm>
+          <a:prstGeom prst="rect">
+            <a:avLst/>
+          </a:prstGeom>
+          <a:solidFill>
+            <a:schemeClr val="accent2"/>
+          </a:solidFill>
+          <a:ln>
+            <a:noFill/>
+          </a:ln>
+        </p:spPr>
+        <p:style>
+          <a:lnRef idx="2">
+            <a:schemeClr val="accent1">
+              <a:shade val="50000"/>
+            </a:schemeClr>
+          </a:lnRef>
+          <a:fillRef idx="1">
+            <a:schemeClr val="accent1"/>
+          </a:fillRef>
+          <a:effectRef idx="0">
+            <a:schemeClr val="accent1"/>
+          </a:effectRef>
+          <a:fontRef idx="minor">
+            <a:schemeClr val="lt1"/>
+          </a:fontRef>
+        </p:style>
+        <p:txBody>
+          <a:bodyPr rtlCol="0" anchor="ctr"/>
+          <a:lstStyle/>
+          <a:p>
+            <a:pPr algn="ctr"/>
+            <a:endParaRPr lang="en-US"/>
+          </a:p>
+        </p:txBody>
+      </p:sp>
+      <p:sp>
+        <p:nvSpPr>
+          <p:cNvPr id="7" name="TextBox 6">
+            <a:extLst>
+              <a:ext uri="{FF2B5EF4-FFF2-40B4-BE49-F238E27FC236}">
+                <a16:creationId xmlns:a16="http://schemas.microsoft.com/office/drawing/2014/main" id="{2E9D5DB1-1147-4BD0-AEB0-66C8E5E4F42A}"/>
+              </a:ext>
+            </a:extLst>
+          </p:cNvPr>
+          <p:cNvSpPr txBox="1"/>
+          <p:nvPr/>
+        </p:nvSpPr>
+        <p:spPr>
+          <a:xfrm>
+            <a:off x="634276" y="640080"/>
+            <a:ext cx="4208656" cy="3034857"/>
+          </a:xfrm>
+          <a:prstGeom prst="rect">
+            <a:avLst/>
+          </a:prstGeom>
+        </p:spPr>
+        <p:txBody>
+          <a:bodyPr vert="horz" lIns="91440" tIns="45720" rIns="91440" bIns="45720" rtlCol="0" anchor="b">
+            <a:normAutofit/>
+          </a:bodyPr>
+          <a:lstStyle/>
+          <a:p>
+            <a:pPr algn="r" defTabSz="914400">
+              <a:lnSpc>
+                <a:spcPct val="80000"/>
+              </a:lnSpc>
+              <a:spcBef>
+                <a:spcPct val="0"/>
+              </a:spcBef>
+              <a:spcAft>
+                <a:spcPts val="600"/>
+              </a:spcAft>
+            </a:pPr>
+            <a:r>
+              <a:rPr lang="en-US" sz="8000" b="1" cap="all" spc="200" dirty="0">
+                <a:solidFill>
+                  <a:srgbClr val="FFFFFF"/>
+                </a:solidFill>
+                <a:latin typeface="+mj-lt"/>
+                <a:ea typeface="+mj-ea"/>
+                <a:cs typeface="+mj-cs"/>
+              </a:rPr>
+              <a:t>QUIZ</a:t>
+            </a:r>
+          </a:p>
+        </p:txBody>
+      </p:sp>
+      <p:cxnSp>
+        <p:nvCxnSpPr>
+          <p:cNvPr id="22" name="Straight Connector 21">
+            <a:extLst>
+              <a:ext uri="{FF2B5EF4-FFF2-40B4-BE49-F238E27FC236}">
+                <a16:creationId xmlns:a16="http://schemas.microsoft.com/office/drawing/2014/main" id="{FC5D3B4D-9BAC-482B-A34B-01BB35CB5316}"/>
+              </a:ext>
+              <a:ext uri="{C183D7F6-B498-43B3-948B-1728B52AA6E4}">
+                <adec:decorative xmlns:adec="http://schemas.microsoft.com/office/drawing/2017/decorative" val="1"/>
+              </a:ext>
+            </a:extLst>
+          </p:cNvPr>
+          <p:cNvCxnSpPr>
+            <a:cxnSpLocks noGrp="1" noRot="1" noChangeAspect="1" noMove="1" noResize="1" noEditPoints="1" noAdjustHandles="1" noChangeArrowheads="1" noChangeShapeType="1"/>
+          </p:cNvCxnSpPr>
+          <p:nvPr>
+            <p:extLst>
+              <p:ext uri="{386F3935-93C4-4BCD-93E2-E3B085C9AB24}">
+                <p16:designElem xmlns:p16="http://schemas.microsoft.com/office/powerpoint/2015/main" val="1"/>
+              </p:ext>
+            </p:extLst>
+          </p:nvPr>
+        </p:nvCxnSpPr>
+        <p:spPr>
+          <a:xfrm>
+            <a:off x="786679" y="3765314"/>
+            <a:ext cx="3931920" cy="0"/>
+          </a:xfrm>
+          <a:prstGeom prst="line">
+            <a:avLst/>
+          </a:prstGeom>
+          <a:ln w="19050">
+            <a:solidFill>
+              <a:schemeClr val="accent2">
+                <a:lumMod val="20000"/>
+                <a:lumOff val="80000"/>
+              </a:schemeClr>
+            </a:solidFill>
+          </a:ln>
+        </p:spPr>
+        <p:style>
+          <a:lnRef idx="1">
+            <a:schemeClr val="accent1"/>
+          </a:lnRef>
+          <a:fillRef idx="0">
+            <a:schemeClr val="accent1"/>
+          </a:fillRef>
+          <a:effectRef idx="0">
+            <a:schemeClr val="accent1"/>
+          </a:effectRef>
+          <a:fontRef idx="minor">
+            <a:schemeClr val="tx1"/>
+          </a:fontRef>
+        </p:style>
+      </p:cxnSp>
+      <p:pic>
+        <p:nvPicPr>
+          <p:cNvPr id="11" name="Graphic 10" descr="Questionnaire">
+            <a:extLst>
+              <a:ext uri="{FF2B5EF4-FFF2-40B4-BE49-F238E27FC236}">
+                <a16:creationId xmlns:a16="http://schemas.microsoft.com/office/drawing/2014/main" id="{824D6663-1B78-4265-9860-8816713C8E5E}"/>
+              </a:ext>
+            </a:extLst>
+          </p:cNvPr>
+          <p:cNvPicPr>
+            <a:picLocks noChangeAspect="1"/>
+          </p:cNvPicPr>
+          <p:nvPr/>
+        </p:nvPicPr>
+        <p:blipFill>
+          <a:blip r:embed="rId2">
+            <a:extLst>
+              <a:ext uri="{28A0092B-C50C-407E-A947-70E740481C1C}">
+                <a14:useLocalDpi xmlns:a14="http://schemas.microsoft.com/office/drawing/2010/main" val="0"/>
+              </a:ext>
+              <a:ext uri="{96DAC541-7B7A-43D3-8B79-37D633B846F1}">
+                <asvg:svgBlip xmlns:asvg="http://schemas.microsoft.com/office/drawing/2016/SVG/main" r:embed="rId3"/>
+              </a:ext>
+            </a:extLst>
+          </a:blip>
+          <a:stretch>
+            <a:fillRect/>
+          </a:stretch>
+        </p:blipFill>
+        <p:spPr>
+          <a:xfrm>
+            <a:off x="6096000" y="699753"/>
+            <a:ext cx="5459470" cy="5459470"/>
+          </a:xfrm>
+          <a:prstGeom prst="rect">
+            <a:avLst/>
+          </a:prstGeom>
+        </p:spPr>
+      </p:pic>
+    </p:spTree>
+    <p:extLst>
+      <p:ext uri="{BB962C8B-B14F-4D97-AF65-F5344CB8AC3E}">
+        <p14:creationId xmlns:p14="http://schemas.microsoft.com/office/powerpoint/2010/main" val="3165159712"/>
+      </p:ext>
+    </p:extLst>
+  </p:cSld>
+  <p:clrMapOvr>
+    <a:masterClrMapping/>
+  </p:clrMapOvr>
+</p:sld>
+</file>
+
+<file path=ppt/slides/slide21.xml><?xml version="1.0" encoding="utf-8"?>
 <p:sld xmlns:a="http://schemas.openxmlformats.org/drawingml/2006/main" xmlns:r="http://schemas.openxmlformats.org/officeDocument/2006/relationships" xmlns:p="http://schemas.openxmlformats.org/presentationml/2006/main" showMasterSp="0">
   <p:cSld>
     <p:spTree>
@@ -7550,7 +8053,7 @@
 </p:sld>
 </file>
 
-<file path=ppt/slides/slide21.xml><?xml version="1.0" encoding="utf-8"?>
+<file path=ppt/slides/slide22.xml><?xml version="1.0" encoding="utf-8"?>
 <p:sld xmlns:a="http://schemas.openxmlformats.org/drawingml/2006/main" xmlns:r="http://schemas.openxmlformats.org/officeDocument/2006/relationships" xmlns:p="http://schemas.openxmlformats.org/presentationml/2006/main" showMasterSp="0">
   <p:cSld>
     <p:spTree>
@@ -8045,7 +8548,7 @@
 </p:sld>
 </file>
 
-<file path=ppt/slides/slide22.xml><?xml version="1.0" encoding="utf-8"?>
+<file path=ppt/slides/slide23.xml><?xml version="1.0" encoding="utf-8"?>
 <p:sld xmlns:a="http://schemas.openxmlformats.org/drawingml/2006/main" xmlns:r="http://schemas.openxmlformats.org/officeDocument/2006/relationships" xmlns:p="http://schemas.openxmlformats.org/presentationml/2006/main">
   <p:cSld>
     <p:spTree>
@@ -8329,7 +8832,7 @@
 </p:sld>
 </file>
 
-<file path=ppt/slides/slide23.xml><?xml version="1.0" encoding="utf-8"?>
+<file path=ppt/slides/slide24.xml><?xml version="1.0" encoding="utf-8"?>
 <p:sld xmlns:a="http://schemas.openxmlformats.org/drawingml/2006/main" xmlns:r="http://schemas.openxmlformats.org/officeDocument/2006/relationships" xmlns:p="http://schemas.openxmlformats.org/presentationml/2006/main" showMasterSp="0">
   <p:cSld>
     <p:spTree>
@@ -8660,7 +9163,7 @@
 </p:sld>
 </file>
 
-<file path=ppt/slides/slide24.xml><?xml version="1.0" encoding="utf-8"?>
+<file path=ppt/slides/slide25.xml><?xml version="1.0" encoding="utf-8"?>
 <p:sld xmlns:a="http://schemas.openxmlformats.org/drawingml/2006/main" xmlns:r="http://schemas.openxmlformats.org/officeDocument/2006/relationships" xmlns:p="http://schemas.openxmlformats.org/presentationml/2006/main" showMasterSp="0">
   <p:cSld>
     <p:spTree>
@@ -9567,7 +10070,7 @@
 </p:sld>
 </file>
 
-<file path=ppt/slides/slide25.xml><?xml version="1.0" encoding="utf-8"?>
+<file path=ppt/slides/slide26.xml><?xml version="1.0" encoding="utf-8"?>
 <p:sld xmlns:a="http://schemas.openxmlformats.org/drawingml/2006/main" xmlns:r="http://schemas.openxmlformats.org/officeDocument/2006/relationships" xmlns:p="http://schemas.openxmlformats.org/presentationml/2006/main" showMasterSp="0">
   <p:cSld>
     <p:bg>
@@ -9687,7 +10190,7 @@
 </p:sld>
 </file>
 
-<file path=ppt/slides/slide26.xml><?xml version="1.0" encoding="utf-8"?>
+<file path=ppt/slides/slide27.xml><?xml version="1.0" encoding="utf-8"?>
 <p:sld xmlns:a="http://schemas.openxmlformats.org/drawingml/2006/main" xmlns:r="http://schemas.openxmlformats.org/officeDocument/2006/relationships" xmlns:p="http://schemas.openxmlformats.org/presentationml/2006/main">
   <p:cSld>
     <p:bg>

</xml_diff>